<commit_message>
Block diagram to presentation
</commit_message>
<xml_diff>
--- a/Presentation/Lab Project Presentation.pptx
+++ b/Presentation/Lab Project Presentation.pptx
@@ -1,9 +1,15 @@
 
 <file path=ppt/presentation.xml><?xml version="1.0" encoding="utf-8"?>
-<p:presentation xmlns:a="http://schemas.openxmlformats.org/drawingml/2006/main" xmlns:r="http://schemas.openxmlformats.org/officeDocument/2006/relationships" xmlns:p="http://schemas.openxmlformats.org/presentationml/2006/main" saveSubsetFonts="1" autoCompressPictures="0">
+<p:presentation xmlns:a="http://schemas.openxmlformats.org/drawingml/2006/main" xmlns:r="http://schemas.openxmlformats.org/officeDocument/2006/relationships" xmlns:p="http://schemas.openxmlformats.org/presentationml/2006/main" showSpecialPlsOnTitleSld="0" saveSubsetFonts="1" autoCompressPictures="0">
   <p:sldMasterIdLst>
     <p:sldMasterId id="2147483660" r:id="rId1"/>
   </p:sldMasterIdLst>
+  <p:notesMasterIdLst>
+    <p:notesMasterId r:id="rId15"/>
+  </p:notesMasterIdLst>
+  <p:handoutMasterIdLst>
+    <p:handoutMasterId r:id="rId16"/>
+  </p:handoutMasterIdLst>
   <p:sldIdLst>
     <p:sldId id="256" r:id="rId2"/>
     <p:sldId id="257" r:id="rId3"/>
@@ -118,7 +124,7 @@
   </p:defaultTextStyle>
   <p:extLst>
     <p:ext uri="{EFAFB233-063F-42B5-8137-9DF3F51BA10A}">
-      <p15:sldGuideLst xmlns:p15="http://schemas.microsoft.com/office/powerpoint/2012/main">
+      <p15:sldGuideLst xmlns:p15="http://schemas.microsoft.com/office/powerpoint/2012/main" xmlns="">
         <p15:guide id="1" orient="horz" pos="2160">
           <p15:clr>
             <a:srgbClr val="A4A3A4"/>
@@ -133,6 +139,523 @@
     </p:ext>
   </p:extLst>
 </p:presentation>
+</file>
+
+<file path=ppt/handoutMasters/handoutMaster1.xml><?xml version="1.0" encoding="utf-8"?>
+<p:handoutMaster xmlns:a="http://schemas.openxmlformats.org/drawingml/2006/main" xmlns:r="http://schemas.openxmlformats.org/officeDocument/2006/relationships" xmlns:p="http://schemas.openxmlformats.org/presentationml/2006/main">
+  <p:cSld>
+    <p:bg>
+      <p:bgRef idx="1001">
+        <a:schemeClr val="bg1"/>
+      </p:bgRef>
+    </p:bg>
+    <p:spTree>
+      <p:nvGrpSpPr>
+        <p:cNvPr id="1" name=""/>
+        <p:cNvGrpSpPr/>
+        <p:nvPr/>
+      </p:nvGrpSpPr>
+      <p:grpSpPr>
+        <a:xfrm>
+          <a:off x="0" y="0"/>
+          <a:ext cx="0" cy="0"/>
+          <a:chOff x="0" y="0"/>
+          <a:chExt cx="0" cy="0"/>
+        </a:xfrm>
+      </p:grpSpPr>
+      <p:sp>
+        <p:nvSpPr>
+          <p:cNvPr id="2" name="Header Placeholder 1"/>
+          <p:cNvSpPr>
+            <a:spLocks noGrp="1"/>
+          </p:cNvSpPr>
+          <p:nvPr>
+            <p:ph type="hdr" sz="quarter"/>
+          </p:nvPr>
+        </p:nvSpPr>
+        <p:spPr>
+          <a:xfrm>
+            <a:off x="0" y="0"/>
+            <a:ext cx="2971800" cy="457200"/>
+          </a:xfrm>
+          <a:prstGeom prst="rect">
+            <a:avLst/>
+          </a:prstGeom>
+        </p:spPr>
+        <p:txBody>
+          <a:bodyPr vert="horz" lIns="91440" tIns="45720" rIns="91440" bIns="45720" rtlCol="0"/>
+          <a:lstStyle>
+            <a:lvl1pPr algn="l">
+              <a:defRPr sz="1200"/>
+            </a:lvl1pPr>
+          </a:lstStyle>
+          <a:p>
+            <a:endParaRPr lang="en-US"/>
+          </a:p>
+        </p:txBody>
+      </p:sp>
+      <p:sp>
+        <p:nvSpPr>
+          <p:cNvPr id="3" name="Date Placeholder 2"/>
+          <p:cNvSpPr>
+            <a:spLocks noGrp="1"/>
+          </p:cNvSpPr>
+          <p:nvPr>
+            <p:ph type="dt" sz="quarter" idx="1"/>
+          </p:nvPr>
+        </p:nvSpPr>
+        <p:spPr>
+          <a:xfrm>
+            <a:off x="3884613" y="0"/>
+            <a:ext cx="2971800" cy="457200"/>
+          </a:xfrm>
+          <a:prstGeom prst="rect">
+            <a:avLst/>
+          </a:prstGeom>
+        </p:spPr>
+        <p:txBody>
+          <a:bodyPr vert="horz" lIns="91440" tIns="45720" rIns="91440" bIns="45720" rtlCol="0"/>
+          <a:lstStyle>
+            <a:lvl1pPr algn="r">
+              <a:defRPr sz="1200"/>
+            </a:lvl1pPr>
+          </a:lstStyle>
+          <a:p>
+            <a:fld id="{3FA6FDA4-907F-C840-8573-33F4849B33D4}" type="datetimeFigureOut">
+              <a:rPr lang="en-US" smtClean="0"/>
+              <a:t>18/09/04</a:t>
+            </a:fld>
+            <a:endParaRPr lang="en-US"/>
+          </a:p>
+        </p:txBody>
+      </p:sp>
+      <p:sp>
+        <p:nvSpPr>
+          <p:cNvPr id="4" name="Footer Placeholder 3"/>
+          <p:cNvSpPr>
+            <a:spLocks noGrp="1"/>
+          </p:cNvSpPr>
+          <p:nvPr>
+            <p:ph type="ftr" sz="quarter" idx="2"/>
+          </p:nvPr>
+        </p:nvSpPr>
+        <p:spPr>
+          <a:xfrm>
+            <a:off x="0" y="8685213"/>
+            <a:ext cx="2971800" cy="457200"/>
+          </a:xfrm>
+          <a:prstGeom prst="rect">
+            <a:avLst/>
+          </a:prstGeom>
+        </p:spPr>
+        <p:txBody>
+          <a:bodyPr vert="horz" lIns="91440" tIns="45720" rIns="91440" bIns="45720" rtlCol="0" anchor="b"/>
+          <a:lstStyle>
+            <a:lvl1pPr algn="l">
+              <a:defRPr sz="1200"/>
+            </a:lvl1pPr>
+          </a:lstStyle>
+          <a:p>
+            <a:endParaRPr lang="en-US"/>
+          </a:p>
+        </p:txBody>
+      </p:sp>
+      <p:sp>
+        <p:nvSpPr>
+          <p:cNvPr id="5" name="Slide Number Placeholder 4"/>
+          <p:cNvSpPr>
+            <a:spLocks noGrp="1"/>
+          </p:cNvSpPr>
+          <p:nvPr>
+            <p:ph type="sldNum" sz="quarter" idx="3"/>
+          </p:nvPr>
+        </p:nvSpPr>
+        <p:spPr>
+          <a:xfrm>
+            <a:off x="3884613" y="8685213"/>
+            <a:ext cx="2971800" cy="457200"/>
+          </a:xfrm>
+          <a:prstGeom prst="rect">
+            <a:avLst/>
+          </a:prstGeom>
+        </p:spPr>
+        <p:txBody>
+          <a:bodyPr vert="horz" lIns="91440" tIns="45720" rIns="91440" bIns="45720" rtlCol="0" anchor="b"/>
+          <a:lstStyle>
+            <a:lvl1pPr algn="r">
+              <a:defRPr sz="1200"/>
+            </a:lvl1pPr>
+          </a:lstStyle>
+          <a:p>
+            <a:fld id="{15993AD3-97E2-E64E-8B3D-F7264131D81E}" type="slidenum">
+              <a:rPr lang="en-US" smtClean="0"/>
+              <a:t>‹#›</a:t>
+            </a:fld>
+            <a:endParaRPr lang="en-US"/>
+          </a:p>
+        </p:txBody>
+      </p:sp>
+    </p:spTree>
+    <p:extLst>
+      <p:ext uri="{BB962C8B-B14F-4D97-AF65-F5344CB8AC3E}">
+        <p14:creationId xmlns:p14="http://schemas.microsoft.com/office/powerpoint/2010/main" val="4003923993"/>
+      </p:ext>
+    </p:extLst>
+  </p:cSld>
+  <p:clrMap bg1="lt1" tx1="dk1" bg2="lt2" tx2="dk2" accent1="accent1" accent2="accent2" accent3="accent3" accent4="accent4" accent5="accent5" accent6="accent6" hlink="hlink" folHlink="folHlink"/>
+  <p:hf hdr="0" ftr="0" dt="0"/>
+</p:handoutMaster>
+</file>
+
+<file path=ppt/notesMasters/notesMaster1.xml><?xml version="1.0" encoding="utf-8"?>
+<p:notesMaster xmlns:a="http://schemas.openxmlformats.org/drawingml/2006/main" xmlns:r="http://schemas.openxmlformats.org/officeDocument/2006/relationships" xmlns:p="http://schemas.openxmlformats.org/presentationml/2006/main">
+  <p:cSld>
+    <p:bg>
+      <p:bgRef idx="1001">
+        <a:schemeClr val="bg1"/>
+      </p:bgRef>
+    </p:bg>
+    <p:spTree>
+      <p:nvGrpSpPr>
+        <p:cNvPr id="1" name=""/>
+        <p:cNvGrpSpPr/>
+        <p:nvPr/>
+      </p:nvGrpSpPr>
+      <p:grpSpPr>
+        <a:xfrm>
+          <a:off x="0" y="0"/>
+          <a:ext cx="0" cy="0"/>
+          <a:chOff x="0" y="0"/>
+          <a:chExt cx="0" cy="0"/>
+        </a:xfrm>
+      </p:grpSpPr>
+      <p:sp>
+        <p:nvSpPr>
+          <p:cNvPr id="2" name="Header Placeholder 1"/>
+          <p:cNvSpPr>
+            <a:spLocks noGrp="1"/>
+          </p:cNvSpPr>
+          <p:nvPr>
+            <p:ph type="hdr" sz="quarter"/>
+          </p:nvPr>
+        </p:nvSpPr>
+        <p:spPr>
+          <a:xfrm>
+            <a:off x="0" y="0"/>
+            <a:ext cx="2971800" cy="457200"/>
+          </a:xfrm>
+          <a:prstGeom prst="rect">
+            <a:avLst/>
+          </a:prstGeom>
+        </p:spPr>
+        <p:txBody>
+          <a:bodyPr vert="horz" lIns="91440" tIns="45720" rIns="91440" bIns="45720" rtlCol="0"/>
+          <a:lstStyle>
+            <a:lvl1pPr algn="l">
+              <a:defRPr sz="1200"/>
+            </a:lvl1pPr>
+          </a:lstStyle>
+          <a:p>
+            <a:endParaRPr lang="en-US"/>
+          </a:p>
+        </p:txBody>
+      </p:sp>
+      <p:sp>
+        <p:nvSpPr>
+          <p:cNvPr id="3" name="Date Placeholder 2"/>
+          <p:cNvSpPr>
+            <a:spLocks noGrp="1"/>
+          </p:cNvSpPr>
+          <p:nvPr>
+            <p:ph type="dt" idx="1"/>
+          </p:nvPr>
+        </p:nvSpPr>
+        <p:spPr>
+          <a:xfrm>
+            <a:off x="3884613" y="0"/>
+            <a:ext cx="2971800" cy="457200"/>
+          </a:xfrm>
+          <a:prstGeom prst="rect">
+            <a:avLst/>
+          </a:prstGeom>
+        </p:spPr>
+        <p:txBody>
+          <a:bodyPr vert="horz" lIns="91440" tIns="45720" rIns="91440" bIns="45720" rtlCol="0"/>
+          <a:lstStyle>
+            <a:lvl1pPr algn="r">
+              <a:defRPr sz="1200"/>
+            </a:lvl1pPr>
+          </a:lstStyle>
+          <a:p>
+            <a:fld id="{290492DD-1613-8B48-9182-1ECEE9190ABB}" type="datetimeFigureOut">
+              <a:rPr lang="en-US" smtClean="0"/>
+              <a:t>18/09/04</a:t>
+            </a:fld>
+            <a:endParaRPr lang="en-US"/>
+          </a:p>
+        </p:txBody>
+      </p:sp>
+      <p:sp>
+        <p:nvSpPr>
+          <p:cNvPr id="4" name="Slide Image Placeholder 3"/>
+          <p:cNvSpPr>
+            <a:spLocks noGrp="1" noRot="1" noChangeAspect="1"/>
+          </p:cNvSpPr>
+          <p:nvPr>
+            <p:ph type="sldImg" idx="2"/>
+          </p:nvPr>
+        </p:nvSpPr>
+        <p:spPr>
+          <a:xfrm>
+            <a:off x="952500" y="685800"/>
+            <a:ext cx="4953000" cy="3429000"/>
+          </a:xfrm>
+          <a:prstGeom prst="rect">
+            <a:avLst/>
+          </a:prstGeom>
+          <a:noFill/>
+          <a:ln w="12700">
+            <a:solidFill>
+              <a:prstClr val="black"/>
+            </a:solidFill>
+          </a:ln>
+        </p:spPr>
+        <p:txBody>
+          <a:bodyPr vert="horz" lIns="91440" tIns="45720" rIns="91440" bIns="45720" rtlCol="0" anchor="ctr"/>
+          <a:lstStyle/>
+          <a:p>
+            <a:endParaRPr lang="en-US"/>
+          </a:p>
+        </p:txBody>
+      </p:sp>
+      <p:sp>
+        <p:nvSpPr>
+          <p:cNvPr id="5" name="Notes Placeholder 4"/>
+          <p:cNvSpPr>
+            <a:spLocks noGrp="1"/>
+          </p:cNvSpPr>
+          <p:nvPr>
+            <p:ph type="body" sz="quarter" idx="3"/>
+          </p:nvPr>
+        </p:nvSpPr>
+        <p:spPr>
+          <a:xfrm>
+            <a:off x="685800" y="4343400"/>
+            <a:ext cx="5486400" cy="4114800"/>
+          </a:xfrm>
+          <a:prstGeom prst="rect">
+            <a:avLst/>
+          </a:prstGeom>
+        </p:spPr>
+        <p:txBody>
+          <a:bodyPr vert="horz" lIns="91440" tIns="45720" rIns="91440" bIns="45720" rtlCol="0"/>
+          <a:lstStyle/>
+          <a:p>
+            <a:pPr lvl="0"/>
+            <a:r>
+              <a:rPr lang="en-US" smtClean="0"/>
+              <a:t>Click to edit Master text styles</a:t>
+            </a:r>
+          </a:p>
+          <a:p>
+            <a:pPr lvl="1"/>
+            <a:r>
+              <a:rPr lang="en-US" smtClean="0"/>
+              <a:t>Second level</a:t>
+            </a:r>
+          </a:p>
+          <a:p>
+            <a:pPr lvl="2"/>
+            <a:r>
+              <a:rPr lang="en-US" smtClean="0"/>
+              <a:t>Third level</a:t>
+            </a:r>
+          </a:p>
+          <a:p>
+            <a:pPr lvl="3"/>
+            <a:r>
+              <a:rPr lang="en-US" smtClean="0"/>
+              <a:t>Fourth level</a:t>
+            </a:r>
+          </a:p>
+          <a:p>
+            <a:pPr lvl="4"/>
+            <a:r>
+              <a:rPr lang="en-US" smtClean="0"/>
+              <a:t>Fifth level</a:t>
+            </a:r>
+            <a:endParaRPr lang="en-US"/>
+          </a:p>
+        </p:txBody>
+      </p:sp>
+      <p:sp>
+        <p:nvSpPr>
+          <p:cNvPr id="6" name="Footer Placeholder 5"/>
+          <p:cNvSpPr>
+            <a:spLocks noGrp="1"/>
+          </p:cNvSpPr>
+          <p:nvPr>
+            <p:ph type="ftr" sz="quarter" idx="4"/>
+          </p:nvPr>
+        </p:nvSpPr>
+        <p:spPr>
+          <a:xfrm>
+            <a:off x="0" y="8685213"/>
+            <a:ext cx="2971800" cy="457200"/>
+          </a:xfrm>
+          <a:prstGeom prst="rect">
+            <a:avLst/>
+          </a:prstGeom>
+        </p:spPr>
+        <p:txBody>
+          <a:bodyPr vert="horz" lIns="91440" tIns="45720" rIns="91440" bIns="45720" rtlCol="0" anchor="b"/>
+          <a:lstStyle>
+            <a:lvl1pPr algn="l">
+              <a:defRPr sz="1200"/>
+            </a:lvl1pPr>
+          </a:lstStyle>
+          <a:p>
+            <a:endParaRPr lang="en-US"/>
+          </a:p>
+        </p:txBody>
+      </p:sp>
+      <p:sp>
+        <p:nvSpPr>
+          <p:cNvPr id="7" name="Slide Number Placeholder 6"/>
+          <p:cNvSpPr>
+            <a:spLocks noGrp="1"/>
+          </p:cNvSpPr>
+          <p:nvPr>
+            <p:ph type="sldNum" sz="quarter" idx="5"/>
+          </p:nvPr>
+        </p:nvSpPr>
+        <p:spPr>
+          <a:xfrm>
+            <a:off x="3884613" y="8685213"/>
+            <a:ext cx="2971800" cy="457200"/>
+          </a:xfrm>
+          <a:prstGeom prst="rect">
+            <a:avLst/>
+          </a:prstGeom>
+        </p:spPr>
+        <p:txBody>
+          <a:bodyPr vert="horz" lIns="91440" tIns="45720" rIns="91440" bIns="45720" rtlCol="0" anchor="b"/>
+          <a:lstStyle>
+            <a:lvl1pPr algn="r">
+              <a:defRPr sz="1200"/>
+            </a:lvl1pPr>
+          </a:lstStyle>
+          <a:p>
+            <a:fld id="{36236DF1-55A4-5143-AE5D-F9A532F68BCC}" type="slidenum">
+              <a:rPr lang="en-US" smtClean="0"/>
+              <a:t>‹#›</a:t>
+            </a:fld>
+            <a:endParaRPr lang="en-US"/>
+          </a:p>
+        </p:txBody>
+      </p:sp>
+    </p:spTree>
+    <p:extLst>
+      <p:ext uri="{BB962C8B-B14F-4D97-AF65-F5344CB8AC3E}">
+        <p14:creationId xmlns:p14="http://schemas.microsoft.com/office/powerpoint/2010/main" val="3464750849"/>
+      </p:ext>
+    </p:extLst>
+  </p:cSld>
+  <p:clrMap bg1="lt1" tx1="dk1" bg2="lt2" tx2="dk2" accent1="accent1" accent2="accent2" accent3="accent3" accent4="accent4" accent5="accent5" accent6="accent6" hlink="hlink" folHlink="folHlink"/>
+  <p:hf hdr="0" ftr="0" dt="0"/>
+  <p:notesStyle>
+    <a:lvl1pPr marL="0" algn="l" defTabSz="457200" rtl="0" eaLnBrk="1" latinLnBrk="0" hangingPunct="1">
+      <a:defRPr sz="1200" kern="1200">
+        <a:solidFill>
+          <a:schemeClr val="tx1"/>
+        </a:solidFill>
+        <a:latin typeface="+mn-lt"/>
+        <a:ea typeface="+mn-ea"/>
+        <a:cs typeface="+mn-cs"/>
+      </a:defRPr>
+    </a:lvl1pPr>
+    <a:lvl2pPr marL="457200" algn="l" defTabSz="457200" rtl="0" eaLnBrk="1" latinLnBrk="0" hangingPunct="1">
+      <a:defRPr sz="1200" kern="1200">
+        <a:solidFill>
+          <a:schemeClr val="tx1"/>
+        </a:solidFill>
+        <a:latin typeface="+mn-lt"/>
+        <a:ea typeface="+mn-ea"/>
+        <a:cs typeface="+mn-cs"/>
+      </a:defRPr>
+    </a:lvl2pPr>
+    <a:lvl3pPr marL="914400" algn="l" defTabSz="457200" rtl="0" eaLnBrk="1" latinLnBrk="0" hangingPunct="1">
+      <a:defRPr sz="1200" kern="1200">
+        <a:solidFill>
+          <a:schemeClr val="tx1"/>
+        </a:solidFill>
+        <a:latin typeface="+mn-lt"/>
+        <a:ea typeface="+mn-ea"/>
+        <a:cs typeface="+mn-cs"/>
+      </a:defRPr>
+    </a:lvl3pPr>
+    <a:lvl4pPr marL="1371600" algn="l" defTabSz="457200" rtl="0" eaLnBrk="1" latinLnBrk="0" hangingPunct="1">
+      <a:defRPr sz="1200" kern="1200">
+        <a:solidFill>
+          <a:schemeClr val="tx1"/>
+        </a:solidFill>
+        <a:latin typeface="+mn-lt"/>
+        <a:ea typeface="+mn-ea"/>
+        <a:cs typeface="+mn-cs"/>
+      </a:defRPr>
+    </a:lvl4pPr>
+    <a:lvl5pPr marL="1828800" algn="l" defTabSz="457200" rtl="0" eaLnBrk="1" latinLnBrk="0" hangingPunct="1">
+      <a:defRPr sz="1200" kern="1200">
+        <a:solidFill>
+          <a:schemeClr val="tx1"/>
+        </a:solidFill>
+        <a:latin typeface="+mn-lt"/>
+        <a:ea typeface="+mn-ea"/>
+        <a:cs typeface="+mn-cs"/>
+      </a:defRPr>
+    </a:lvl5pPr>
+    <a:lvl6pPr marL="2286000" algn="l" defTabSz="457200" rtl="0" eaLnBrk="1" latinLnBrk="0" hangingPunct="1">
+      <a:defRPr sz="1200" kern="1200">
+        <a:solidFill>
+          <a:schemeClr val="tx1"/>
+        </a:solidFill>
+        <a:latin typeface="+mn-lt"/>
+        <a:ea typeface="+mn-ea"/>
+        <a:cs typeface="+mn-cs"/>
+      </a:defRPr>
+    </a:lvl6pPr>
+    <a:lvl7pPr marL="2743200" algn="l" defTabSz="457200" rtl="0" eaLnBrk="1" latinLnBrk="0" hangingPunct="1">
+      <a:defRPr sz="1200" kern="1200">
+        <a:solidFill>
+          <a:schemeClr val="tx1"/>
+        </a:solidFill>
+        <a:latin typeface="+mn-lt"/>
+        <a:ea typeface="+mn-ea"/>
+        <a:cs typeface="+mn-cs"/>
+      </a:defRPr>
+    </a:lvl7pPr>
+    <a:lvl8pPr marL="3200400" algn="l" defTabSz="457200" rtl="0" eaLnBrk="1" latinLnBrk="0" hangingPunct="1">
+      <a:defRPr sz="1200" kern="1200">
+        <a:solidFill>
+          <a:schemeClr val="tx1"/>
+        </a:solidFill>
+        <a:latin typeface="+mn-lt"/>
+        <a:ea typeface="+mn-ea"/>
+        <a:cs typeface="+mn-cs"/>
+      </a:defRPr>
+    </a:lvl8pPr>
+    <a:lvl9pPr marL="3657600" algn="l" defTabSz="457200" rtl="0" eaLnBrk="1" latinLnBrk="0" hangingPunct="1">
+      <a:defRPr sz="1200" kern="1200">
+        <a:solidFill>
+          <a:schemeClr val="tx1"/>
+        </a:solidFill>
+        <a:latin typeface="+mn-lt"/>
+        <a:ea typeface="+mn-ea"/>
+        <a:cs typeface="+mn-cs"/>
+      </a:defRPr>
+    </a:lvl9pPr>
+  </p:notesStyle>
+</p:notesMaster>
 </file>
 
 <file path=ppt/slideLayouts/slideLayout1.xml><?xml version="1.0" encoding="utf-8"?>
@@ -173,10 +696,10 @@
           <a:lstStyle/>
           <a:p>
             <a:r>
-              <a:rPr lang="en-US" smtClean="0"/>
+              <a:rPr lang="en-US" dirty="0" smtClean="0"/>
               <a:t>Click to edit Master title style</a:t>
             </a:r>
-            <a:endParaRPr lang="en-ZA"/>
+            <a:endParaRPr lang="en-ZA" dirty="0"/>
           </a:p>
         </p:txBody>
       </p:sp>
@@ -245,6 +768,29 @@
           </a:p>
         </p:txBody>
       </p:sp>
+      <p:sp>
+        <p:nvSpPr>
+          <p:cNvPr id="4" name="Slide Number Placeholder 3"/>
+          <p:cNvSpPr>
+            <a:spLocks noGrp="1"/>
+          </p:cNvSpPr>
+          <p:nvPr>
+            <p:ph type="sldNum" sz="quarter" idx="10"/>
+          </p:nvPr>
+        </p:nvSpPr>
+        <p:spPr/>
+        <p:txBody>
+          <a:bodyPr/>
+          <a:lstStyle/>
+          <a:p>
+            <a:fld id="{960946CE-1557-8048-9DCC-53092B682325}" type="slidenum">
+              <a:rPr lang="en-US" smtClean="0"/>
+              <a:t>‹#›</a:t>
+            </a:fld>
+            <a:endParaRPr lang="en-US" dirty="0"/>
+          </a:p>
+        </p:txBody>
+      </p:sp>
     </p:spTree>
     <p:extLst>
       <p:ext uri="{BB962C8B-B14F-4D97-AF65-F5344CB8AC3E}">
@@ -350,6 +896,29 @@
           </a:p>
         </p:txBody>
       </p:sp>
+      <p:sp>
+        <p:nvSpPr>
+          <p:cNvPr id="4" name="Slide Number Placeholder 3"/>
+          <p:cNvSpPr>
+            <a:spLocks noGrp="1"/>
+          </p:cNvSpPr>
+          <p:nvPr>
+            <p:ph type="sldNum" sz="quarter" idx="10"/>
+          </p:nvPr>
+        </p:nvSpPr>
+        <p:spPr/>
+        <p:txBody>
+          <a:bodyPr/>
+          <a:lstStyle/>
+          <a:p>
+            <a:fld id="{960946CE-1557-8048-9DCC-53092B682325}" type="slidenum">
+              <a:rPr lang="en-US" smtClean="0"/>
+              <a:t>‹#›</a:t>
+            </a:fld>
+            <a:endParaRPr lang="en-US" dirty="0"/>
+          </a:p>
+        </p:txBody>
+      </p:sp>
     </p:spTree>
     <p:extLst>
       <p:ext uri="{BB962C8B-B14F-4D97-AF65-F5344CB8AC3E}">
@@ -567,6 +1136,29 @@
               <a:t>Fifth level</a:t>
             </a:r>
             <a:endParaRPr lang="en-ZA"/>
+          </a:p>
+        </p:txBody>
+      </p:sp>
+      <p:sp>
+        <p:nvSpPr>
+          <p:cNvPr id="4" name="Slide Number Placeholder 3"/>
+          <p:cNvSpPr>
+            <a:spLocks noGrp="1"/>
+          </p:cNvSpPr>
+          <p:nvPr>
+            <p:ph type="sldNum" sz="quarter" idx="10"/>
+          </p:nvPr>
+        </p:nvSpPr>
+        <p:spPr/>
+        <p:txBody>
+          <a:bodyPr/>
+          <a:lstStyle/>
+          <a:p>
+            <a:fld id="{960946CE-1557-8048-9DCC-53092B682325}" type="slidenum">
+              <a:rPr lang="en-US" smtClean="0"/>
+              <a:t>‹#›</a:t>
+            </a:fld>
+            <a:endParaRPr lang="en-US" dirty="0"/>
           </a:p>
         </p:txBody>
       </p:sp>
@@ -697,6 +1289,29 @@
           </a:p>
         </p:txBody>
       </p:sp>
+      <p:sp>
+        <p:nvSpPr>
+          <p:cNvPr id="4" name="Slide Number Placeholder 3"/>
+          <p:cNvSpPr>
+            <a:spLocks noGrp="1"/>
+          </p:cNvSpPr>
+          <p:nvPr>
+            <p:ph type="sldNum" sz="quarter" idx="10"/>
+          </p:nvPr>
+        </p:nvSpPr>
+        <p:spPr/>
+        <p:txBody>
+          <a:bodyPr/>
+          <a:lstStyle/>
+          <a:p>
+            <a:fld id="{960946CE-1557-8048-9DCC-53092B682325}" type="slidenum">
+              <a:rPr lang="en-US" smtClean="0"/>
+              <a:t>‹#›</a:t>
+            </a:fld>
+            <a:endParaRPr lang="en-US" dirty="0"/>
+          </a:p>
+        </p:txBody>
+      </p:sp>
     </p:spTree>
     <p:extLst>
       <p:ext uri="{BB962C8B-B14F-4D97-AF65-F5344CB8AC3E}">
@@ -917,6 +1532,29 @@
               <a:t>Fifth level</a:t>
             </a:r>
             <a:endParaRPr lang="en-ZA"/>
+          </a:p>
+        </p:txBody>
+      </p:sp>
+      <p:sp>
+        <p:nvSpPr>
+          <p:cNvPr id="5" name="Slide Number Placeholder 4"/>
+          <p:cNvSpPr>
+            <a:spLocks noGrp="1"/>
+          </p:cNvSpPr>
+          <p:nvPr>
+            <p:ph type="sldNum" sz="quarter" idx="10"/>
+          </p:nvPr>
+        </p:nvSpPr>
+        <p:spPr/>
+        <p:txBody>
+          <a:bodyPr/>
+          <a:lstStyle/>
+          <a:p>
+            <a:fld id="{960946CE-1557-8048-9DCC-53092B682325}" type="slidenum">
+              <a:rPr lang="en-US" smtClean="0"/>
+              <a:t>‹#›</a:t>
+            </a:fld>
+            <a:endParaRPr lang="en-US" dirty="0"/>
           </a:p>
         </p:txBody>
       </p:sp>
@@ -1282,6 +1920,29 @@
           </a:p>
         </p:txBody>
       </p:sp>
+      <p:sp>
+        <p:nvSpPr>
+          <p:cNvPr id="7" name="Slide Number Placeholder 6"/>
+          <p:cNvSpPr>
+            <a:spLocks noGrp="1"/>
+          </p:cNvSpPr>
+          <p:nvPr>
+            <p:ph type="sldNum" sz="quarter" idx="10"/>
+          </p:nvPr>
+        </p:nvSpPr>
+        <p:spPr/>
+        <p:txBody>
+          <a:bodyPr/>
+          <a:lstStyle/>
+          <a:p>
+            <a:fld id="{960946CE-1557-8048-9DCC-53092B682325}" type="slidenum">
+              <a:rPr lang="en-US" smtClean="0"/>
+              <a:t>‹#›</a:t>
+            </a:fld>
+            <a:endParaRPr lang="en-US" dirty="0"/>
+          </a:p>
+        </p:txBody>
+      </p:sp>
     </p:spTree>
     <p:extLst>
       <p:ext uri="{BB962C8B-B14F-4D97-AF65-F5344CB8AC3E}">
@@ -1335,6 +1996,29 @@
           </a:p>
         </p:txBody>
       </p:sp>
+      <p:sp>
+        <p:nvSpPr>
+          <p:cNvPr id="3" name="Slide Number Placeholder 2"/>
+          <p:cNvSpPr>
+            <a:spLocks noGrp="1"/>
+          </p:cNvSpPr>
+          <p:nvPr>
+            <p:ph type="sldNum" sz="quarter" idx="10"/>
+          </p:nvPr>
+        </p:nvSpPr>
+        <p:spPr/>
+        <p:txBody>
+          <a:bodyPr/>
+          <a:lstStyle/>
+          <a:p>
+            <a:fld id="{960946CE-1557-8048-9DCC-53092B682325}" type="slidenum">
+              <a:rPr lang="en-US" smtClean="0"/>
+              <a:t>‹#›</a:t>
+            </a:fld>
+            <a:endParaRPr lang="en-US" dirty="0"/>
+          </a:p>
+        </p:txBody>
+      </p:sp>
     </p:spTree>
     <p:extLst>
       <p:ext uri="{BB962C8B-B14F-4D97-AF65-F5344CB8AC3E}">
@@ -1365,6 +2049,29 @@
           <a:chExt cx="0" cy="0"/>
         </a:xfrm>
       </p:grpSpPr>
+      <p:sp>
+        <p:nvSpPr>
+          <p:cNvPr id="2" name="Slide Number Placeholder 1"/>
+          <p:cNvSpPr>
+            <a:spLocks noGrp="1"/>
+          </p:cNvSpPr>
+          <p:nvPr>
+            <p:ph type="sldNum" sz="quarter" idx="10"/>
+          </p:nvPr>
+        </p:nvSpPr>
+        <p:spPr/>
+        <p:txBody>
+          <a:bodyPr/>
+          <a:lstStyle/>
+          <a:p>
+            <a:fld id="{960946CE-1557-8048-9DCC-53092B682325}" type="slidenum">
+              <a:rPr lang="en-US" smtClean="0"/>
+              <a:t>‹#›</a:t>
+            </a:fld>
+            <a:endParaRPr lang="en-US" dirty="0"/>
+          </a:p>
+        </p:txBody>
+      </p:sp>
     </p:spTree>
     <p:extLst>
       <p:ext uri="{BB962C8B-B14F-4D97-AF65-F5344CB8AC3E}">
@@ -1577,6 +2284,29 @@
           </a:p>
         </p:txBody>
       </p:sp>
+      <p:sp>
+        <p:nvSpPr>
+          <p:cNvPr id="5" name="Slide Number Placeholder 4"/>
+          <p:cNvSpPr>
+            <a:spLocks noGrp="1"/>
+          </p:cNvSpPr>
+          <p:nvPr>
+            <p:ph type="sldNum" sz="quarter" idx="10"/>
+          </p:nvPr>
+        </p:nvSpPr>
+        <p:spPr/>
+        <p:txBody>
+          <a:bodyPr/>
+          <a:lstStyle/>
+          <a:p>
+            <a:fld id="{960946CE-1557-8048-9DCC-53092B682325}" type="slidenum">
+              <a:rPr lang="en-US" smtClean="0"/>
+              <a:t>‹#›</a:t>
+            </a:fld>
+            <a:endParaRPr lang="en-US" dirty="0"/>
+          </a:p>
+        </p:txBody>
+      </p:sp>
     </p:spTree>
     <p:extLst>
       <p:ext uri="{BB962C8B-B14F-4D97-AF65-F5344CB8AC3E}">
@@ -1770,6 +2500,29 @@
           </a:p>
         </p:txBody>
       </p:sp>
+      <p:sp>
+        <p:nvSpPr>
+          <p:cNvPr id="5" name="Slide Number Placeholder 4"/>
+          <p:cNvSpPr>
+            <a:spLocks noGrp="1"/>
+          </p:cNvSpPr>
+          <p:nvPr>
+            <p:ph type="sldNum" sz="quarter" idx="10"/>
+          </p:nvPr>
+        </p:nvSpPr>
+        <p:spPr/>
+        <p:txBody>
+          <a:bodyPr/>
+          <a:lstStyle/>
+          <a:p>
+            <a:fld id="{960946CE-1557-8048-9DCC-53092B682325}" type="slidenum">
+              <a:rPr lang="en-US" smtClean="0"/>
+              <a:t>‹#›</a:t>
+            </a:fld>
+            <a:endParaRPr lang="en-US" dirty="0"/>
+          </a:p>
+        </p:txBody>
+      </p:sp>
     </p:spTree>
     <p:extLst>
       <p:ext uri="{BB962C8B-B14F-4D97-AF65-F5344CB8AC3E}">
@@ -1835,7 +2588,7 @@
           </a:ln>
           <a:extLst>
             <a:ext uri="{909E8E84-426E-40dd-AFC4-6F175D3DCCD1}">
-              <a14:hiddenFill xmlns:a14="http://schemas.microsoft.com/office/drawing/2010/main" xmlns="">
+              <a14:hiddenFill xmlns:a14="http://schemas.microsoft.com/office/drawing/2010/main">
                 <a:noFill/>
               </a14:hiddenFill>
             </a:ext>
@@ -1873,14 +2626,14 @@
           </a:ln>
           <a:extLst>
             <a:ext uri="{909E8E84-426E-40dd-AFC4-6F175D3DCCD1}">
-              <a14:hiddenFill xmlns:a14="http://schemas.microsoft.com/office/drawing/2010/main" xmlns="">
+              <a14:hiddenFill xmlns:a14="http://schemas.microsoft.com/office/drawing/2010/main">
                 <a:solidFill>
                   <a:srgbClr val="FFFFFF"/>
                 </a:solidFill>
               </a14:hiddenFill>
             </a:ext>
             <a:ext uri="{91240B29-F687-4f45-9708-019B960494DF}">
-              <a14:hiddenLine xmlns:a14="http://schemas.microsoft.com/office/drawing/2010/main" xmlns="" w="9525">
+              <a14:hiddenLine xmlns:a14="http://schemas.microsoft.com/office/drawing/2010/main" w="9525">
                 <a:solidFill>
                   <a:srgbClr val="000000"/>
                 </a:solidFill>
@@ -1890,7 +2643,7 @@
               </a14:hiddenLine>
             </a:ext>
             <a:ext uri="{FAA26D3D-D897-4be2-8F04-BA451C77F1D7}">
-              <ma14:placeholderFlag xmlns:ma14="http://schemas.microsoft.com/office/mac/drawingml/2011/main" xmlns="" val="1"/>
+              <ma14:placeholderFlag xmlns:ma14="http://schemas.microsoft.com/office/mac/drawingml/2011/main" val="1"/>
             </a:ext>
           </a:extLst>
         </p:spPr>
@@ -1938,7 +2691,7 @@
           </a:ln>
           <a:extLst>
             <a:ext uri="{909E8E84-426E-40dd-AFC4-6F175D3DCCD1}">
-              <a14:hiddenFill xmlns:a14="http://schemas.microsoft.com/office/drawing/2010/main" xmlns="">
+              <a14:hiddenFill xmlns:a14="http://schemas.microsoft.com/office/drawing/2010/main">
                 <a:noFill/>
               </a14:hiddenFill>
             </a:ext>
@@ -1974,14 +2727,14 @@
           </a:ln>
           <a:extLst>
             <a:ext uri="{909E8E84-426E-40dd-AFC4-6F175D3DCCD1}">
-              <a14:hiddenFill xmlns:a14="http://schemas.microsoft.com/office/drawing/2010/main" xmlns="">
+              <a14:hiddenFill xmlns:a14="http://schemas.microsoft.com/office/drawing/2010/main">
                 <a:solidFill>
                   <a:srgbClr val="FFFFFF"/>
                 </a:solidFill>
               </a14:hiddenFill>
             </a:ext>
             <a:ext uri="{91240B29-F687-4f45-9708-019B960494DF}">
-              <a14:hiddenLine xmlns:a14="http://schemas.microsoft.com/office/drawing/2010/main" xmlns="" w="9525">
+              <a14:hiddenLine xmlns:a14="http://schemas.microsoft.com/office/drawing/2010/main" w="9525">
                 <a:solidFill>
                   <a:srgbClr val="000000"/>
                 </a:solidFill>
@@ -2138,14 +2891,14 @@
           </a:ln>
           <a:extLst>
             <a:ext uri="{909E8E84-426E-40dd-AFC4-6F175D3DCCD1}">
-              <a14:hiddenFill xmlns:a14="http://schemas.microsoft.com/office/drawing/2010/main" xmlns="">
+              <a14:hiddenFill xmlns:a14="http://schemas.microsoft.com/office/drawing/2010/main">
                 <a:solidFill>
                   <a:srgbClr val="FFFFFF"/>
                 </a:solidFill>
               </a14:hiddenFill>
             </a:ext>
             <a:ext uri="{91240B29-F687-4f45-9708-019B960494DF}">
-              <a14:hiddenLine xmlns:a14="http://schemas.microsoft.com/office/drawing/2010/main" xmlns="" w="9525">
+              <a14:hiddenLine xmlns:a14="http://schemas.microsoft.com/office/drawing/2010/main" w="9525">
                 <a:solidFill>
                   <a:srgbClr val="000000"/>
                 </a:solidFill>
@@ -2155,7 +2908,7 @@
               </a14:hiddenLine>
             </a:ext>
             <a:ext uri="{FAA26D3D-D897-4be2-8F04-BA451C77F1D7}">
-              <ma14:placeholderFlag xmlns:ma14="http://schemas.microsoft.com/office/mac/drawingml/2011/main" xmlns="" val="1"/>
+              <ma14:placeholderFlag xmlns:ma14="http://schemas.microsoft.com/office/mac/drawingml/2011/main" val="1"/>
             </a:ext>
           </a:extLst>
         </p:spPr>
@@ -2219,6 +2972,47 @@
           </a:prstGeom>
         </p:spPr>
       </p:pic>
+      <p:sp>
+        <p:nvSpPr>
+          <p:cNvPr id="3" name="Slide Number Placeholder 2"/>
+          <p:cNvSpPr>
+            <a:spLocks noGrp="1"/>
+          </p:cNvSpPr>
+          <p:nvPr>
+            <p:ph type="sldNum" sz="quarter" idx="4"/>
+          </p:nvPr>
+        </p:nvSpPr>
+        <p:spPr>
+          <a:xfrm>
+            <a:off x="7099300" y="6356350"/>
+            <a:ext cx="2311400" cy="365125"/>
+          </a:xfrm>
+          <a:prstGeom prst="rect">
+            <a:avLst/>
+          </a:prstGeom>
+        </p:spPr>
+        <p:txBody>
+          <a:bodyPr vert="horz" lIns="91440" tIns="45720" rIns="91440" bIns="45720" rtlCol="0" anchor="ctr"/>
+          <a:lstStyle>
+            <a:lvl1pPr algn="r">
+              <a:defRPr sz="1200">
+                <a:solidFill>
+                  <a:schemeClr val="tx1">
+                    <a:tint val="75000"/>
+                  </a:schemeClr>
+                </a:solidFill>
+              </a:defRPr>
+            </a:lvl1pPr>
+          </a:lstStyle>
+          <a:p>
+            <a:fld id="{960946CE-1557-8048-9DCC-53092B682325}" type="slidenum">
+              <a:rPr lang="en-US" smtClean="0"/>
+              <a:t>‹#›</a:t>
+            </a:fld>
+            <a:endParaRPr lang="en-US" dirty="0"/>
+          </a:p>
+        </p:txBody>
+      </p:sp>
     </p:spTree>
   </p:cSld>
   <p:clrMap bg1="lt1" tx1="dk1" bg2="lt2" tx2="dk2" accent1="accent1" accent2="accent2" accent3="accent3" accent4="accent4" accent5="accent5" accent6="accent6" hlink="hlink" folHlink="folHlink"/>
@@ -2235,6 +3029,7 @@
     <p:sldLayoutId id="2147483670" r:id="rId10"/>
     <p:sldLayoutId id="2147483671" r:id="rId11"/>
   </p:sldLayoutIdLst>
+  <p:hf hdr="0" dt="0"/>
   <p:txStyles>
     <p:titleStyle>
       <a:lvl1pPr algn="l" defTabSz="762000" rtl="0" eaLnBrk="1" fontAlgn="base" hangingPunct="1">
@@ -2765,14 +3560,14 @@
           </a:ln>
           <a:extLst>
             <a:ext uri="{909E8E84-426E-40dd-AFC4-6F175D3DCCD1}">
-              <a14:hiddenFill xmlns:a14="http://schemas.microsoft.com/office/drawing/2010/main" xmlns="">
+              <a14:hiddenFill xmlns:a14="http://schemas.microsoft.com/office/drawing/2010/main">
                 <a:solidFill>
                   <a:srgbClr val="FFFFFF"/>
                 </a:solidFill>
               </a14:hiddenFill>
             </a:ext>
             <a:ext uri="{91240B29-F687-4f45-9708-019B960494DF}">
-              <a14:hiddenLine xmlns:a14="http://schemas.microsoft.com/office/drawing/2010/main" xmlns="" w="9525">
+              <a14:hiddenLine xmlns:a14="http://schemas.microsoft.com/office/drawing/2010/main" w="9525">
                 <a:solidFill>
                   <a:srgbClr val="000000"/>
                 </a:solidFill>
@@ -2909,7 +3704,7 @@
   <p:timing>
     <p:tnLst>
       <p:par>
-        <p:cTn id="1" dur="indefinite" restart="never" nodeType="tmRoot"/>
+        <p:cTn xmlns:p14="http://schemas.microsoft.com/office/powerpoint/2010/main" id="1" dur="indefinite" restart="never" nodeType="tmRoot"/>
       </p:par>
     </p:tnLst>
   </p:timing>
@@ -2950,7 +3745,11 @@
           <a:p>
             <a:r>
               <a:rPr lang="en-ZA" dirty="0" smtClean="0"/>
-              <a:t>Results - Simulation</a:t>
+              <a:t>Results: </a:t>
+            </a:r>
+            <a:r>
+              <a:rPr lang="en-ZA" dirty="0" smtClean="0"/>
+              <a:t>Simulation</a:t>
             </a:r>
             <a:endParaRPr lang="en-ZA" dirty="0"/>
           </a:p>
@@ -2972,6 +3771,29 @@
           <a:lstStyle/>
           <a:p>
             <a:endParaRPr lang="en-ZA"/>
+          </a:p>
+        </p:txBody>
+      </p:sp>
+      <p:sp>
+        <p:nvSpPr>
+          <p:cNvPr id="4" name="Slide Number Placeholder 3"/>
+          <p:cNvSpPr>
+            <a:spLocks noGrp="1"/>
+          </p:cNvSpPr>
+          <p:nvPr>
+            <p:ph type="sldNum" sz="quarter" idx="10"/>
+          </p:nvPr>
+        </p:nvSpPr>
+        <p:spPr/>
+        <p:txBody>
+          <a:bodyPr/>
+          <a:lstStyle/>
+          <a:p>
+            <a:fld id="{960946CE-1557-8048-9DCC-53092B682325}" type="slidenum">
+              <a:rPr lang="en-US" smtClean="0"/>
+              <a:t>10</a:t>
+            </a:fld>
+            <a:endParaRPr lang="en-US" dirty="0"/>
           </a:p>
         </p:txBody>
       </p:sp>
@@ -2985,6 +3807,13 @@
   <p:clrMapOvr>
     <a:masterClrMapping/>
   </p:clrMapOvr>
+  <p:timing>
+    <p:tnLst>
+      <p:par>
+        <p:cTn xmlns:p14="http://schemas.microsoft.com/office/powerpoint/2010/main" id="1" dur="indefinite" restart="never" nodeType="tmRoot"/>
+      </p:par>
+    </p:tnLst>
+  </p:timing>
 </p:sld>
 </file>
 
@@ -3022,7 +3851,11 @@
           <a:p>
             <a:r>
               <a:rPr lang="en-ZA" dirty="0" smtClean="0"/>
-              <a:t>Results -  Hardware</a:t>
+              <a:t>Results: </a:t>
+            </a:r>
+            <a:r>
+              <a:rPr lang="en-ZA" dirty="0" smtClean="0"/>
+              <a:t>Hardware</a:t>
             </a:r>
             <a:endParaRPr lang="en-ZA" dirty="0"/>
           </a:p>
@@ -3044,6 +3877,29 @@
           <a:lstStyle/>
           <a:p>
             <a:endParaRPr lang="en-ZA"/>
+          </a:p>
+        </p:txBody>
+      </p:sp>
+      <p:sp>
+        <p:nvSpPr>
+          <p:cNvPr id="4" name="Slide Number Placeholder 3"/>
+          <p:cNvSpPr>
+            <a:spLocks noGrp="1"/>
+          </p:cNvSpPr>
+          <p:nvPr>
+            <p:ph type="sldNum" sz="quarter" idx="10"/>
+          </p:nvPr>
+        </p:nvSpPr>
+        <p:spPr/>
+        <p:txBody>
+          <a:bodyPr/>
+          <a:lstStyle/>
+          <a:p>
+            <a:fld id="{960946CE-1557-8048-9DCC-53092B682325}" type="slidenum">
+              <a:rPr lang="en-US" smtClean="0"/>
+              <a:t>11</a:t>
+            </a:fld>
+            <a:endParaRPr lang="en-US" dirty="0"/>
           </a:p>
         </p:txBody>
       </p:sp>
@@ -3057,6 +3913,13 @@
   <p:clrMapOvr>
     <a:masterClrMapping/>
   </p:clrMapOvr>
+  <p:timing>
+    <p:tnLst>
+      <p:par>
+        <p:cTn xmlns:p14="http://schemas.microsoft.com/office/powerpoint/2010/main" id="1" dur="indefinite" restart="never" nodeType="tmRoot"/>
+      </p:par>
+    </p:tnLst>
+  </p:timing>
 </p:sld>
 </file>
 
@@ -3116,6 +3979,29 @@
           <a:lstStyle/>
           <a:p>
             <a:endParaRPr lang="en-ZA"/>
+          </a:p>
+        </p:txBody>
+      </p:sp>
+      <p:sp>
+        <p:nvSpPr>
+          <p:cNvPr id="4" name="Slide Number Placeholder 3"/>
+          <p:cNvSpPr>
+            <a:spLocks noGrp="1"/>
+          </p:cNvSpPr>
+          <p:nvPr>
+            <p:ph type="sldNum" sz="quarter" idx="10"/>
+          </p:nvPr>
+        </p:nvSpPr>
+        <p:spPr/>
+        <p:txBody>
+          <a:bodyPr/>
+          <a:lstStyle/>
+          <a:p>
+            <a:fld id="{960946CE-1557-8048-9DCC-53092B682325}" type="slidenum">
+              <a:rPr lang="en-US" smtClean="0"/>
+              <a:t>12</a:t>
+            </a:fld>
+            <a:endParaRPr lang="en-US" dirty="0"/>
           </a:p>
         </p:txBody>
       </p:sp>
@@ -3191,6 +4077,29 @@
           </a:p>
         </p:txBody>
       </p:sp>
+      <p:sp>
+        <p:nvSpPr>
+          <p:cNvPr id="4" name="Slide Number Placeholder 3"/>
+          <p:cNvSpPr>
+            <a:spLocks noGrp="1"/>
+          </p:cNvSpPr>
+          <p:nvPr>
+            <p:ph type="sldNum" sz="quarter" idx="10"/>
+          </p:nvPr>
+        </p:nvSpPr>
+        <p:spPr/>
+        <p:txBody>
+          <a:bodyPr/>
+          <a:lstStyle/>
+          <a:p>
+            <a:fld id="{960946CE-1557-8048-9DCC-53092B682325}" type="slidenum">
+              <a:rPr lang="en-US" smtClean="0"/>
+              <a:t>13</a:t>
+            </a:fld>
+            <a:endParaRPr lang="en-US" dirty="0"/>
+          </a:p>
+        </p:txBody>
+      </p:sp>
     </p:spTree>
     <p:extLst>
       <p:ext uri="{BB962C8B-B14F-4D97-AF65-F5344CB8AC3E}">
@@ -3263,6 +4172,29 @@
           </a:p>
         </p:txBody>
       </p:sp>
+      <p:sp>
+        <p:nvSpPr>
+          <p:cNvPr id="4" name="Slide Number Placeholder 3"/>
+          <p:cNvSpPr>
+            <a:spLocks noGrp="1"/>
+          </p:cNvSpPr>
+          <p:nvPr>
+            <p:ph type="sldNum" sz="quarter" idx="10"/>
+          </p:nvPr>
+        </p:nvSpPr>
+        <p:spPr/>
+        <p:txBody>
+          <a:bodyPr/>
+          <a:lstStyle/>
+          <a:p>
+            <a:fld id="{960946CE-1557-8048-9DCC-53092B682325}" type="slidenum">
+              <a:rPr lang="en-US" smtClean="0"/>
+              <a:t>2</a:t>
+            </a:fld>
+            <a:endParaRPr lang="en-US" dirty="0"/>
+          </a:p>
+        </p:txBody>
+      </p:sp>
     </p:spTree>
     <p:extLst>
       <p:ext uri="{BB962C8B-B14F-4D97-AF65-F5344CB8AC3E}">
@@ -3276,7 +4208,7 @@
   <p:timing>
     <p:tnLst>
       <p:par>
-        <p:cTn id="1" dur="indefinite" restart="never" nodeType="tmRoot"/>
+        <p:cTn xmlns:p14="http://schemas.microsoft.com/office/powerpoint/2010/main" id="1" dur="indefinite" restart="never" nodeType="tmRoot"/>
       </p:par>
     </p:tnLst>
   </p:timing>
@@ -3342,6 +4274,29 @@
           </a:p>
         </p:txBody>
       </p:sp>
+      <p:sp>
+        <p:nvSpPr>
+          <p:cNvPr id="4" name="Slide Number Placeholder 3"/>
+          <p:cNvSpPr>
+            <a:spLocks noGrp="1"/>
+          </p:cNvSpPr>
+          <p:nvPr>
+            <p:ph type="sldNum" sz="quarter" idx="10"/>
+          </p:nvPr>
+        </p:nvSpPr>
+        <p:spPr/>
+        <p:txBody>
+          <a:bodyPr/>
+          <a:lstStyle/>
+          <a:p>
+            <a:fld id="{960946CE-1557-8048-9DCC-53092B682325}" type="slidenum">
+              <a:rPr lang="en-US" smtClean="0"/>
+              <a:t>3</a:t>
+            </a:fld>
+            <a:endParaRPr lang="en-US" dirty="0"/>
+          </a:p>
+        </p:txBody>
+      </p:sp>
     </p:spTree>
     <p:extLst>
       <p:ext uri="{BB962C8B-B14F-4D97-AF65-F5344CB8AC3E}">
@@ -3352,6 +4307,13 @@
   <p:clrMapOvr>
     <a:masterClrMapping/>
   </p:clrMapOvr>
+  <p:timing>
+    <p:tnLst>
+      <p:par>
+        <p:cTn xmlns:p14="http://schemas.microsoft.com/office/powerpoint/2010/main" id="1" dur="indefinite" restart="never" nodeType="tmRoot"/>
+      </p:par>
+    </p:tnLst>
+  </p:timing>
 </p:sld>
 </file>
 
@@ -3395,14 +4357,44 @@
           </a:p>
         </p:txBody>
       </p:sp>
-      <p:sp>
-        <p:nvSpPr>
-          <p:cNvPr id="3" name="Content Placeholder 2"/>
-          <p:cNvSpPr>
-            <a:spLocks noGrp="1"/>
-          </p:cNvSpPr>
-          <p:nvPr>
-            <p:ph idx="1"/>
+      <p:pic>
+        <p:nvPicPr>
+          <p:cNvPr id="4" name="Picture 3" descr="posterBlockDiagram.pdf"/>
+          <p:cNvPicPr>
+            <a:picLocks noChangeAspect="1"/>
+          </p:cNvPicPr>
+          <p:nvPr/>
+        </p:nvPicPr>
+        <p:blipFill>
+          <a:blip r:embed="rId2">
+            <a:extLst>
+              <a:ext uri="{28A0092B-C50C-407E-A947-70E740481C1C}">
+                <a14:useLocalDpi xmlns:a14="http://schemas.microsoft.com/office/drawing/2010/main" val="0"/>
+              </a:ext>
+            </a:extLst>
+          </a:blip>
+          <a:stretch>
+            <a:fillRect/>
+          </a:stretch>
+        </p:blipFill>
+        <p:spPr>
+          <a:xfrm>
+            <a:off x="0" y="1844824"/>
+            <a:ext cx="9906000" cy="4065614"/>
+          </a:xfrm>
+          <a:prstGeom prst="rect">
+            <a:avLst/>
+          </a:prstGeom>
+        </p:spPr>
+      </p:pic>
+      <p:sp>
+        <p:nvSpPr>
+          <p:cNvPr id="5" name="Slide Number Placeholder 4"/>
+          <p:cNvSpPr>
+            <a:spLocks noGrp="1"/>
+          </p:cNvSpPr>
+          <p:nvPr>
+            <p:ph type="sldNum" sz="quarter" idx="10"/>
           </p:nvPr>
         </p:nvSpPr>
         <p:spPr/>
@@ -3410,7 +4402,11 @@
           <a:bodyPr/>
           <a:lstStyle/>
           <a:p>
-            <a:endParaRPr lang="en-ZA"/>
+            <a:fld id="{960946CE-1557-8048-9DCC-53092B682325}" type="slidenum">
+              <a:rPr lang="en-US" smtClean="0"/>
+              <a:t>4</a:t>
+            </a:fld>
+            <a:endParaRPr lang="en-US" dirty="0"/>
           </a:p>
         </p:txBody>
       </p:sp>
@@ -3424,6 +4420,13 @@
   <p:clrMapOvr>
     <a:masterClrMapping/>
   </p:clrMapOvr>
+  <p:timing>
+    <p:tnLst>
+      <p:par>
+        <p:cTn xmlns:p14="http://schemas.microsoft.com/office/powerpoint/2010/main" id="1" dur="indefinite" restart="never" nodeType="tmRoot"/>
+      </p:par>
+    </p:tnLst>
+  </p:timing>
 </p:sld>
 </file>
 
@@ -3477,14 +4480,14 @@
             <p:ph idx="1"/>
             <p:extLst>
               <p:ext uri="{D42A27DB-BD31-4B8C-83A1-F6EECF244321}">
-                <p14:modId xmlns:p14="http://schemas.microsoft.com/office/powerpoint/2010/main" val="1903547720"/>
+                <p14:modId xmlns:p14="http://schemas.microsoft.com/office/powerpoint/2010/main" val="2097145294"/>
               </p:ext>
             </p:extLst>
           </p:nvPr>
         </p:nvGraphicFramePr>
         <p:xfrm>
-          <a:off x="1828800" y="2209800"/>
-          <a:ext cx="5867400" cy="3774440"/>
+          <a:off x="704529" y="1988840"/>
+          <a:ext cx="8496942" cy="4145280"/>
         </p:xfrm>
         <a:graphic>
           <a:graphicData uri="http://schemas.openxmlformats.org/drawingml/2006/table">
@@ -3493,24 +4496,24 @@
                 <a:tableStyleId>{5C22544A-7EE6-4342-B048-85BDC9FD1C3A}</a:tableStyleId>
               </a:tblPr>
               <a:tblGrid>
-                <a:gridCol w="1955800">
+                <a:gridCol w="2880319">
                   <a:extLst>
                     <a:ext uri="{9D8B030D-6E8A-4147-A177-3AD203B41FA5}">
-                      <a16:colId xmlns:a16="http://schemas.microsoft.com/office/drawing/2014/main" val="1205949033"/>
+                      <a16:colId xmlns:a16="http://schemas.microsoft.com/office/drawing/2014/main" xmlns="" val="1205949033"/>
                     </a:ext>
                   </a:extLst>
                 </a:gridCol>
-                <a:gridCol w="1955800">
+                <a:gridCol w="2448272">
                   <a:extLst>
                     <a:ext uri="{9D8B030D-6E8A-4147-A177-3AD203B41FA5}">
-                      <a16:colId xmlns:a16="http://schemas.microsoft.com/office/drawing/2014/main" val="3234676645"/>
+                      <a16:colId xmlns:a16="http://schemas.microsoft.com/office/drawing/2014/main" xmlns="" val="3234676645"/>
                     </a:ext>
                   </a:extLst>
                 </a:gridCol>
-                <a:gridCol w="1955800">
+                <a:gridCol w="3168351">
                   <a:extLst>
                     <a:ext uri="{9D8B030D-6E8A-4147-A177-3AD203B41FA5}">
-                      <a16:colId xmlns:a16="http://schemas.microsoft.com/office/drawing/2014/main" val="497167739"/>
+                      <a16:colId xmlns:a16="http://schemas.microsoft.com/office/drawing/2014/main" xmlns="" val="497167739"/>
                     </a:ext>
                   </a:extLst>
                 </a:gridCol>
@@ -3521,6 +4524,7 @@
                     <a:bodyPr/>
                     <a:lstStyle/>
                     <a:p>
+                      <a:pPr algn="ctr"/>
                       <a:r>
                         <a:rPr lang="en-ZA" dirty="0" smtClean="0"/>
                         <a:t>Property</a:t>
@@ -3535,6 +4539,7 @@
                     <a:bodyPr/>
                     <a:lstStyle/>
                     <a:p>
+                      <a:pPr algn="ctr"/>
                       <a:r>
                         <a:rPr lang="en-ZA" dirty="0" smtClean="0"/>
                         <a:t>Simulation</a:t>
@@ -3549,6 +4554,7 @@
                     <a:bodyPr/>
                     <a:lstStyle/>
                     <a:p>
+                      <a:pPr algn="ctr"/>
                       <a:r>
                         <a:rPr lang="en-ZA" dirty="0" smtClean="0"/>
                         <a:t>Hardware</a:t>
@@ -3560,7 +4566,7 @@
                 </a:tc>
                 <a:extLst>
                   <a:ext uri="{0D108BD9-81ED-4DB2-BD59-A6C34878D82A}">
-                    <a16:rowId xmlns:a16="http://schemas.microsoft.com/office/drawing/2014/main" val="3709011960"/>
+                    <a16:rowId xmlns:a16="http://schemas.microsoft.com/office/drawing/2014/main" xmlns="" val="3709011960"/>
                   </a:ext>
                 </a:extLst>
               </a:tr>
@@ -3570,13 +4576,29 @@
                     <a:bodyPr/>
                     <a:lstStyle/>
                     <a:p>
+                      <a:pPr algn="ctr"/>
                       <a:r>
-                        <a:rPr lang="en-ZA" dirty="0" smtClean="0"/>
+                        <a:rPr lang="en-ZA" b="1" dirty="0" smtClean="0"/>
                         <a:t>Number of</a:t>
                       </a:r>
                       <a:r>
-                        <a:rPr lang="en-ZA" baseline="0" dirty="0" smtClean="0"/>
+                        <a:rPr lang="en-ZA" b="1" baseline="0" dirty="0" smtClean="0"/>
                         <a:t> microphones</a:t>
+                      </a:r>
+                      <a:endParaRPr lang="en-ZA" b="1" dirty="0"/>
+                    </a:p>
+                  </a:txBody>
+                  <a:tcPr/>
+                </a:tc>
+                <a:tc>
+                  <a:txBody>
+                    <a:bodyPr/>
+                    <a:lstStyle/>
+                    <a:p>
+                      <a:pPr algn="ctr"/>
+                      <a:r>
+                        <a:rPr lang="en-ZA" dirty="0" smtClean="0"/>
+                        <a:t>10</a:t>
                       </a:r>
                       <a:endParaRPr lang="en-ZA" dirty="0"/>
                     </a:p>
@@ -3588,7 +4610,42 @@
                     <a:bodyPr/>
                     <a:lstStyle/>
                     <a:p>
+                      <a:pPr algn="ctr"/>
+                      <a:r>
+                        <a:rPr lang="en-ZA" dirty="0" smtClean="0"/>
+                        <a:t>4</a:t>
+                      </a:r>
                       <a:endParaRPr lang="en-ZA" dirty="0"/>
+                    </a:p>
+                  </a:txBody>
+                  <a:tcPr/>
+                </a:tc>
+                <a:extLst>
+                  <a:ext uri="{0D108BD9-81ED-4DB2-BD59-A6C34878D82A}">
+                    <a16:rowId xmlns:a16="http://schemas.microsoft.com/office/drawing/2014/main" xmlns="" val="4214479577"/>
+                  </a:ext>
+                </a:extLst>
+              </a:tr>
+              <a:tr h="370840">
+                <a:tc>
+                  <a:txBody>
+                    <a:bodyPr/>
+                    <a:lstStyle/>
+                    <a:p>
+                      <a:pPr algn="ctr"/>
+                      <a:r>
+                        <a:rPr lang="en-ZA" b="1" dirty="0" smtClean="0"/>
+                        <a:t>Device</a:t>
+                      </a:r>
+                      <a:r>
+                        <a:rPr lang="en-ZA" b="1" baseline="0" dirty="0" smtClean="0"/>
+                        <a:t> </a:t>
+                      </a:r>
+                      <a:r>
+                        <a:rPr lang="en-ZA" b="1" dirty="0" smtClean="0"/>
+                        <a:t>Bandwidth</a:t>
+                      </a:r>
+                      <a:endParaRPr lang="en-ZA" b="1" dirty="0"/>
                     </a:p>
                   </a:txBody>
                   <a:tcPr/>
@@ -3598,14 +4655,66 @@
                     <a:bodyPr/>
                     <a:lstStyle/>
                     <a:p>
-                      <a:endParaRPr lang="en-ZA"/>
+                      <a:pPr marL="0" marR="0" indent="0" algn="ctr" defTabSz="914400" rtl="0" eaLnBrk="1" fontAlgn="auto" latinLnBrk="0" hangingPunct="1">
+                        <a:lnSpc>
+                          <a:spcPct val="100000"/>
+                        </a:lnSpc>
+                        <a:spcBef>
+                          <a:spcPts val="0"/>
+                        </a:spcBef>
+                        <a:spcAft>
+                          <a:spcPts val="0"/>
+                        </a:spcAft>
+                        <a:buClrTx/>
+                        <a:buSzTx/>
+                        <a:buFontTx/>
+                        <a:buNone/>
+                        <a:tabLst/>
+                        <a:defRPr/>
+                      </a:pPr>
+                      <a:r>
+                        <a:rPr lang="en-US" dirty="0" smtClean="0">
+                          <a:latin typeface="+mn-lt"/>
+                        </a:rPr>
+                        <a:t>0.25</a:t>
+                      </a:r>
+                      <a:r>
+                        <a:rPr lang="mr-IN" baseline="0" dirty="0" smtClean="0">
+                          <a:latin typeface="+mn-lt"/>
+                        </a:rPr>
+                        <a:t>–</a:t>
+                      </a:r>
+                      <a:r>
+                        <a:rPr lang="en-US" baseline="0" dirty="0" smtClean="0">
+                          <a:latin typeface="+mn-lt"/>
+                        </a:rPr>
+                        <a:t>8 kHz</a:t>
+                      </a:r>
+                      <a:endParaRPr lang="mr-IN" dirty="0" smtClean="0">
+                        <a:latin typeface="+mn-lt"/>
+                      </a:endParaRPr>
+                    </a:p>
+                  </a:txBody>
+                  <a:tcPr/>
+                </a:tc>
+                <a:tc>
+                  <a:txBody>
+                    <a:bodyPr/>
+                    <a:lstStyle/>
+                    <a:p>
+                      <a:pPr algn="ctr"/>
+                      <a:r>
+                        <a:rPr lang="en-ZA" dirty="0" smtClean="0"/>
+                        <a:t>2.8-3.5 kHz and 5.6-7 kHz</a:t>
+                      </a:r>
+                      <a:endParaRPr lang="en-ZA" dirty="0"/>
                     </a:p>
                   </a:txBody>
                   <a:tcPr/>
                 </a:tc>
                 <a:extLst>
                   <a:ext uri="{0D108BD9-81ED-4DB2-BD59-A6C34878D82A}">
-                    <a16:rowId xmlns:a16="http://schemas.microsoft.com/office/drawing/2014/main" val="4214479577"/>
+                    <a16:rowId xmlns:a16="http://schemas.microsoft.com/office/drawing/2014/main" xmlns="" val="3266579009"/>
                   </a:ext>
                 </a:extLst>
               </a:tr>
@@ -3615,9 +4724,25 @@
                     <a:bodyPr/>
                     <a:lstStyle/>
                     <a:p>
+                      <a:pPr algn="ctr"/>
+                      <a:r>
+                        <a:rPr lang="en-ZA" b="1" dirty="0" smtClean="0"/>
+                        <a:t>Filter Order</a:t>
+                      </a:r>
+                      <a:endParaRPr lang="en-ZA" b="1" dirty="0"/>
+                    </a:p>
+                  </a:txBody>
+                  <a:tcPr/>
+                </a:tc>
+                <a:tc>
+                  <a:txBody>
+                    <a:bodyPr/>
+                    <a:lstStyle/>
+                    <a:p>
+                      <a:pPr algn="ctr"/>
                       <a:r>
                         <a:rPr lang="en-ZA" dirty="0" smtClean="0"/>
-                        <a:t>Bandwidth</a:t>
+                        <a:t>14</a:t>
                       </a:r>
                       <a:endParaRPr lang="en-ZA" dirty="0"/>
                     </a:p>
@@ -3629,7 +4754,34 @@
                     <a:bodyPr/>
                     <a:lstStyle/>
                     <a:p>
-                      <a:endParaRPr lang="en-ZA"/>
+                      <a:pPr algn="ctr"/>
+                      <a:r>
+                        <a:rPr lang="en-ZA" dirty="0" smtClean="0"/>
+                        <a:t>2</a:t>
+                      </a:r>
+                      <a:endParaRPr lang="en-ZA" dirty="0"/>
+                    </a:p>
+                  </a:txBody>
+                  <a:tcPr/>
+                </a:tc>
+                <a:extLst>
+                  <a:ext uri="{0D108BD9-81ED-4DB2-BD59-A6C34878D82A}">
+                    <a16:rowId xmlns:a16="http://schemas.microsoft.com/office/drawing/2014/main" xmlns="" val="282706019"/>
+                  </a:ext>
+                </a:extLst>
+              </a:tr>
+              <a:tr h="370840">
+                <a:tc>
+                  <a:txBody>
+                    <a:bodyPr/>
+                    <a:lstStyle/>
+                    <a:p>
+                      <a:pPr algn="ctr"/>
+                      <a:r>
+                        <a:rPr lang="en-ZA" b="1" dirty="0" smtClean="0"/>
+                        <a:t>Filter Bandwidth</a:t>
+                      </a:r>
+                      <a:endParaRPr lang="en-ZA" b="1" dirty="0"/>
                     </a:p>
                   </a:txBody>
                   <a:tcPr/>
@@ -3639,26 +4791,10 @@
                     <a:bodyPr/>
                     <a:lstStyle/>
                     <a:p>
-                      <a:endParaRPr lang="en-ZA"/>
-                    </a:p>
-                  </a:txBody>
-                  <a:tcPr/>
-                </a:tc>
-                <a:extLst>
-                  <a:ext uri="{0D108BD9-81ED-4DB2-BD59-A6C34878D82A}">
-                    <a16:rowId xmlns:a16="http://schemas.microsoft.com/office/drawing/2014/main" val="3266579009"/>
-                  </a:ext>
-                </a:extLst>
-              </a:tr>
-              <a:tr h="370840">
-                <a:tc>
-                  <a:txBody>
-                    <a:bodyPr/>
-                    <a:lstStyle/>
-                    <a:p>
+                      <a:pPr algn="ctr"/>
                       <a:r>
                         <a:rPr lang="en-ZA" dirty="0" smtClean="0"/>
-                        <a:t>Filter Order</a:t>
+                        <a:t>1/3 Octave</a:t>
                       </a:r>
                       <a:endParaRPr lang="en-ZA" dirty="0"/>
                     </a:p>
@@ -3670,7 +4806,33 @@
                     <a:bodyPr/>
                     <a:lstStyle/>
                     <a:p>
-                      <a:endParaRPr lang="en-ZA"/>
+                      <a:pPr algn="ctr"/>
+                      <a:r>
+                        <a:rPr lang="en-ZA" dirty="0" smtClean="0"/>
+                        <a:t>1/3 Octave</a:t>
+                      </a:r>
+                      <a:endParaRPr lang="en-ZA" dirty="0"/>
+                    </a:p>
+                  </a:txBody>
+                  <a:tcPr/>
+                </a:tc>
+              </a:tr>
+              <a:tr h="370840">
+                <a:tc>
+                  <a:txBody>
+                    <a:bodyPr/>
+                    <a:lstStyle/>
+                    <a:p>
+                      <a:pPr algn="ctr"/>
+                      <a:r>
+                        <a:rPr lang="en-ZA" b="1" dirty="0" smtClean="0"/>
+                        <a:t>Types</a:t>
+                      </a:r>
+                      <a:r>
+                        <a:rPr lang="en-ZA" b="1" baseline="0" dirty="0" smtClean="0"/>
+                        <a:t> of filters</a:t>
+                      </a:r>
+                      <a:endParaRPr lang="en-ZA" b="1" dirty="0"/>
                     </a:p>
                   </a:txBody>
                   <a:tcPr/>
@@ -3680,30 +4842,10 @@
                     <a:bodyPr/>
                     <a:lstStyle/>
                     <a:p>
-                      <a:endParaRPr lang="en-ZA"/>
-                    </a:p>
-                  </a:txBody>
-                  <a:tcPr/>
-                </a:tc>
-                <a:extLst>
-                  <a:ext uri="{0D108BD9-81ED-4DB2-BD59-A6C34878D82A}">
-                    <a16:rowId xmlns:a16="http://schemas.microsoft.com/office/drawing/2014/main" val="282706019"/>
-                  </a:ext>
-                </a:extLst>
-              </a:tr>
-              <a:tr h="370840">
-                <a:tc>
-                  <a:txBody>
-                    <a:bodyPr/>
-                    <a:lstStyle/>
-                    <a:p>
-                      <a:r>
-                        <a:rPr lang="en-ZA" dirty="0" smtClean="0"/>
-                        <a:t>Types</a:t>
-                      </a:r>
+                      <a:pPr algn="ctr"/>
                       <a:r>
                         <a:rPr lang="en-ZA" baseline="0" dirty="0" smtClean="0"/>
-                        <a:t> of filters</a:t>
+                        <a:t>Butterworth FIR bandpass</a:t>
                       </a:r>
                       <a:endParaRPr lang="en-ZA" dirty="0"/>
                     </a:p>
@@ -3715,7 +4857,38 @@
                     <a:bodyPr/>
                     <a:lstStyle/>
                     <a:p>
+                      <a:pPr algn="ctr"/>
+                      <a:r>
+                        <a:rPr lang="en-ZA" dirty="0" smtClean="0"/>
+                        <a:t>Butterworth bandpass</a:t>
+                      </a:r>
                       <a:endParaRPr lang="en-ZA" dirty="0"/>
+                    </a:p>
+                  </a:txBody>
+                  <a:tcPr/>
+                </a:tc>
+                <a:extLst>
+                  <a:ext uri="{0D108BD9-81ED-4DB2-BD59-A6C34878D82A}">
+                    <a16:rowId xmlns:a16="http://schemas.microsoft.com/office/drawing/2014/main" xmlns="" val="1081411160"/>
+                  </a:ext>
+                </a:extLst>
+              </a:tr>
+              <a:tr h="370840">
+                <a:tc>
+                  <a:txBody>
+                    <a:bodyPr/>
+                    <a:lstStyle/>
+                    <a:p>
+                      <a:pPr algn="ctr"/>
+                      <a:r>
+                        <a:rPr lang="en-ZA" b="1" dirty="0" smtClean="0"/>
+                        <a:t>Number of </a:t>
+                      </a:r>
+                      <a:r>
+                        <a:rPr lang="en-ZA" b="1" dirty="0" smtClean="0"/>
+                        <a:t>filters</a:t>
+                      </a:r>
+                      <a:endParaRPr lang="en-ZA" b="1" dirty="0"/>
                     </a:p>
                   </a:txBody>
                   <a:tcPr/>
@@ -3725,26 +4898,10 @@
                     <a:bodyPr/>
                     <a:lstStyle/>
                     <a:p>
-                      <a:endParaRPr lang="en-ZA"/>
-                    </a:p>
-                  </a:txBody>
-                  <a:tcPr/>
-                </a:tc>
-                <a:extLst>
-                  <a:ext uri="{0D108BD9-81ED-4DB2-BD59-A6C34878D82A}">
-                    <a16:rowId xmlns:a16="http://schemas.microsoft.com/office/drawing/2014/main" val="1081411160"/>
-                  </a:ext>
-                </a:extLst>
-              </a:tr>
-              <a:tr h="370840">
-                <a:tc>
-                  <a:txBody>
-                    <a:bodyPr/>
-                    <a:lstStyle/>
-                    <a:p>
+                      <a:pPr algn="ctr"/>
                       <a:r>
                         <a:rPr lang="en-ZA" dirty="0" smtClean="0"/>
-                        <a:t>Number of filters</a:t>
+                        <a:t>16 per microphone</a:t>
                       </a:r>
                       <a:endParaRPr lang="en-ZA" dirty="0"/>
                     </a:p>
@@ -3756,7 +4913,49 @@
                     <a:bodyPr/>
                     <a:lstStyle/>
                     <a:p>
-                      <a:endParaRPr lang="en-ZA"/>
+                      <a:pPr marL="0" marR="0" indent="0" algn="ctr" defTabSz="914400" rtl="0" eaLnBrk="1" fontAlgn="auto" latinLnBrk="0" hangingPunct="1">
+                        <a:lnSpc>
+                          <a:spcPct val="100000"/>
+                        </a:lnSpc>
+                        <a:spcBef>
+                          <a:spcPts val="0"/>
+                        </a:spcBef>
+                        <a:spcAft>
+                          <a:spcPts val="0"/>
+                        </a:spcAft>
+                        <a:buClrTx/>
+                        <a:buSzTx/>
+                        <a:buFontTx/>
+                        <a:buNone/>
+                        <a:tabLst/>
+                        <a:defRPr/>
+                      </a:pPr>
+                      <a:r>
+                        <a:rPr lang="en-ZA" dirty="0" smtClean="0"/>
+                        <a:t>2 per microphone</a:t>
+                      </a:r>
+                    </a:p>
+                  </a:txBody>
+                  <a:tcPr/>
+                </a:tc>
+                <a:extLst>
+                  <a:ext uri="{0D108BD9-81ED-4DB2-BD59-A6C34878D82A}">
+                    <a16:rowId xmlns:a16="http://schemas.microsoft.com/office/drawing/2014/main" xmlns="" val="2210005012"/>
+                  </a:ext>
+                </a:extLst>
+              </a:tr>
+              <a:tr h="370840">
+                <a:tc>
+                  <a:txBody>
+                    <a:bodyPr/>
+                    <a:lstStyle/>
+                    <a:p>
+                      <a:pPr algn="ctr"/>
+                      <a:r>
+                        <a:rPr lang="en-ZA" b="1" dirty="0" smtClean="0"/>
+                        <a:t>Number of steerable angles</a:t>
+                      </a:r>
+                      <a:endParaRPr lang="en-ZA" b="1" dirty="0"/>
                     </a:p>
                   </a:txBody>
                   <a:tcPr/>
@@ -3766,26 +4965,26 @@
                     <a:bodyPr/>
                     <a:lstStyle/>
                     <a:p>
-                      <a:endParaRPr lang="en-ZA"/>
-                    </a:p>
-                  </a:txBody>
-                  <a:tcPr/>
-                </a:tc>
-                <a:extLst>
-                  <a:ext uri="{0D108BD9-81ED-4DB2-BD59-A6C34878D82A}">
-                    <a16:rowId xmlns:a16="http://schemas.microsoft.com/office/drawing/2014/main" val="2210005012"/>
-                  </a:ext>
-                </a:extLst>
-              </a:tr>
-              <a:tr h="370840">
-                <a:tc>
-                  <a:txBody>
-                    <a:bodyPr/>
-                    <a:lstStyle/>
-                    <a:p>
+                      <a:pPr algn="ctr"/>
                       <a:r>
                         <a:rPr lang="en-ZA" dirty="0" smtClean="0"/>
-                        <a:t>Number of steerable angles</a:t>
+                        <a:t>19 (10</a:t>
+                      </a:r>
+                      <a:r>
+                        <a:rPr lang="en-US" b="1" i="0" dirty="0" smtClean="0">
+                          <a:latin typeface="Lucida Grande"/>
+                          <a:ea typeface="Lucida Grande"/>
+                          <a:cs typeface="Lucida Grande"/>
+                        </a:rPr>
+                        <a:t>° </a:t>
+                      </a:r>
+                      <a:r>
+                        <a:rPr lang="en-US" b="0" i="0" dirty="0" smtClean="0">
+                          <a:latin typeface="+mn-lt"/>
+                          <a:ea typeface="Lucida Grande"/>
+                          <a:cs typeface="Lucida Grande"/>
+                        </a:rPr>
+                        <a:t>increments)</a:t>
                       </a:r>
                       <a:endParaRPr lang="en-ZA" dirty="0"/>
                     </a:p>
@@ -3797,7 +4996,90 @@
                     <a:bodyPr/>
                     <a:lstStyle/>
                     <a:p>
-                      <a:endParaRPr lang="en-ZA"/>
+                      <a:pPr marL="0" marR="0" indent="0" algn="ctr" defTabSz="914400" rtl="0" eaLnBrk="1" fontAlgn="auto" latinLnBrk="0" hangingPunct="1">
+                        <a:lnSpc>
+                          <a:spcPct val="100000"/>
+                        </a:lnSpc>
+                        <a:spcBef>
+                          <a:spcPts val="0"/>
+                        </a:spcBef>
+                        <a:spcAft>
+                          <a:spcPts val="0"/>
+                        </a:spcAft>
+                        <a:buClrTx/>
+                        <a:buSzTx/>
+                        <a:buFontTx/>
+                        <a:buNone/>
+                        <a:tabLst/>
+                        <a:defRPr/>
+                      </a:pPr>
+                      <a:r>
+                        <a:rPr lang="en-ZA" dirty="0" smtClean="0"/>
+                        <a:t>5 (0</a:t>
+                      </a:r>
+                      <a:r>
+                        <a:rPr lang="en-US" b="1" i="0" dirty="0" smtClean="0">
+                          <a:latin typeface="Lucida Grande"/>
+                          <a:ea typeface="Lucida Grande"/>
+                          <a:cs typeface="Lucida Grande"/>
+                        </a:rPr>
+                        <a:t>°, </a:t>
+                      </a:r>
+                      <a:r>
+                        <a:rPr lang="en-ZA" b="0" i="0" dirty="0" smtClean="0">
+                          <a:latin typeface="+mn-lt"/>
+                          <a:ea typeface="+mn-ea"/>
+                          <a:cs typeface="+mn-cs"/>
+                        </a:rPr>
+                        <a:t>6</a:t>
+                      </a:r>
+                      <a:r>
+                        <a:rPr lang="en-ZA" dirty="0" smtClean="0"/>
+                        <a:t>0</a:t>
+                      </a:r>
+                      <a:r>
+                        <a:rPr lang="en-US" b="1" i="0" dirty="0" smtClean="0">
+                          <a:latin typeface="Lucida Grande"/>
+                          <a:ea typeface="Lucida Grande"/>
+                          <a:cs typeface="Lucida Grande"/>
+                        </a:rPr>
+                        <a:t>°</a:t>
+                      </a:r>
+                      <a:r>
+                        <a:rPr lang="en-US" b="0" i="0" dirty="0" smtClean="0">
+                          <a:latin typeface="+mn-lt"/>
+                          <a:ea typeface="Lucida Grande"/>
+                          <a:cs typeface="Lucida Grande"/>
+                        </a:rPr>
+                        <a:t>, 90°, 120°, 180°)</a:t>
+                      </a:r>
+                      <a:endParaRPr lang="en-ZA" dirty="0" smtClean="0"/>
+                    </a:p>
+                  </a:txBody>
+                  <a:tcPr/>
+                </a:tc>
+                <a:extLst>
+                  <a:ext uri="{0D108BD9-81ED-4DB2-BD59-A6C34878D82A}">
+                    <a16:rowId xmlns:a16="http://schemas.microsoft.com/office/drawing/2014/main" xmlns="" val="1840919378"/>
+                  </a:ext>
+                </a:extLst>
+              </a:tr>
+              <a:tr h="370840">
+                <a:tc>
+                  <a:txBody>
+                    <a:bodyPr/>
+                    <a:lstStyle/>
+                    <a:p>
+                      <a:pPr algn="ctr"/>
+                      <a:r>
+                        <a:rPr lang="en-ZA" b="1" dirty="0" smtClean="0"/>
+                        <a:t>Real time data</a:t>
+                      </a:r>
+                      <a:r>
+                        <a:rPr lang="en-ZA" b="1" baseline="0" dirty="0" smtClean="0"/>
+                        <a:t> acquisition</a:t>
+                      </a:r>
+                      <a:endParaRPr lang="en-ZA" b="1" dirty="0"/>
                     </a:p>
                   </a:txBody>
                   <a:tcPr/>
@@ -3807,30 +5089,10 @@
                     <a:bodyPr/>
                     <a:lstStyle/>
                     <a:p>
-                      <a:endParaRPr lang="en-ZA"/>
-                    </a:p>
-                  </a:txBody>
-                  <a:tcPr/>
-                </a:tc>
-                <a:extLst>
-                  <a:ext uri="{0D108BD9-81ED-4DB2-BD59-A6C34878D82A}">
-                    <a16:rowId xmlns:a16="http://schemas.microsoft.com/office/drawing/2014/main" val="1840919378"/>
-                  </a:ext>
-                </a:extLst>
-              </a:tr>
-              <a:tr h="370840">
-                <a:tc>
-                  <a:txBody>
-                    <a:bodyPr/>
-                    <a:lstStyle/>
-                    <a:p>
+                      <a:pPr algn="ctr"/>
                       <a:r>
                         <a:rPr lang="en-ZA" dirty="0" smtClean="0"/>
-                        <a:t>Real time data</a:t>
-                      </a:r>
-                      <a:r>
-                        <a:rPr lang="en-ZA" baseline="0" dirty="0" smtClean="0"/>
-                        <a:t> acquisition</a:t>
+                        <a:t>No</a:t>
                       </a:r>
                       <a:endParaRPr lang="en-ZA" dirty="0"/>
                     </a:p>
@@ -3842,16 +5104,11 @@
                     <a:bodyPr/>
                     <a:lstStyle/>
                     <a:p>
-                      <a:endParaRPr lang="en-ZA"/>
-                    </a:p>
-                  </a:txBody>
-                  <a:tcPr/>
-                </a:tc>
-                <a:tc>
-                  <a:txBody>
-                    <a:bodyPr/>
-                    <a:lstStyle/>
-                    <a:p>
+                      <a:pPr algn="ctr"/>
+                      <a:r>
+                        <a:rPr lang="en-ZA" dirty="0" smtClean="0"/>
+                        <a:t>Yes</a:t>
+                      </a:r>
                       <a:endParaRPr lang="en-ZA" dirty="0"/>
                     </a:p>
                   </a:txBody>
@@ -3859,7 +5116,7 @@
                 </a:tc>
                 <a:extLst>
                   <a:ext uri="{0D108BD9-81ED-4DB2-BD59-A6C34878D82A}">
-                    <a16:rowId xmlns:a16="http://schemas.microsoft.com/office/drawing/2014/main" val="1275340913"/>
+                    <a16:rowId xmlns:a16="http://schemas.microsoft.com/office/drawing/2014/main" xmlns="" val="1275340913"/>
                   </a:ext>
                 </a:extLst>
               </a:tr>
@@ -3867,6 +5124,29 @@
           </a:graphicData>
         </a:graphic>
       </p:graphicFrame>
+      <p:sp>
+        <p:nvSpPr>
+          <p:cNvPr id="3" name="Slide Number Placeholder 2"/>
+          <p:cNvSpPr>
+            <a:spLocks noGrp="1"/>
+          </p:cNvSpPr>
+          <p:nvPr>
+            <p:ph type="sldNum" sz="quarter" idx="10"/>
+          </p:nvPr>
+        </p:nvSpPr>
+        <p:spPr/>
+        <p:txBody>
+          <a:bodyPr/>
+          <a:lstStyle/>
+          <a:p>
+            <a:fld id="{960946CE-1557-8048-9DCC-53092B682325}" type="slidenum">
+              <a:rPr lang="en-US" smtClean="0"/>
+              <a:t>5</a:t>
+            </a:fld>
+            <a:endParaRPr lang="en-US" dirty="0"/>
+          </a:p>
+        </p:txBody>
+      </p:sp>
     </p:spTree>
     <p:extLst>
       <p:ext uri="{BB962C8B-B14F-4D97-AF65-F5344CB8AC3E}">
@@ -3877,6 +5157,13 @@
   <p:clrMapOvr>
     <a:masterClrMapping/>
   </p:clrMapOvr>
+  <p:timing>
+    <p:tnLst>
+      <p:par>
+        <p:cTn xmlns:p14="http://schemas.microsoft.com/office/powerpoint/2010/main" id="1" dur="indefinite" restart="never" nodeType="tmRoot"/>
+      </p:par>
+    </p:tnLst>
+  </p:timing>
 </p:sld>
 </file>
 
@@ -3939,6 +5226,29 @@
           </a:p>
         </p:txBody>
       </p:sp>
+      <p:sp>
+        <p:nvSpPr>
+          <p:cNvPr id="4" name="Slide Number Placeholder 3"/>
+          <p:cNvSpPr>
+            <a:spLocks noGrp="1"/>
+          </p:cNvSpPr>
+          <p:nvPr>
+            <p:ph type="sldNum" sz="quarter" idx="10"/>
+          </p:nvPr>
+        </p:nvSpPr>
+        <p:spPr/>
+        <p:txBody>
+          <a:bodyPr/>
+          <a:lstStyle/>
+          <a:p>
+            <a:fld id="{960946CE-1557-8048-9DCC-53092B682325}" type="slidenum">
+              <a:rPr lang="en-US" smtClean="0"/>
+              <a:t>6</a:t>
+            </a:fld>
+            <a:endParaRPr lang="en-US" dirty="0"/>
+          </a:p>
+        </p:txBody>
+      </p:sp>
     </p:spTree>
     <p:extLst>
       <p:ext uri="{BB962C8B-B14F-4D97-AF65-F5344CB8AC3E}">
@@ -3949,6 +5259,13 @@
   <p:clrMapOvr>
     <a:masterClrMapping/>
   </p:clrMapOvr>
+  <p:timing>
+    <p:tnLst>
+      <p:par>
+        <p:cTn xmlns:p14="http://schemas.microsoft.com/office/powerpoint/2010/main" id="1" dur="indefinite" restart="never" nodeType="tmRoot"/>
+      </p:par>
+    </p:tnLst>
+  </p:timing>
 </p:sld>
 </file>
 
@@ -4011,6 +5328,29 @@
           </a:p>
         </p:txBody>
       </p:sp>
+      <p:sp>
+        <p:nvSpPr>
+          <p:cNvPr id="4" name="Slide Number Placeholder 3"/>
+          <p:cNvSpPr>
+            <a:spLocks noGrp="1"/>
+          </p:cNvSpPr>
+          <p:nvPr>
+            <p:ph type="sldNum" sz="quarter" idx="10"/>
+          </p:nvPr>
+        </p:nvSpPr>
+        <p:spPr/>
+        <p:txBody>
+          <a:bodyPr/>
+          <a:lstStyle/>
+          <a:p>
+            <a:fld id="{960946CE-1557-8048-9DCC-53092B682325}" type="slidenum">
+              <a:rPr lang="en-US" smtClean="0"/>
+              <a:t>7</a:t>
+            </a:fld>
+            <a:endParaRPr lang="en-US" dirty="0"/>
+          </a:p>
+        </p:txBody>
+      </p:sp>
     </p:spTree>
     <p:extLst>
       <p:ext uri="{BB962C8B-B14F-4D97-AF65-F5344CB8AC3E}">
@@ -4021,6 +5361,13 @@
   <p:clrMapOvr>
     <a:masterClrMapping/>
   </p:clrMapOvr>
+  <p:timing>
+    <p:tnLst>
+      <p:par>
+        <p:cTn xmlns:p14="http://schemas.microsoft.com/office/powerpoint/2010/main" id="1" dur="indefinite" restart="never" nodeType="tmRoot"/>
+      </p:par>
+    </p:tnLst>
+  </p:timing>
 </p:sld>
 </file>
 
@@ -4083,6 +5430,29 @@
           </a:p>
         </p:txBody>
       </p:sp>
+      <p:sp>
+        <p:nvSpPr>
+          <p:cNvPr id="4" name="Slide Number Placeholder 3"/>
+          <p:cNvSpPr>
+            <a:spLocks noGrp="1"/>
+          </p:cNvSpPr>
+          <p:nvPr>
+            <p:ph type="sldNum" sz="quarter" idx="10"/>
+          </p:nvPr>
+        </p:nvSpPr>
+        <p:spPr/>
+        <p:txBody>
+          <a:bodyPr/>
+          <a:lstStyle/>
+          <a:p>
+            <a:fld id="{960946CE-1557-8048-9DCC-53092B682325}" type="slidenum">
+              <a:rPr lang="en-US" smtClean="0"/>
+              <a:t>8</a:t>
+            </a:fld>
+            <a:endParaRPr lang="en-US" dirty="0"/>
+          </a:p>
+        </p:txBody>
+      </p:sp>
     </p:spTree>
     <p:extLst>
       <p:ext uri="{BB962C8B-B14F-4D97-AF65-F5344CB8AC3E}">
@@ -4093,6 +5463,13 @@
   <p:clrMapOvr>
     <a:masterClrMapping/>
   </p:clrMapOvr>
+  <p:timing>
+    <p:tnLst>
+      <p:par>
+        <p:cTn xmlns:p14="http://schemas.microsoft.com/office/powerpoint/2010/main" id="1" dur="indefinite" restart="never" nodeType="tmRoot"/>
+      </p:par>
+    </p:tnLst>
+  </p:timing>
 </p:sld>
 </file>
 
@@ -4155,6 +5532,29 @@
           </a:p>
         </p:txBody>
       </p:sp>
+      <p:sp>
+        <p:nvSpPr>
+          <p:cNvPr id="4" name="Slide Number Placeholder 3"/>
+          <p:cNvSpPr>
+            <a:spLocks noGrp="1"/>
+          </p:cNvSpPr>
+          <p:nvPr>
+            <p:ph type="sldNum" sz="quarter" idx="10"/>
+          </p:nvPr>
+        </p:nvSpPr>
+        <p:spPr/>
+        <p:txBody>
+          <a:bodyPr/>
+          <a:lstStyle/>
+          <a:p>
+            <a:fld id="{960946CE-1557-8048-9DCC-53092B682325}" type="slidenum">
+              <a:rPr lang="en-US" smtClean="0"/>
+              <a:t>9</a:t>
+            </a:fld>
+            <a:endParaRPr lang="en-US" dirty="0"/>
+          </a:p>
+        </p:txBody>
+      </p:sp>
     </p:spTree>
     <p:extLst>
       <p:ext uri="{BB962C8B-B14F-4D97-AF65-F5344CB8AC3E}">
@@ -4165,6 +5565,13 @@
   <p:clrMapOvr>
     <a:masterClrMapping/>
   </p:clrMapOvr>
+  <p:timing>
+    <p:tnLst>
+      <p:par>
+        <p:cTn xmlns:p14="http://schemas.microsoft.com/office/powerpoint/2010/main" id="1" dur="indefinite" restart="never" nodeType="tmRoot"/>
+      </p:par>
+    </p:tnLst>
+  </p:timing>
 </p:sld>
 </file>
 
@@ -4412,7 +5819,7 @@
         <a:effectLst/>
         <a:extLst>
           <a:ext uri="{91240B29-F687-4f45-9708-019B960494DF}">
-            <a14:hiddenLine xmlns:a14="http://schemas.microsoft.com/office/drawing/2010/main" xmlns="" w="9525" cap="flat" cmpd="sng" algn="ctr">
+            <a14:hiddenLine xmlns:a14="http://schemas.microsoft.com/office/drawing/2010/main" w="9525" cap="flat" cmpd="sng" algn="ctr">
               <a:solidFill>
                 <a:schemeClr val="tx1"/>
               </a:solidFill>
@@ -4423,7 +5830,7 @@
             </a14:hiddenLine>
           </a:ext>
           <a:ext uri="{AF507438-7753-43e0-B8FC-AC1667EBCBE1}">
-            <a14:hiddenEffects xmlns:a14="http://schemas.microsoft.com/office/drawing/2010/main" xmlns="">
+            <a14:hiddenEffects xmlns:a14="http://schemas.microsoft.com/office/drawing/2010/main">
               <a:effectLst>
                 <a:outerShdw dist="35921" dir="2700000" algn="ctr" rotWithShape="0">
                   <a:schemeClr val="bg2"/>
@@ -4490,7 +5897,7 @@
         <a:effectLst/>
         <a:extLst>
           <a:ext uri="{91240B29-F687-4f45-9708-019B960494DF}">
-            <a14:hiddenLine xmlns:a14="http://schemas.microsoft.com/office/drawing/2010/main" xmlns="" w="9525" cap="flat" cmpd="sng" algn="ctr">
+            <a14:hiddenLine xmlns:a14="http://schemas.microsoft.com/office/drawing/2010/main" w="9525" cap="flat" cmpd="sng" algn="ctr">
               <a:solidFill>
                 <a:schemeClr val="tx1"/>
               </a:solidFill>
@@ -4501,7 +5908,7 @@
             </a14:hiddenLine>
           </a:ext>
           <a:ext uri="{AF507438-7753-43e0-B8FC-AC1667EBCBE1}">
-            <a14:hiddenEffects xmlns:a14="http://schemas.microsoft.com/office/drawing/2010/main" xmlns="">
+            <a14:hiddenEffects xmlns:a14="http://schemas.microsoft.com/office/drawing/2010/main">
               <a:effectLst>
                 <a:outerShdw dist="35921" dir="2700000" algn="ctr" rotWithShape="0">
                   <a:schemeClr val="bg2"/>
@@ -4918,4 +6325,644 @@
     </a:extraClrScheme>
   </a:extraClrSchemeLst>
 </a:theme>
+</file>
+
+<file path=ppt/theme/theme2.xml><?xml version="1.0" encoding="utf-8"?>
+<a:theme xmlns:a="http://schemas.openxmlformats.org/drawingml/2006/main" name="Office Theme">
+  <a:themeElements>
+    <a:clrScheme name="Office">
+      <a:dk1>
+        <a:sysClr val="windowText" lastClr="000000"/>
+      </a:dk1>
+      <a:lt1>
+        <a:sysClr val="window" lastClr="FFFFFF"/>
+      </a:lt1>
+      <a:dk2>
+        <a:srgbClr val="1F497D"/>
+      </a:dk2>
+      <a:lt2>
+        <a:srgbClr val="EEECE1"/>
+      </a:lt2>
+      <a:accent1>
+        <a:srgbClr val="4F81BD"/>
+      </a:accent1>
+      <a:accent2>
+        <a:srgbClr val="C0504D"/>
+      </a:accent2>
+      <a:accent3>
+        <a:srgbClr val="9BBB59"/>
+      </a:accent3>
+      <a:accent4>
+        <a:srgbClr val="8064A2"/>
+      </a:accent4>
+      <a:accent5>
+        <a:srgbClr val="4BACC6"/>
+      </a:accent5>
+      <a:accent6>
+        <a:srgbClr val="F79646"/>
+      </a:accent6>
+      <a:hlink>
+        <a:srgbClr val="0000FF"/>
+      </a:hlink>
+      <a:folHlink>
+        <a:srgbClr val="800080"/>
+      </a:folHlink>
+    </a:clrScheme>
+    <a:fontScheme name="Office">
+      <a:majorFont>
+        <a:latin typeface="Calibri"/>
+        <a:ea typeface=""/>
+        <a:cs typeface=""/>
+        <a:font script="Jpan" typeface="ＭＳ Ｐゴシック"/>
+        <a:font script="Hang" typeface="맑은 고딕"/>
+        <a:font script="Hans" typeface="宋体"/>
+        <a:font script="Hant" typeface="新細明體"/>
+        <a:font script="Arab" typeface="Times New Roman"/>
+        <a:font script="Hebr" typeface="Times New Roman"/>
+        <a:font script="Thai" typeface="Angsana New"/>
+        <a:font script="Ethi" typeface="Nyala"/>
+        <a:font script="Beng" typeface="Vrinda"/>
+        <a:font script="Gujr" typeface="Shruti"/>
+        <a:font script="Khmr" typeface="MoolBoran"/>
+        <a:font script="Knda" typeface="Tunga"/>
+        <a:font script="Guru" typeface="Raavi"/>
+        <a:font script="Cans" typeface="Euphemia"/>
+        <a:font script="Cher" typeface="Plantagenet Cherokee"/>
+        <a:font script="Yiii" typeface="Microsoft Yi Baiti"/>
+        <a:font script="Tibt" typeface="Microsoft Himalaya"/>
+        <a:font script="Thaa" typeface="MV Boli"/>
+        <a:font script="Deva" typeface="Mangal"/>
+        <a:font script="Telu" typeface="Gautami"/>
+        <a:font script="Taml" typeface="Latha"/>
+        <a:font script="Syrc" typeface="Estrangelo Edessa"/>
+        <a:font script="Orya" typeface="Kalinga"/>
+        <a:font script="Mlym" typeface="Kartika"/>
+        <a:font script="Laoo" typeface="DokChampa"/>
+        <a:font script="Sinh" typeface="Iskoola Pota"/>
+        <a:font script="Mong" typeface="Mongolian Baiti"/>
+        <a:font script="Viet" typeface="Times New Roman"/>
+        <a:font script="Uigh" typeface="Microsoft Uighur"/>
+        <a:font script="Geor" typeface="Sylfaen"/>
+      </a:majorFont>
+      <a:minorFont>
+        <a:latin typeface="Calibri"/>
+        <a:ea typeface=""/>
+        <a:cs typeface=""/>
+        <a:font script="Jpan" typeface="ＭＳ Ｐゴシック"/>
+        <a:font script="Hang" typeface="맑은 고딕"/>
+        <a:font script="Hans" typeface="宋体"/>
+        <a:font script="Hant" typeface="新細明體"/>
+        <a:font script="Arab" typeface="Arial"/>
+        <a:font script="Hebr" typeface="Arial"/>
+        <a:font script="Thai" typeface="Cordia New"/>
+        <a:font script="Ethi" typeface="Nyala"/>
+        <a:font script="Beng" typeface="Vrinda"/>
+        <a:font script="Gujr" typeface="Shruti"/>
+        <a:font script="Khmr" typeface="DaunPenh"/>
+        <a:font script="Knda" typeface="Tunga"/>
+        <a:font script="Guru" typeface="Raavi"/>
+        <a:font script="Cans" typeface="Euphemia"/>
+        <a:font script="Cher" typeface="Plantagenet Cherokee"/>
+        <a:font script="Yiii" typeface="Microsoft Yi Baiti"/>
+        <a:font script="Tibt" typeface="Microsoft Himalaya"/>
+        <a:font script="Thaa" typeface="MV Boli"/>
+        <a:font script="Deva" typeface="Mangal"/>
+        <a:font script="Telu" typeface="Gautami"/>
+        <a:font script="Taml" typeface="Latha"/>
+        <a:font script="Syrc" typeface="Estrangelo Edessa"/>
+        <a:font script="Orya" typeface="Kalinga"/>
+        <a:font script="Mlym" typeface="Kartika"/>
+        <a:font script="Laoo" typeface="DokChampa"/>
+        <a:font script="Sinh" typeface="Iskoola Pota"/>
+        <a:font script="Mong" typeface="Mongolian Baiti"/>
+        <a:font script="Viet" typeface="Arial"/>
+        <a:font script="Uigh" typeface="Microsoft Uighur"/>
+        <a:font script="Geor" typeface="Sylfaen"/>
+      </a:minorFont>
+    </a:fontScheme>
+    <a:fmtScheme name="Office">
+      <a:fillStyleLst>
+        <a:solidFill>
+          <a:schemeClr val="phClr"/>
+        </a:solidFill>
+        <a:gradFill rotWithShape="1">
+          <a:gsLst>
+            <a:gs pos="0">
+              <a:schemeClr val="phClr">
+                <a:tint val="50000"/>
+                <a:satMod val="300000"/>
+              </a:schemeClr>
+            </a:gs>
+            <a:gs pos="35000">
+              <a:schemeClr val="phClr">
+                <a:tint val="37000"/>
+                <a:satMod val="300000"/>
+              </a:schemeClr>
+            </a:gs>
+            <a:gs pos="100000">
+              <a:schemeClr val="phClr">
+                <a:tint val="15000"/>
+                <a:satMod val="350000"/>
+              </a:schemeClr>
+            </a:gs>
+          </a:gsLst>
+          <a:lin ang="16200000" scaled="1"/>
+        </a:gradFill>
+        <a:gradFill rotWithShape="1">
+          <a:gsLst>
+            <a:gs pos="0">
+              <a:schemeClr val="phClr">
+                <a:tint val="100000"/>
+                <a:shade val="100000"/>
+                <a:satMod val="130000"/>
+              </a:schemeClr>
+            </a:gs>
+            <a:gs pos="100000">
+              <a:schemeClr val="phClr">
+                <a:tint val="50000"/>
+                <a:shade val="100000"/>
+                <a:satMod val="350000"/>
+              </a:schemeClr>
+            </a:gs>
+          </a:gsLst>
+          <a:lin ang="16200000" scaled="0"/>
+        </a:gradFill>
+      </a:fillStyleLst>
+      <a:lnStyleLst>
+        <a:ln w="9525" cap="flat" cmpd="sng" algn="ctr">
+          <a:solidFill>
+            <a:schemeClr val="phClr">
+              <a:shade val="95000"/>
+              <a:satMod val="105000"/>
+            </a:schemeClr>
+          </a:solidFill>
+          <a:prstDash val="solid"/>
+        </a:ln>
+        <a:ln w="25400" cap="flat" cmpd="sng" algn="ctr">
+          <a:solidFill>
+            <a:schemeClr val="phClr"/>
+          </a:solidFill>
+          <a:prstDash val="solid"/>
+        </a:ln>
+        <a:ln w="38100" cap="flat" cmpd="sng" algn="ctr">
+          <a:solidFill>
+            <a:schemeClr val="phClr"/>
+          </a:solidFill>
+          <a:prstDash val="solid"/>
+        </a:ln>
+      </a:lnStyleLst>
+      <a:effectStyleLst>
+        <a:effectStyle>
+          <a:effectLst>
+            <a:outerShdw blurRad="40000" dist="20000" dir="5400000" rotWithShape="0">
+              <a:srgbClr val="000000">
+                <a:alpha val="38000"/>
+              </a:srgbClr>
+            </a:outerShdw>
+          </a:effectLst>
+        </a:effectStyle>
+        <a:effectStyle>
+          <a:effectLst>
+            <a:outerShdw blurRad="40000" dist="23000" dir="5400000" rotWithShape="0">
+              <a:srgbClr val="000000">
+                <a:alpha val="35000"/>
+              </a:srgbClr>
+            </a:outerShdw>
+          </a:effectLst>
+        </a:effectStyle>
+        <a:effectStyle>
+          <a:effectLst>
+            <a:outerShdw blurRad="40000" dist="23000" dir="5400000" rotWithShape="0">
+              <a:srgbClr val="000000">
+                <a:alpha val="35000"/>
+              </a:srgbClr>
+            </a:outerShdw>
+          </a:effectLst>
+          <a:scene3d>
+            <a:camera prst="orthographicFront">
+              <a:rot lat="0" lon="0" rev="0"/>
+            </a:camera>
+            <a:lightRig rig="threePt" dir="t">
+              <a:rot lat="0" lon="0" rev="1200000"/>
+            </a:lightRig>
+          </a:scene3d>
+          <a:sp3d>
+            <a:bevelT w="63500" h="25400"/>
+          </a:sp3d>
+        </a:effectStyle>
+      </a:effectStyleLst>
+      <a:bgFillStyleLst>
+        <a:solidFill>
+          <a:schemeClr val="phClr"/>
+        </a:solidFill>
+        <a:gradFill rotWithShape="1">
+          <a:gsLst>
+            <a:gs pos="0">
+              <a:schemeClr val="phClr">
+                <a:tint val="40000"/>
+                <a:satMod val="350000"/>
+              </a:schemeClr>
+            </a:gs>
+            <a:gs pos="40000">
+              <a:schemeClr val="phClr">
+                <a:tint val="45000"/>
+                <a:shade val="99000"/>
+                <a:satMod val="350000"/>
+              </a:schemeClr>
+            </a:gs>
+            <a:gs pos="100000">
+              <a:schemeClr val="phClr">
+                <a:shade val="20000"/>
+                <a:satMod val="255000"/>
+              </a:schemeClr>
+            </a:gs>
+          </a:gsLst>
+          <a:path path="circle">
+            <a:fillToRect l="50000" t="-80000" r="50000" b="180000"/>
+          </a:path>
+        </a:gradFill>
+        <a:gradFill rotWithShape="1">
+          <a:gsLst>
+            <a:gs pos="0">
+              <a:schemeClr val="phClr">
+                <a:tint val="80000"/>
+                <a:satMod val="300000"/>
+              </a:schemeClr>
+            </a:gs>
+            <a:gs pos="100000">
+              <a:schemeClr val="phClr">
+                <a:shade val="30000"/>
+                <a:satMod val="200000"/>
+              </a:schemeClr>
+            </a:gs>
+          </a:gsLst>
+          <a:path path="circle">
+            <a:fillToRect l="50000" t="50000" r="50000" b="50000"/>
+          </a:path>
+        </a:gradFill>
+      </a:bgFillStyleLst>
+    </a:fmtScheme>
+  </a:themeElements>
+  <a:objectDefaults>
+    <a:spDef>
+      <a:spPr/>
+      <a:bodyPr/>
+      <a:lstStyle/>
+      <a:style>
+        <a:lnRef idx="1">
+          <a:schemeClr val="accent1"/>
+        </a:lnRef>
+        <a:fillRef idx="3">
+          <a:schemeClr val="accent1"/>
+        </a:fillRef>
+        <a:effectRef idx="2">
+          <a:schemeClr val="accent1"/>
+        </a:effectRef>
+        <a:fontRef idx="minor">
+          <a:schemeClr val="lt1"/>
+        </a:fontRef>
+      </a:style>
+    </a:spDef>
+    <a:lnDef>
+      <a:spPr/>
+      <a:bodyPr/>
+      <a:lstStyle/>
+      <a:style>
+        <a:lnRef idx="2">
+          <a:schemeClr val="accent1"/>
+        </a:lnRef>
+        <a:fillRef idx="0">
+          <a:schemeClr val="accent1"/>
+        </a:fillRef>
+        <a:effectRef idx="1">
+          <a:schemeClr val="accent1"/>
+        </a:effectRef>
+        <a:fontRef idx="minor">
+          <a:schemeClr val="tx1"/>
+        </a:fontRef>
+      </a:style>
+    </a:lnDef>
+  </a:objectDefaults>
+  <a:extraClrSchemeLst/>
+</a:theme>
+</file>
+
+<file path=ppt/theme/theme3.xml><?xml version="1.0" encoding="utf-8"?>
+<a:theme xmlns:a="http://schemas.openxmlformats.org/drawingml/2006/main" name="Office Theme">
+  <a:themeElements>
+    <a:clrScheme name="Office">
+      <a:dk1>
+        <a:sysClr val="windowText" lastClr="000000"/>
+      </a:dk1>
+      <a:lt1>
+        <a:sysClr val="window" lastClr="FFFFFF"/>
+      </a:lt1>
+      <a:dk2>
+        <a:srgbClr val="1F497D"/>
+      </a:dk2>
+      <a:lt2>
+        <a:srgbClr val="EEECE1"/>
+      </a:lt2>
+      <a:accent1>
+        <a:srgbClr val="4F81BD"/>
+      </a:accent1>
+      <a:accent2>
+        <a:srgbClr val="C0504D"/>
+      </a:accent2>
+      <a:accent3>
+        <a:srgbClr val="9BBB59"/>
+      </a:accent3>
+      <a:accent4>
+        <a:srgbClr val="8064A2"/>
+      </a:accent4>
+      <a:accent5>
+        <a:srgbClr val="4BACC6"/>
+      </a:accent5>
+      <a:accent6>
+        <a:srgbClr val="F79646"/>
+      </a:accent6>
+      <a:hlink>
+        <a:srgbClr val="0000FF"/>
+      </a:hlink>
+      <a:folHlink>
+        <a:srgbClr val="800080"/>
+      </a:folHlink>
+    </a:clrScheme>
+    <a:fontScheme name="Office">
+      <a:majorFont>
+        <a:latin typeface="Calibri"/>
+        <a:ea typeface=""/>
+        <a:cs typeface=""/>
+        <a:font script="Jpan" typeface="ＭＳ Ｐゴシック"/>
+        <a:font script="Hang" typeface="맑은 고딕"/>
+        <a:font script="Hans" typeface="宋体"/>
+        <a:font script="Hant" typeface="新細明體"/>
+        <a:font script="Arab" typeface="Times New Roman"/>
+        <a:font script="Hebr" typeface="Times New Roman"/>
+        <a:font script="Thai" typeface="Angsana New"/>
+        <a:font script="Ethi" typeface="Nyala"/>
+        <a:font script="Beng" typeface="Vrinda"/>
+        <a:font script="Gujr" typeface="Shruti"/>
+        <a:font script="Khmr" typeface="MoolBoran"/>
+        <a:font script="Knda" typeface="Tunga"/>
+        <a:font script="Guru" typeface="Raavi"/>
+        <a:font script="Cans" typeface="Euphemia"/>
+        <a:font script="Cher" typeface="Plantagenet Cherokee"/>
+        <a:font script="Yiii" typeface="Microsoft Yi Baiti"/>
+        <a:font script="Tibt" typeface="Microsoft Himalaya"/>
+        <a:font script="Thaa" typeface="MV Boli"/>
+        <a:font script="Deva" typeface="Mangal"/>
+        <a:font script="Telu" typeface="Gautami"/>
+        <a:font script="Taml" typeface="Latha"/>
+        <a:font script="Syrc" typeface="Estrangelo Edessa"/>
+        <a:font script="Orya" typeface="Kalinga"/>
+        <a:font script="Mlym" typeface="Kartika"/>
+        <a:font script="Laoo" typeface="DokChampa"/>
+        <a:font script="Sinh" typeface="Iskoola Pota"/>
+        <a:font script="Mong" typeface="Mongolian Baiti"/>
+        <a:font script="Viet" typeface="Times New Roman"/>
+        <a:font script="Uigh" typeface="Microsoft Uighur"/>
+        <a:font script="Geor" typeface="Sylfaen"/>
+      </a:majorFont>
+      <a:minorFont>
+        <a:latin typeface="Calibri"/>
+        <a:ea typeface=""/>
+        <a:cs typeface=""/>
+        <a:font script="Jpan" typeface="ＭＳ Ｐゴシック"/>
+        <a:font script="Hang" typeface="맑은 고딕"/>
+        <a:font script="Hans" typeface="宋体"/>
+        <a:font script="Hant" typeface="新細明體"/>
+        <a:font script="Arab" typeface="Arial"/>
+        <a:font script="Hebr" typeface="Arial"/>
+        <a:font script="Thai" typeface="Cordia New"/>
+        <a:font script="Ethi" typeface="Nyala"/>
+        <a:font script="Beng" typeface="Vrinda"/>
+        <a:font script="Gujr" typeface="Shruti"/>
+        <a:font script="Khmr" typeface="DaunPenh"/>
+        <a:font script="Knda" typeface="Tunga"/>
+        <a:font script="Guru" typeface="Raavi"/>
+        <a:font script="Cans" typeface="Euphemia"/>
+        <a:font script="Cher" typeface="Plantagenet Cherokee"/>
+        <a:font script="Yiii" typeface="Microsoft Yi Baiti"/>
+        <a:font script="Tibt" typeface="Microsoft Himalaya"/>
+        <a:font script="Thaa" typeface="MV Boli"/>
+        <a:font script="Deva" typeface="Mangal"/>
+        <a:font script="Telu" typeface="Gautami"/>
+        <a:font script="Taml" typeface="Latha"/>
+        <a:font script="Syrc" typeface="Estrangelo Edessa"/>
+        <a:font script="Orya" typeface="Kalinga"/>
+        <a:font script="Mlym" typeface="Kartika"/>
+        <a:font script="Laoo" typeface="DokChampa"/>
+        <a:font script="Sinh" typeface="Iskoola Pota"/>
+        <a:font script="Mong" typeface="Mongolian Baiti"/>
+        <a:font script="Viet" typeface="Arial"/>
+        <a:font script="Uigh" typeface="Microsoft Uighur"/>
+        <a:font script="Geor" typeface="Sylfaen"/>
+      </a:minorFont>
+    </a:fontScheme>
+    <a:fmtScheme name="Office">
+      <a:fillStyleLst>
+        <a:solidFill>
+          <a:schemeClr val="phClr"/>
+        </a:solidFill>
+        <a:gradFill rotWithShape="1">
+          <a:gsLst>
+            <a:gs pos="0">
+              <a:schemeClr val="phClr">
+                <a:tint val="50000"/>
+                <a:satMod val="300000"/>
+              </a:schemeClr>
+            </a:gs>
+            <a:gs pos="35000">
+              <a:schemeClr val="phClr">
+                <a:tint val="37000"/>
+                <a:satMod val="300000"/>
+              </a:schemeClr>
+            </a:gs>
+            <a:gs pos="100000">
+              <a:schemeClr val="phClr">
+                <a:tint val="15000"/>
+                <a:satMod val="350000"/>
+              </a:schemeClr>
+            </a:gs>
+          </a:gsLst>
+          <a:lin ang="16200000" scaled="1"/>
+        </a:gradFill>
+        <a:gradFill rotWithShape="1">
+          <a:gsLst>
+            <a:gs pos="0">
+              <a:schemeClr val="phClr">
+                <a:tint val="100000"/>
+                <a:shade val="100000"/>
+                <a:satMod val="130000"/>
+              </a:schemeClr>
+            </a:gs>
+            <a:gs pos="100000">
+              <a:schemeClr val="phClr">
+                <a:tint val="50000"/>
+                <a:shade val="100000"/>
+                <a:satMod val="350000"/>
+              </a:schemeClr>
+            </a:gs>
+          </a:gsLst>
+          <a:lin ang="16200000" scaled="0"/>
+        </a:gradFill>
+      </a:fillStyleLst>
+      <a:lnStyleLst>
+        <a:ln w="9525" cap="flat" cmpd="sng" algn="ctr">
+          <a:solidFill>
+            <a:schemeClr val="phClr">
+              <a:shade val="95000"/>
+              <a:satMod val="105000"/>
+            </a:schemeClr>
+          </a:solidFill>
+          <a:prstDash val="solid"/>
+        </a:ln>
+        <a:ln w="25400" cap="flat" cmpd="sng" algn="ctr">
+          <a:solidFill>
+            <a:schemeClr val="phClr"/>
+          </a:solidFill>
+          <a:prstDash val="solid"/>
+        </a:ln>
+        <a:ln w="38100" cap="flat" cmpd="sng" algn="ctr">
+          <a:solidFill>
+            <a:schemeClr val="phClr"/>
+          </a:solidFill>
+          <a:prstDash val="solid"/>
+        </a:ln>
+      </a:lnStyleLst>
+      <a:effectStyleLst>
+        <a:effectStyle>
+          <a:effectLst>
+            <a:outerShdw blurRad="40000" dist="20000" dir="5400000" rotWithShape="0">
+              <a:srgbClr val="000000">
+                <a:alpha val="38000"/>
+              </a:srgbClr>
+            </a:outerShdw>
+          </a:effectLst>
+        </a:effectStyle>
+        <a:effectStyle>
+          <a:effectLst>
+            <a:outerShdw blurRad="40000" dist="23000" dir="5400000" rotWithShape="0">
+              <a:srgbClr val="000000">
+                <a:alpha val="35000"/>
+              </a:srgbClr>
+            </a:outerShdw>
+          </a:effectLst>
+        </a:effectStyle>
+        <a:effectStyle>
+          <a:effectLst>
+            <a:outerShdw blurRad="40000" dist="23000" dir="5400000" rotWithShape="0">
+              <a:srgbClr val="000000">
+                <a:alpha val="35000"/>
+              </a:srgbClr>
+            </a:outerShdw>
+          </a:effectLst>
+          <a:scene3d>
+            <a:camera prst="orthographicFront">
+              <a:rot lat="0" lon="0" rev="0"/>
+            </a:camera>
+            <a:lightRig rig="threePt" dir="t">
+              <a:rot lat="0" lon="0" rev="1200000"/>
+            </a:lightRig>
+          </a:scene3d>
+          <a:sp3d>
+            <a:bevelT w="63500" h="25400"/>
+          </a:sp3d>
+        </a:effectStyle>
+      </a:effectStyleLst>
+      <a:bgFillStyleLst>
+        <a:solidFill>
+          <a:schemeClr val="phClr"/>
+        </a:solidFill>
+        <a:gradFill rotWithShape="1">
+          <a:gsLst>
+            <a:gs pos="0">
+              <a:schemeClr val="phClr">
+                <a:tint val="40000"/>
+                <a:satMod val="350000"/>
+              </a:schemeClr>
+            </a:gs>
+            <a:gs pos="40000">
+              <a:schemeClr val="phClr">
+                <a:tint val="45000"/>
+                <a:shade val="99000"/>
+                <a:satMod val="350000"/>
+              </a:schemeClr>
+            </a:gs>
+            <a:gs pos="100000">
+              <a:schemeClr val="phClr">
+                <a:shade val="20000"/>
+                <a:satMod val="255000"/>
+              </a:schemeClr>
+            </a:gs>
+          </a:gsLst>
+          <a:path path="circle">
+            <a:fillToRect l="50000" t="-80000" r="50000" b="180000"/>
+          </a:path>
+        </a:gradFill>
+        <a:gradFill rotWithShape="1">
+          <a:gsLst>
+            <a:gs pos="0">
+              <a:schemeClr val="phClr">
+                <a:tint val="80000"/>
+                <a:satMod val="300000"/>
+              </a:schemeClr>
+            </a:gs>
+            <a:gs pos="100000">
+              <a:schemeClr val="phClr">
+                <a:shade val="30000"/>
+                <a:satMod val="200000"/>
+              </a:schemeClr>
+            </a:gs>
+          </a:gsLst>
+          <a:path path="circle">
+            <a:fillToRect l="50000" t="50000" r="50000" b="50000"/>
+          </a:path>
+        </a:gradFill>
+      </a:bgFillStyleLst>
+    </a:fmtScheme>
+  </a:themeElements>
+  <a:objectDefaults>
+    <a:spDef>
+      <a:spPr/>
+      <a:bodyPr/>
+      <a:lstStyle/>
+      <a:style>
+        <a:lnRef idx="1">
+          <a:schemeClr val="accent1"/>
+        </a:lnRef>
+        <a:fillRef idx="3">
+          <a:schemeClr val="accent1"/>
+        </a:fillRef>
+        <a:effectRef idx="2">
+          <a:schemeClr val="accent1"/>
+        </a:effectRef>
+        <a:fontRef idx="minor">
+          <a:schemeClr val="lt1"/>
+        </a:fontRef>
+      </a:style>
+    </a:spDef>
+    <a:lnDef>
+      <a:spPr/>
+      <a:bodyPr/>
+      <a:lstStyle/>
+      <a:style>
+        <a:lnRef idx="2">
+          <a:schemeClr val="accent1"/>
+        </a:lnRef>
+        <a:fillRef idx="0">
+          <a:schemeClr val="accent1"/>
+        </a:fillRef>
+        <a:effectRef idx="1">
+          <a:schemeClr val="accent1"/>
+        </a:effectRef>
+        <a:fontRef idx="minor">
+          <a:schemeClr val="tx1"/>
+        </a:fontRef>
+      </a:style>
+    </a:lnDef>
+  </a:objectDefaults>
+  <a:extraClrSchemeLst/>
+</a:theme>
 </file>
</xml_diff>

<commit_message>
Edited table and compensatory gain
</commit_message>
<xml_diff>
--- a/Presentation/Lab Project Presentation.pptx
+++ b/Presentation/Lab Project Presentation.pptx
@@ -127,7 +127,7 @@
   </p:defaultTextStyle>
   <p:extLst>
     <p:ext uri="{EFAFB233-063F-42B5-8137-9DF3F51BA10A}">
-      <p15:sldGuideLst xmlns:p15="http://schemas.microsoft.com/office/powerpoint/2012/main">
+      <p15:sldGuideLst xmlns="" xmlns:p15="http://schemas.microsoft.com/office/powerpoint/2012/main">
         <p15:guide id="1" orient="horz" pos="2160">
           <p15:clr>
             <a:srgbClr val="A4A3A4"/>
@@ -231,7 +231,7 @@
           <a:p>
             <a:fld id="{3FA6FDA4-907F-C840-8573-33F4849B33D4}" type="datetimeFigureOut">
               <a:rPr lang="en-US" smtClean="0"/>
-              <a:t>9/4/2018</a:t>
+              <a:t>18/09/04</a:t>
             </a:fld>
             <a:endParaRPr lang="en-US"/>
           </a:p>
@@ -397,7 +397,7 @@
           <a:p>
             <a:fld id="{290492DD-1613-8B48-9182-1ECEE9190ABB}" type="datetimeFigureOut">
               <a:rPr lang="en-US" smtClean="0"/>
-              <a:t>9/4/2018</a:t>
+              <a:t>18/09/04</a:t>
             </a:fld>
             <a:endParaRPr lang="en-US"/>
           </a:p>
@@ -666,6 +666,227 @@
 </p:notesMaster>
 </file>
 
+<file path=ppt/notesSlides/notesSlide1.xml><?xml version="1.0" encoding="utf-8"?>
+<p:notes xmlns:a="http://schemas.openxmlformats.org/drawingml/2006/main" xmlns:r="http://schemas.openxmlformats.org/officeDocument/2006/relationships" xmlns:p="http://schemas.openxmlformats.org/presentationml/2006/main">
+  <p:cSld>
+    <p:spTree>
+      <p:nvGrpSpPr>
+        <p:cNvPr id="1" name=""/>
+        <p:cNvGrpSpPr/>
+        <p:nvPr/>
+      </p:nvGrpSpPr>
+      <p:grpSpPr>
+        <a:xfrm>
+          <a:off x="0" y="0"/>
+          <a:ext cx="0" cy="0"/>
+          <a:chOff x="0" y="0"/>
+          <a:chExt cx="0" cy="0"/>
+        </a:xfrm>
+      </p:grpSpPr>
+      <p:sp>
+        <p:nvSpPr>
+          <p:cNvPr id="2" name="Slide Image Placeholder 1"/>
+          <p:cNvSpPr>
+            <a:spLocks noGrp="1" noRot="1" noChangeAspect="1"/>
+          </p:cNvSpPr>
+          <p:nvPr>
+            <p:ph type="sldImg"/>
+          </p:nvPr>
+        </p:nvSpPr>
+        <p:spPr/>
+      </p:sp>
+      <p:sp>
+        <p:nvSpPr>
+          <p:cNvPr id="3" name="Notes Placeholder 2"/>
+          <p:cNvSpPr>
+            <a:spLocks noGrp="1"/>
+          </p:cNvSpPr>
+          <p:nvPr>
+            <p:ph type="body" idx="1"/>
+          </p:nvPr>
+        </p:nvSpPr>
+        <p:spPr/>
+        <p:txBody>
+          <a:bodyPr/>
+          <a:lstStyle/>
+          <a:p>
+            <a:r>
+              <a:rPr lang="en-US" dirty="0" smtClean="0"/>
+              <a:t>Independent amplification</a:t>
+            </a:r>
+          </a:p>
+          <a:p>
+            <a:pPr lvl="1"/>
+            <a:r>
+              <a:rPr lang="en-US" dirty="0" smtClean="0"/>
+              <a:t>Band-by-band basis</a:t>
+            </a:r>
+          </a:p>
+          <a:p>
+            <a:r>
+              <a:rPr lang="en-US" dirty="0" smtClean="0"/>
+              <a:t>Audiogram matching</a:t>
+            </a:r>
+          </a:p>
+          <a:p>
+            <a:pPr lvl="1"/>
+            <a:r>
+              <a:rPr lang="en-US" dirty="0" smtClean="0"/>
+              <a:t>Requires interpolation of audiogram</a:t>
+            </a:r>
+          </a:p>
+          <a:p>
+            <a:pPr lvl="1"/>
+            <a:r>
+              <a:rPr lang="en-US" dirty="0" smtClean="0"/>
+              <a:t>Unique for an individual</a:t>
+            </a:r>
+          </a:p>
+          <a:p>
+            <a:endParaRPr lang="en-US" dirty="0"/>
+          </a:p>
+        </p:txBody>
+      </p:sp>
+      <p:sp>
+        <p:nvSpPr>
+          <p:cNvPr id="4" name="Slide Number Placeholder 3"/>
+          <p:cNvSpPr>
+            <a:spLocks noGrp="1"/>
+          </p:cNvSpPr>
+          <p:nvPr>
+            <p:ph type="sldNum" sz="quarter" idx="10"/>
+          </p:nvPr>
+        </p:nvSpPr>
+        <p:spPr/>
+        <p:txBody>
+          <a:bodyPr/>
+          <a:lstStyle/>
+          <a:p>
+            <a:fld id="{36236DF1-55A4-5143-AE5D-F9A532F68BCC}" type="slidenum">
+              <a:rPr lang="en-US" smtClean="0"/>
+              <a:t>6</a:t>
+            </a:fld>
+            <a:endParaRPr lang="en-US"/>
+          </a:p>
+        </p:txBody>
+      </p:sp>
+    </p:spTree>
+    <p:extLst>
+      <p:ext uri="{BB962C8B-B14F-4D97-AF65-F5344CB8AC3E}">
+        <p14:creationId xmlns:p14="http://schemas.microsoft.com/office/powerpoint/2010/main" val="903335089"/>
+      </p:ext>
+    </p:extLst>
+  </p:cSld>
+  <p:clrMapOvr>
+    <a:masterClrMapping/>
+  </p:clrMapOvr>
+</p:notes>
+</file>
+
+<file path=ppt/notesSlides/notesSlide2.xml><?xml version="1.0" encoding="utf-8"?>
+<p:notes xmlns:a="http://schemas.openxmlformats.org/drawingml/2006/main" xmlns:r="http://schemas.openxmlformats.org/officeDocument/2006/relationships" xmlns:p="http://schemas.openxmlformats.org/presentationml/2006/main">
+  <p:cSld>
+    <p:spTree>
+      <p:nvGrpSpPr>
+        <p:cNvPr id="1" name=""/>
+        <p:cNvGrpSpPr/>
+        <p:nvPr/>
+      </p:nvGrpSpPr>
+      <p:grpSpPr>
+        <a:xfrm>
+          <a:off x="0" y="0"/>
+          <a:ext cx="0" cy="0"/>
+          <a:chOff x="0" y="0"/>
+          <a:chExt cx="0" cy="0"/>
+        </a:xfrm>
+      </p:grpSpPr>
+      <p:sp>
+        <p:nvSpPr>
+          <p:cNvPr id="2" name="Slide Image Placeholder 1"/>
+          <p:cNvSpPr>
+            <a:spLocks noGrp="1" noRot="1" noChangeAspect="1"/>
+          </p:cNvSpPr>
+          <p:nvPr>
+            <p:ph type="sldImg"/>
+          </p:nvPr>
+        </p:nvSpPr>
+        <p:spPr/>
+      </p:sp>
+      <p:sp>
+        <p:nvSpPr>
+          <p:cNvPr id="3" name="Notes Placeholder 2"/>
+          <p:cNvSpPr>
+            <a:spLocks noGrp="1"/>
+          </p:cNvSpPr>
+          <p:nvPr>
+            <p:ph type="body" idx="1"/>
+          </p:nvPr>
+        </p:nvSpPr>
+        <p:spPr/>
+        <p:txBody>
+          <a:bodyPr/>
+          <a:lstStyle/>
+          <a:p>
+            <a:r>
+              <a:rPr lang="en-US" dirty="0" smtClean="0"/>
+              <a:t>Large</a:t>
+            </a:r>
+            <a:r>
+              <a:rPr lang="en-US" baseline="0" dirty="0" smtClean="0"/>
+              <a:t> </a:t>
+            </a:r>
+            <a:r>
+              <a:rPr lang="en-US" baseline="0" dirty="0" err="1" smtClean="0"/>
+              <a:t>omni</a:t>
+            </a:r>
+            <a:r>
+              <a:rPr lang="en-US" baseline="0" dirty="0" smtClean="0"/>
+              <a:t> error due to </a:t>
+            </a:r>
+            <a:r>
+              <a:rPr lang="en-US" baseline="0" dirty="0" err="1" smtClean="0"/>
+              <a:t>mics</a:t>
+            </a:r>
+            <a:endParaRPr lang="en-US" dirty="0"/>
+          </a:p>
+        </p:txBody>
+      </p:sp>
+      <p:sp>
+        <p:nvSpPr>
+          <p:cNvPr id="4" name="Slide Number Placeholder 3"/>
+          <p:cNvSpPr>
+            <a:spLocks noGrp="1"/>
+          </p:cNvSpPr>
+          <p:nvPr>
+            <p:ph type="sldNum" sz="quarter" idx="10"/>
+          </p:nvPr>
+        </p:nvSpPr>
+        <p:spPr/>
+        <p:txBody>
+          <a:bodyPr/>
+          <a:lstStyle/>
+          <a:p>
+            <a:fld id="{36236DF1-55A4-5143-AE5D-F9A532F68BCC}" type="slidenum">
+              <a:rPr lang="en-US" smtClean="0"/>
+              <a:t>14</a:t>
+            </a:fld>
+            <a:endParaRPr lang="en-US"/>
+          </a:p>
+        </p:txBody>
+      </p:sp>
+    </p:spTree>
+    <p:extLst>
+      <p:ext uri="{BB962C8B-B14F-4D97-AF65-F5344CB8AC3E}">
+        <p14:creationId xmlns:p14="http://schemas.microsoft.com/office/powerpoint/2010/main" val="3258243237"/>
+      </p:ext>
+    </p:extLst>
+  </p:cSld>
+  <p:clrMapOvr>
+    <a:masterClrMapping/>
+  </p:clrMapOvr>
+</p:notes>
+</file>
+
 <file path=ppt/slideLayouts/slideLayout1.xml><?xml version="1.0" encoding="utf-8"?>
 <p:sldLayout xmlns:a="http://schemas.openxmlformats.org/drawingml/2006/main" xmlns:r="http://schemas.openxmlformats.org/officeDocument/2006/relationships" xmlns:p="http://schemas.openxmlformats.org/presentationml/2006/main" type="title" preserve="1">
   <p:cSld name="Title Slide">
@@ -2596,7 +2817,7 @@
           </a:ln>
           <a:extLst>
             <a:ext uri="{909E8E84-426E-40dd-AFC4-6F175D3DCCD1}">
-              <a14:hiddenFill xmlns:a14="http://schemas.microsoft.com/office/drawing/2010/main" xmlns="">
+              <a14:hiddenFill xmlns:a14="http://schemas.microsoft.com/office/drawing/2010/main">
                 <a:noFill/>
               </a14:hiddenFill>
             </a:ext>
@@ -2634,14 +2855,14 @@
           </a:ln>
           <a:extLst>
             <a:ext uri="{909E8E84-426E-40dd-AFC4-6F175D3DCCD1}">
-              <a14:hiddenFill xmlns:a14="http://schemas.microsoft.com/office/drawing/2010/main" xmlns="">
+              <a14:hiddenFill xmlns:a14="http://schemas.microsoft.com/office/drawing/2010/main">
                 <a:solidFill>
                   <a:srgbClr val="FFFFFF"/>
                 </a:solidFill>
               </a14:hiddenFill>
             </a:ext>
             <a:ext uri="{91240B29-F687-4f45-9708-019B960494DF}">
-              <a14:hiddenLine xmlns:a14="http://schemas.microsoft.com/office/drawing/2010/main" xmlns="" w="9525">
+              <a14:hiddenLine xmlns:a14="http://schemas.microsoft.com/office/drawing/2010/main" w="9525">
                 <a:solidFill>
                   <a:srgbClr val="000000"/>
                 </a:solidFill>
@@ -2651,7 +2872,7 @@
               </a14:hiddenLine>
             </a:ext>
             <a:ext uri="{FAA26D3D-D897-4be2-8F04-BA451C77F1D7}">
-              <ma14:placeholderFlag xmlns:ma14="http://schemas.microsoft.com/office/mac/drawingml/2011/main" xmlns="" val="1"/>
+              <ma14:placeholderFlag xmlns:ma14="http://schemas.microsoft.com/office/mac/drawingml/2011/main" val="1"/>
             </a:ext>
           </a:extLst>
         </p:spPr>
@@ -2699,7 +2920,7 @@
           </a:ln>
           <a:extLst>
             <a:ext uri="{909E8E84-426E-40dd-AFC4-6F175D3DCCD1}">
-              <a14:hiddenFill xmlns:a14="http://schemas.microsoft.com/office/drawing/2010/main" xmlns="">
+              <a14:hiddenFill xmlns:a14="http://schemas.microsoft.com/office/drawing/2010/main">
                 <a:noFill/>
               </a14:hiddenFill>
             </a:ext>
@@ -2735,14 +2956,14 @@
           </a:ln>
           <a:extLst>
             <a:ext uri="{909E8E84-426E-40dd-AFC4-6F175D3DCCD1}">
-              <a14:hiddenFill xmlns:a14="http://schemas.microsoft.com/office/drawing/2010/main" xmlns="">
+              <a14:hiddenFill xmlns:a14="http://schemas.microsoft.com/office/drawing/2010/main">
                 <a:solidFill>
                   <a:srgbClr val="FFFFFF"/>
                 </a:solidFill>
               </a14:hiddenFill>
             </a:ext>
             <a:ext uri="{91240B29-F687-4f45-9708-019B960494DF}">
-              <a14:hiddenLine xmlns:a14="http://schemas.microsoft.com/office/drawing/2010/main" xmlns="" w="9525">
+              <a14:hiddenLine xmlns:a14="http://schemas.microsoft.com/office/drawing/2010/main" w="9525">
                 <a:solidFill>
                   <a:srgbClr val="000000"/>
                 </a:solidFill>
@@ -2899,14 +3120,14 @@
           </a:ln>
           <a:extLst>
             <a:ext uri="{909E8E84-426E-40dd-AFC4-6F175D3DCCD1}">
-              <a14:hiddenFill xmlns:a14="http://schemas.microsoft.com/office/drawing/2010/main" xmlns="">
+              <a14:hiddenFill xmlns:a14="http://schemas.microsoft.com/office/drawing/2010/main">
                 <a:solidFill>
                   <a:srgbClr val="FFFFFF"/>
                 </a:solidFill>
               </a14:hiddenFill>
             </a:ext>
             <a:ext uri="{91240B29-F687-4f45-9708-019B960494DF}">
-              <a14:hiddenLine xmlns:a14="http://schemas.microsoft.com/office/drawing/2010/main" xmlns="" w="9525">
+              <a14:hiddenLine xmlns:a14="http://schemas.microsoft.com/office/drawing/2010/main" w="9525">
                 <a:solidFill>
                   <a:srgbClr val="000000"/>
                 </a:solidFill>
@@ -2916,7 +3137,7 @@
               </a14:hiddenLine>
             </a:ext>
             <a:ext uri="{FAA26D3D-D897-4be2-8F04-BA451C77F1D7}">
-              <ma14:placeholderFlag xmlns:ma14="http://schemas.microsoft.com/office/mac/drawingml/2011/main" xmlns="" val="1"/>
+              <ma14:placeholderFlag xmlns:ma14="http://schemas.microsoft.com/office/mac/drawingml/2011/main" val="1"/>
             </a:ext>
           </a:extLst>
         </p:spPr>
@@ -3568,14 +3789,14 @@
           </a:ln>
           <a:extLst>
             <a:ext uri="{909E8E84-426E-40dd-AFC4-6F175D3DCCD1}">
-              <a14:hiddenFill xmlns:a14="http://schemas.microsoft.com/office/drawing/2010/main" xmlns="">
+              <a14:hiddenFill xmlns:a14="http://schemas.microsoft.com/office/drawing/2010/main">
                 <a:solidFill>
                   <a:srgbClr val="FFFFFF"/>
                 </a:solidFill>
               </a14:hiddenFill>
             </a:ext>
             <a:ext uri="{91240B29-F687-4f45-9708-019B960494DF}">
-              <a14:hiddenLine xmlns:a14="http://schemas.microsoft.com/office/drawing/2010/main" xmlns="" w="9525">
+              <a14:hiddenLine xmlns:a14="http://schemas.microsoft.com/office/drawing/2010/main" w="9525">
                 <a:solidFill>
                   <a:srgbClr val="000000"/>
                 </a:solidFill>
@@ -3712,7 +3933,7 @@
   <p:timing>
     <p:tnLst>
       <p:par>
-        <p:cTn id="1" dur="indefinite" restart="never" nodeType="tmRoot"/>
+        <p:cTn xmlns:p14="http://schemas.microsoft.com/office/powerpoint/2010/main" id="1" dur="indefinite" restart="never" nodeType="tmRoot"/>
       </p:par>
     </p:tnLst>
   </p:timing>
@@ -3833,14 +4054,14 @@
           </a:ln>
           <a:extLst>
             <a:ext uri="{909E8E84-426E-40dd-AFC4-6F175D3DCCD1}">
-              <a14:hiddenFill xmlns:a14="http://schemas.microsoft.com/office/drawing/2010/main" xmlns="">
+              <a14:hiddenFill xmlns:a14="http://schemas.microsoft.com/office/drawing/2010/main">
                 <a:solidFill>
                   <a:srgbClr val="FFFFFF"/>
                 </a:solidFill>
               </a14:hiddenFill>
             </a:ext>
             <a:ext uri="{91240B29-F687-4f45-9708-019B960494DF}">
-              <a14:hiddenLine xmlns:a14="http://schemas.microsoft.com/office/drawing/2010/main" xmlns="" w="9525">
+              <a14:hiddenLine xmlns:a14="http://schemas.microsoft.com/office/drawing/2010/main" w="9525">
                 <a:solidFill>
                   <a:srgbClr val="000000"/>
                 </a:solidFill>
@@ -3850,7 +4071,7 @@
               </a14:hiddenLine>
             </a:ext>
             <a:ext uri="{FAA26D3D-D897-4be2-8F04-BA451C77F1D7}">
-              <ma14:placeholderFlag xmlns:ma14="http://schemas.microsoft.com/office/mac/drawingml/2011/main" xmlns="" val="1"/>
+              <ma14:placeholderFlag xmlns:ma14="http://schemas.microsoft.com/office/mac/drawingml/2011/main" val="1"/>
             </a:ext>
           </a:extLst>
         </p:spPr>
@@ -4106,7 +4327,7 @@
   <p:timing>
     <p:tnLst>
       <p:par>
-        <p:cTn id="1" dur="indefinite" restart="never" nodeType="tmRoot"/>
+        <p:cTn xmlns:p14="http://schemas.microsoft.com/office/powerpoint/2010/main" id="1" dur="indefinite" restart="never" nodeType="tmRoot"/>
       </p:par>
     </p:tnLst>
   </p:timing>
@@ -4259,10 +4480,16 @@
           <a:p>
             <a:r>
               <a:rPr lang="en-ZA" sz="3200" dirty="0" smtClean="0">
+                <a:cs typeface="Times New Roman" panose="02020603050405020304" pitchFamily="18" charset="0"/>
+              </a:rPr>
+              <a:t>60</a:t>
+            </a:r>
+            <a:r>
+              <a:rPr lang="en-ZA" sz="3200" dirty="0" smtClean="0">
                 <a:latin typeface="Times New Roman" panose="02020603050405020304" pitchFamily="18" charset="0"/>
                 <a:cs typeface="Times New Roman" panose="02020603050405020304" pitchFamily="18" charset="0"/>
               </a:rPr>
-              <a:t>60°</a:t>
+              <a:t>°</a:t>
             </a:r>
             <a:endParaRPr lang="en-ZA" sz="3200" dirty="0">
               <a:latin typeface="Times New Roman" panose="02020603050405020304" pitchFamily="18" charset="0"/>
@@ -4295,17 +4522,22 @@
           <a:p>
             <a:r>
               <a:rPr lang="en-ZA" sz="3200" dirty="0">
-                <a:latin typeface="Times New Roman" panose="02020603050405020304" pitchFamily="18" charset="0"/>
                 <a:cs typeface="Times New Roman" panose="02020603050405020304" pitchFamily="18" charset="0"/>
               </a:rPr>
               <a:t>9</a:t>
+            </a:r>
+            <a:r>
+              <a:rPr lang="en-ZA" sz="3200" dirty="0" smtClean="0">
+                <a:cs typeface="Times New Roman" panose="02020603050405020304" pitchFamily="18" charset="0"/>
+              </a:rPr>
+              <a:t>0</a:t>
             </a:r>
             <a:r>
               <a:rPr lang="en-ZA" sz="3200" dirty="0" smtClean="0">
                 <a:latin typeface="Times New Roman" panose="02020603050405020304" pitchFamily="18" charset="0"/>
                 <a:cs typeface="Times New Roman" panose="02020603050405020304" pitchFamily="18" charset="0"/>
               </a:rPr>
-              <a:t>0°</a:t>
+              <a:t>°</a:t>
             </a:r>
             <a:endParaRPr lang="en-ZA" sz="3200" dirty="0">
               <a:latin typeface="Times New Roman" panose="02020603050405020304" pitchFamily="18" charset="0"/>
@@ -4314,520 +4546,9 @@
           </a:p>
         </p:txBody>
       </p:sp>
-      <mc:AlternateContent xmlns:mc="http://schemas.openxmlformats.org/markup-compatibility/2006">
-        <mc:Choice xmlns:a14="http://schemas.microsoft.com/office/drawing/2010/main" Requires="a14">
-          <p:sp>
-            <p:nvSpPr>
-              <p:cNvPr id="11" name="Content Placeholder 2"/>
-              <p:cNvSpPr txBox="1">
-                <a:spLocks/>
-              </p:cNvSpPr>
-              <p:nvPr/>
-            </p:nvSpPr>
-            <p:spPr bwMode="auto">
-              <a:xfrm>
-                <a:off x="210721" y="1971841"/>
-                <a:ext cx="3878183" cy="4248472"/>
-              </a:xfrm>
-              <a:prstGeom prst="rect">
-                <a:avLst/>
-              </a:prstGeom>
-              <a:noFill/>
-              <a:ln>
-                <a:noFill/>
-              </a:ln>
-              <a:extLst>
-                <a:ext uri="{909E8E84-426E-40dd-AFC4-6F175D3DCCD1}">
-                  <a14:hiddenFill xmlns="">
-                    <a:solidFill>
-                      <a:srgbClr val="FFFFFF"/>
-                    </a:solidFill>
-                  </a14:hiddenFill>
-                </a:ext>
-                <a:ext uri="{91240B29-F687-4f45-9708-019B960494DF}">
-                  <a14:hiddenLine xmlns="" w="9525">
-                    <a:solidFill>
-                      <a:srgbClr val="000000"/>
-                    </a:solidFill>
-                    <a:miter lim="800000"/>
-                    <a:headEnd/>
-                    <a:tailEnd/>
-                  </a14:hiddenLine>
-                </a:ext>
-                <a:ext uri="{FAA26D3D-D897-4be2-8F04-BA451C77F1D7}">
-                  <ma14:placeholderFlag xmlns:ma14="http://schemas.microsoft.com/office/mac/drawingml/2011/main" xmlns="" val="1"/>
-                </a:ext>
-              </a:extLst>
-            </p:spPr>
-            <p:txBody>
-              <a:bodyPr vert="horz" wrap="square" lIns="92075" tIns="46038" rIns="92075" bIns="46038" numCol="1" anchor="t" anchorCtr="0" compatLnSpc="1">
-                <a:prstTxWarp prst="textNoShape">
-                  <a:avLst/>
-                </a:prstTxWarp>
-              </a:bodyPr>
-              <a:lstStyle>
-                <a:lvl1pPr marL="762000" indent="-571500" algn="l" defTabSz="762000" rtl="0" eaLnBrk="1" fontAlgn="base" hangingPunct="1">
-                  <a:spcBef>
-                    <a:spcPct val="70000"/>
-                  </a:spcBef>
-                  <a:spcAft>
-                    <a:spcPct val="0"/>
-                  </a:spcAft>
-                  <a:buClr>
-                    <a:srgbClr val="154E7E"/>
-                  </a:buClr>
-                  <a:buSzPct val="100000"/>
-                  <a:buFont typeface="Wingdings" charset="0"/>
-                  <a:buChar char="l"/>
-                  <a:defRPr sz="2400" b="1">
-                    <a:solidFill>
-                      <a:schemeClr val="tx1"/>
-                    </a:solidFill>
-                    <a:latin typeface="+mn-lt"/>
-                    <a:ea typeface="MS PGothic" panose="020B0600070205080204" pitchFamily="34" charset="-128"/>
-                    <a:cs typeface="MS PGothic" charset="0"/>
-                  </a:defRPr>
-                </a:lvl1pPr>
-                <a:lvl2pPr marL="1524000" indent="-381000" algn="l" defTabSz="762000" rtl="0" eaLnBrk="1" fontAlgn="base" hangingPunct="1">
-                  <a:lnSpc>
-                    <a:spcPct val="90000"/>
-                  </a:lnSpc>
-                  <a:spcBef>
-                    <a:spcPct val="30000"/>
-                  </a:spcBef>
-                  <a:spcAft>
-                    <a:spcPct val="0"/>
-                  </a:spcAft>
-                  <a:buClr>
-                    <a:srgbClr val="154E7E"/>
-                  </a:buClr>
-                  <a:buSzPct val="100000"/>
-                  <a:buFont typeface="Wingdings" charset="0"/>
-                  <a:buChar char="Ø"/>
-                  <a:defRPr sz="2000" b="1">
-                    <a:solidFill>
-                      <a:schemeClr val="tx1"/>
-                    </a:solidFill>
-                    <a:latin typeface="+mn-lt"/>
-                    <a:ea typeface="MS PGothic" panose="020B0600070205080204" pitchFamily="34" charset="-128"/>
-                    <a:cs typeface="MS PGothic" charset="0"/>
-                  </a:defRPr>
-                </a:lvl2pPr>
-                <a:lvl3pPr marL="2190750" indent="-285750" algn="l" defTabSz="762000" rtl="0" eaLnBrk="1" fontAlgn="base" hangingPunct="1">
-                  <a:lnSpc>
-                    <a:spcPct val="90000"/>
-                  </a:lnSpc>
-                  <a:spcBef>
-                    <a:spcPct val="30000"/>
-                  </a:spcBef>
-                  <a:spcAft>
-                    <a:spcPct val="0"/>
-                  </a:spcAft>
-                  <a:buClr>
-                    <a:srgbClr val="154E7E"/>
-                  </a:buClr>
-                  <a:buSzPct val="100000"/>
-                  <a:buFont typeface="Wingdings" charset="0"/>
-                  <a:buChar char="§"/>
-                  <a:defRPr b="1">
-                    <a:solidFill>
-                      <a:schemeClr val="tx1"/>
-                    </a:solidFill>
-                    <a:latin typeface="+mn-lt"/>
-                    <a:ea typeface="MS PGothic" panose="020B0600070205080204" pitchFamily="34" charset="-128"/>
-                    <a:cs typeface="MS PGothic" charset="0"/>
-                  </a:defRPr>
-                </a:lvl3pPr>
-                <a:lvl4pPr marL="2647950" indent="-171450" algn="l" defTabSz="762000" rtl="0" eaLnBrk="1" fontAlgn="base" hangingPunct="1">
-                  <a:lnSpc>
-                    <a:spcPct val="90000"/>
-                  </a:lnSpc>
-                  <a:spcBef>
-                    <a:spcPct val="30000"/>
-                  </a:spcBef>
-                  <a:spcAft>
-                    <a:spcPct val="0"/>
-                  </a:spcAft>
-                  <a:buClr>
-                    <a:srgbClr val="FAFD00"/>
-                  </a:buClr>
-                  <a:buSzPct val="100000"/>
-                  <a:buFont typeface="Arial" charset="0"/>
-                  <a:buChar char="•"/>
-                  <a:defRPr sz="1400" b="1">
-                    <a:solidFill>
-                      <a:schemeClr val="tx1"/>
-                    </a:solidFill>
-                    <a:latin typeface="+mn-lt"/>
-                    <a:ea typeface="MS PGothic" panose="020B0600070205080204" pitchFamily="34" charset="-128"/>
-                    <a:cs typeface="MS PGothic" charset="0"/>
-                  </a:defRPr>
-                </a:lvl4pPr>
-                <a:lvl5pPr marL="3009900" indent="-171450" algn="l" defTabSz="762000" rtl="0" eaLnBrk="1" fontAlgn="base" hangingPunct="1">
-                  <a:lnSpc>
-                    <a:spcPct val="90000"/>
-                  </a:lnSpc>
-                  <a:spcBef>
-                    <a:spcPct val="30000"/>
-                  </a:spcBef>
-                  <a:spcAft>
-                    <a:spcPct val="0"/>
-                  </a:spcAft>
-                  <a:buClr>
-                    <a:srgbClr val="FAFD00"/>
-                  </a:buClr>
-                  <a:buSzPct val="100000"/>
-                  <a:buFont typeface="Arial" charset="0"/>
-                  <a:buChar char="•"/>
-                  <a:defRPr sz="1400" b="1">
-                    <a:solidFill>
-                      <a:schemeClr val="tx1"/>
-                    </a:solidFill>
-                    <a:latin typeface="+mn-lt"/>
-                    <a:ea typeface="MS PGothic" panose="020B0600070205080204" pitchFamily="34" charset="-128"/>
-                    <a:cs typeface="MS PGothic" charset="0"/>
-                  </a:defRPr>
-                </a:lvl5pPr>
-                <a:lvl6pPr marL="3467100" indent="-171450" algn="l" defTabSz="762000" rtl="0" eaLnBrk="1" fontAlgn="base" hangingPunct="1">
-                  <a:lnSpc>
-                    <a:spcPct val="90000"/>
-                  </a:lnSpc>
-                  <a:spcBef>
-                    <a:spcPct val="30000"/>
-                  </a:spcBef>
-                  <a:spcAft>
-                    <a:spcPct val="0"/>
-                  </a:spcAft>
-                  <a:buClr>
-                    <a:srgbClr val="FAFD00"/>
-                  </a:buClr>
-                  <a:buSzPct val="100000"/>
-                  <a:buFont typeface="Arial" charset="0"/>
-                  <a:buChar char="•"/>
-                  <a:defRPr sz="1400" b="1">
-                    <a:solidFill>
-                      <a:schemeClr val="tx1"/>
-                    </a:solidFill>
-                    <a:latin typeface="+mn-lt"/>
-                  </a:defRPr>
-                </a:lvl6pPr>
-                <a:lvl7pPr marL="3924300" indent="-171450" algn="l" defTabSz="762000" rtl="0" eaLnBrk="1" fontAlgn="base" hangingPunct="1">
-                  <a:lnSpc>
-                    <a:spcPct val="90000"/>
-                  </a:lnSpc>
-                  <a:spcBef>
-                    <a:spcPct val="30000"/>
-                  </a:spcBef>
-                  <a:spcAft>
-                    <a:spcPct val="0"/>
-                  </a:spcAft>
-                  <a:buClr>
-                    <a:srgbClr val="FAFD00"/>
-                  </a:buClr>
-                  <a:buSzPct val="100000"/>
-                  <a:buFont typeface="Arial" charset="0"/>
-                  <a:buChar char="•"/>
-                  <a:defRPr sz="1400" b="1">
-                    <a:solidFill>
-                      <a:schemeClr val="tx1"/>
-                    </a:solidFill>
-                    <a:latin typeface="+mn-lt"/>
-                  </a:defRPr>
-                </a:lvl7pPr>
-                <a:lvl8pPr marL="4381500" indent="-171450" algn="l" defTabSz="762000" rtl="0" eaLnBrk="1" fontAlgn="base" hangingPunct="1">
-                  <a:lnSpc>
-                    <a:spcPct val="90000"/>
-                  </a:lnSpc>
-                  <a:spcBef>
-                    <a:spcPct val="30000"/>
-                  </a:spcBef>
-                  <a:spcAft>
-                    <a:spcPct val="0"/>
-                  </a:spcAft>
-                  <a:buClr>
-                    <a:srgbClr val="FAFD00"/>
-                  </a:buClr>
-                  <a:buSzPct val="100000"/>
-                  <a:buFont typeface="Arial" charset="0"/>
-                  <a:buChar char="•"/>
-                  <a:defRPr sz="1400" b="1">
-                    <a:solidFill>
-                      <a:schemeClr val="tx1"/>
-                    </a:solidFill>
-                    <a:latin typeface="+mn-lt"/>
-                  </a:defRPr>
-                </a:lvl8pPr>
-                <a:lvl9pPr marL="4838700" indent="-171450" algn="l" defTabSz="762000" rtl="0" eaLnBrk="1" fontAlgn="base" hangingPunct="1">
-                  <a:lnSpc>
-                    <a:spcPct val="90000"/>
-                  </a:lnSpc>
-                  <a:spcBef>
-                    <a:spcPct val="30000"/>
-                  </a:spcBef>
-                  <a:spcAft>
-                    <a:spcPct val="0"/>
-                  </a:spcAft>
-                  <a:buClr>
-                    <a:srgbClr val="FAFD00"/>
-                  </a:buClr>
-                  <a:buSzPct val="100000"/>
-                  <a:buFont typeface="Arial" charset="0"/>
-                  <a:buChar char="•"/>
-                  <a:defRPr sz="1400" b="1">
-                    <a:solidFill>
-                      <a:schemeClr val="tx1"/>
-                    </a:solidFill>
-                    <a:latin typeface="+mn-lt"/>
-                  </a:defRPr>
-                </a:lvl9pPr>
-              </a:lstStyle>
-              <a:p>
-                <a:r>
-                  <a:rPr lang="en-ZA" kern="0" dirty="0" smtClean="0"/>
-                  <a:t>Most precise steering at 3.15 kHz</a:t>
-                </a:r>
-              </a:p>
-              <a:p>
-                <a:r>
-                  <a:rPr lang="en-ZA" kern="0" dirty="0" smtClean="0"/>
-                  <a:t>Spatial aliasing </a:t>
-                </a:r>
-              </a:p>
-              <a:p>
-                <a:pPr lvl="1"/>
-                <a14:m/>
-              </a:p>
-              <a:p>
-                <a:pPr lvl="1"/>
-                <a:endParaRPr lang="en-ZA" kern="0" dirty="0" smtClean="0"/>
-              </a:p>
-              <a:p>
-                <a:pPr lvl="1"/>
-                <a14:m>
-                  <m:oMath xmlns:m="http://schemas.openxmlformats.org/officeDocument/2006/math">
-                    <m:sSub>
-                      <m:sSubPr>
-                        <m:ctrlPr>
-                          <a:rPr lang="en-ZA" i="1" kern="0" smtClean="0">
-                            <a:latin typeface="Cambria Math" panose="02040503050406030204" pitchFamily="18" charset="0"/>
-                          </a:rPr>
-                        </m:ctrlPr>
-                      </m:sSubPr>
-                      <m:e>
-                        <m:r>
-                          <m:rPr>
-                            <m:sty m:val="p"/>
-                          </m:rPr>
-                          <a:rPr lang="el-GR" i="1" kern="0">
-                            <a:latin typeface="Cambria Math" panose="02040503050406030204" pitchFamily="18" charset="0"/>
-                          </a:rPr>
-                          <m:t>λ</m:t>
-                        </m:r>
-                      </m:e>
-                      <m:sub>
-                        <m:r>
-                          <a:rPr lang="en-ZA" b="1" i="1" kern="0" smtClean="0">
-                            <a:latin typeface="Cambria Math" panose="02040503050406030204" pitchFamily="18" charset="0"/>
-                          </a:rPr>
-                          <m:t>𝒎𝒊𝒏</m:t>
-                        </m:r>
-                      </m:sub>
-                    </m:sSub>
-                    <m:r>
-                      <a:rPr lang="en-ZA" b="1" i="1" kern="0" smtClean="0">
-                        <a:latin typeface="Cambria Math" panose="02040503050406030204" pitchFamily="18" charset="0"/>
-                      </a:rPr>
-                      <m:t> </m:t>
-                    </m:r>
-                  </m:oMath>
-                </a14:m>
-                <a:r>
-                  <a:rPr lang="en-ZA" kern="0" dirty="0" smtClean="0"/>
-                  <a:t>= wavelength of maximum frequency</a:t>
-                </a:r>
-              </a:p>
-            </p:txBody>
-          </p:sp>
-        </mc:Choice>
-        <mc:Fallback>
-          <p:sp>
-            <p:nvSpPr>
-              <p:cNvPr id="11" name="Content Placeholder 2"/>
-              <p:cNvSpPr txBox="1">
-                <a:spLocks noRot="1" noChangeAspect="1" noMove="1" noResize="1" noEditPoints="1" noAdjustHandles="1" noChangeArrowheads="1" noChangeShapeType="1" noTextEdit="1"/>
-              </p:cNvSpPr>
-              <p:nvPr/>
-            </p:nvSpPr>
-            <p:spPr bwMode="auto">
-              <a:xfrm>
-                <a:off x="210721" y="1971841"/>
-                <a:ext cx="3878183" cy="4248472"/>
-              </a:xfrm>
-              <a:prstGeom prst="rect">
-                <a:avLst/>
-              </a:prstGeom>
-              <a:blipFill>
-                <a:blip r:embed="rId4"/>
-                <a:stretch>
-                  <a:fillRect t="-861" r="-2830"/>
-                </a:stretch>
-              </a:blipFill>
-              <a:ln>
-                <a:noFill/>
-              </a:ln>
-              <a:extLst>
-                <a:ext uri="{909E8E84-426E-40dd-AFC4-6F175D3DCCD1}">
-                  <a14:hiddenFill xmlns:a14="http://schemas.microsoft.com/office/drawing/2010/main" xmlns="">
-                    <a:solidFill>
-                      <a:srgbClr val="FFFFFF"/>
-                    </a:solidFill>
-                  </a14:hiddenFill>
-                </a:ext>
-                <a:ext uri="{91240B29-F687-4f45-9708-019B960494DF}">
-                  <a14:hiddenLine xmlns:a14="http://schemas.microsoft.com/office/drawing/2010/main" xmlns="" w="9525">
-                    <a:solidFill>
-                      <a:srgbClr val="000000"/>
-                    </a:solidFill>
-                    <a:miter lim="800000"/>
-                    <a:headEnd/>
-                    <a:tailEnd/>
-                  </a14:hiddenLine>
-                </a:ext>
-                <a:ext uri="{FAA26D3D-D897-4be2-8F04-BA451C77F1D7}">
-                  <ma14:placeholderFlag xmlns:ma14="http://schemas.microsoft.com/office/mac/drawingml/2011/main" xmlns="" val="1"/>
-                </a:ext>
-              </a:extLst>
-            </p:spPr>
-            <p:txBody>
-              <a:bodyPr/>
-              <a:lstStyle/>
-              <a:p>
-                <a:r>
-                  <a:rPr lang="en-ZA">
-                    <a:noFill/>
-                  </a:rPr>
-                  <a:t> </a:t>
-                </a:r>
-              </a:p>
-            </p:txBody>
-          </p:sp>
-        </mc:Fallback>
-      </mc:AlternateContent>
-    </p:spTree>
-    <p:extLst>
-      <p:ext uri="{BB962C8B-B14F-4D97-AF65-F5344CB8AC3E}">
-        <p14:creationId xmlns:p14="http://schemas.microsoft.com/office/powerpoint/2010/main" val="2517507658"/>
-      </p:ext>
-    </p:extLst>
-  </p:cSld>
-  <p:clrMapOvr>
-    <a:masterClrMapping/>
-  </p:clrMapOvr>
-  <p:timing>
-    <p:tnLst>
-      <p:par>
-        <p:cTn id="1" dur="indefinite" restart="never" nodeType="tmRoot"/>
-      </p:par>
-    </p:tnLst>
-  </p:timing>
-</p:sld>
-</file>
-
-<file path=ppt/slides/slide12.xml><?xml version="1.0" encoding="utf-8"?>
-<p:sld xmlns:a="http://schemas.openxmlformats.org/drawingml/2006/main" xmlns:r="http://schemas.openxmlformats.org/officeDocument/2006/relationships" xmlns:p="http://schemas.openxmlformats.org/presentationml/2006/main">
-  <p:cSld>
-    <p:spTree>
-      <p:nvGrpSpPr>
-        <p:cNvPr id="1" name=""/>
-        <p:cNvGrpSpPr/>
-        <p:nvPr/>
-      </p:nvGrpSpPr>
-      <p:grpSpPr>
-        <a:xfrm>
-          <a:off x="0" y="0"/>
-          <a:ext cx="0" cy="0"/>
-          <a:chOff x="0" y="0"/>
-          <a:chExt cx="0" cy="0"/>
-        </a:xfrm>
-      </p:grpSpPr>
       <p:sp>
         <p:nvSpPr>
-          <p:cNvPr id="2" name="Title 1"/>
-          <p:cNvSpPr>
-            <a:spLocks noGrp="1"/>
-          </p:cNvSpPr>
-          <p:nvPr>
-            <p:ph type="title"/>
-          </p:nvPr>
-        </p:nvSpPr>
-        <p:spPr/>
-        <p:txBody>
-          <a:bodyPr/>
-          <a:lstStyle/>
-          <a:p>
-            <a:r>
-              <a:rPr lang="en-ZA" dirty="0" smtClean="0"/>
-              <a:t>Results: Hardware</a:t>
-            </a:r>
-            <a:endParaRPr lang="en-ZA" dirty="0"/>
-          </a:p>
-        </p:txBody>
-      </p:sp>
-      <p:pic>
-        <p:nvPicPr>
-          <p:cNvPr id="5" name="Content Placeholder 4"/>
-          <p:cNvPicPr>
-            <a:picLocks noGrp="1" noChangeAspect="1"/>
-          </p:cNvPicPr>
-          <p:nvPr>
-            <p:ph idx="1"/>
-          </p:nvPr>
-        </p:nvPicPr>
-        <p:blipFill>
-          <a:blip r:embed="rId2">
-            <a:extLst>
-              <a:ext uri="{28A0092B-C50C-407E-A947-70E740481C1C}">
-                <a14:useLocalDpi xmlns:a14="http://schemas.microsoft.com/office/drawing/2010/main" val="0"/>
-              </a:ext>
-            </a:extLst>
-          </a:blip>
-          <a:stretch>
-            <a:fillRect/>
-          </a:stretch>
-        </p:blipFill>
-        <p:spPr>
-          <a:xfrm>
-            <a:off x="3600792" y="2780928"/>
-            <a:ext cx="5801826" cy="3426113"/>
-          </a:xfrm>
-        </p:spPr>
-      </p:pic>
-      <p:sp>
-        <p:nvSpPr>
-          <p:cNvPr id="4" name="Slide Number Placeholder 3"/>
-          <p:cNvSpPr>
-            <a:spLocks noGrp="1"/>
-          </p:cNvSpPr>
-          <p:nvPr>
-            <p:ph type="sldNum" sz="quarter" idx="10"/>
-          </p:nvPr>
-        </p:nvSpPr>
-        <p:spPr/>
-        <p:txBody>
-          <a:bodyPr/>
-          <a:lstStyle/>
-          <a:p>
-            <a:fld id="{960946CE-1557-8048-9DCC-53092B682325}" type="slidenum">
-              <a:rPr lang="en-US" smtClean="0"/>
-              <a:t>12</a:t>
-            </a:fld>
-            <a:endParaRPr lang="en-US" dirty="0"/>
-          </a:p>
-        </p:txBody>
-      </p:sp>
-      <p:sp>
-        <p:nvSpPr>
-          <p:cNvPr id="6" name="Content Placeholder 2"/>
+          <p:cNvPr id="11" name="Content Placeholder 2"/>
           <p:cNvSpPr txBox="1">
             <a:spLocks/>
           </p:cNvSpPr>
@@ -4835,8 +4556,8 @@
         </p:nvSpPr>
         <p:spPr bwMode="auto">
           <a:xfrm>
-            <a:off x="210721" y="1755805"/>
-            <a:ext cx="8846735" cy="1025123"/>
+            <a:off x="210721" y="1971841"/>
+            <a:ext cx="3878183" cy="4248472"/>
           </a:xfrm>
           <a:prstGeom prst="rect">
             <a:avLst/>
@@ -4847,14 +4568,14 @@
           </a:ln>
           <a:extLst>
             <a:ext uri="{909E8E84-426E-40dd-AFC4-6F175D3DCCD1}">
-              <a14:hiddenFill xmlns:a14="http://schemas.microsoft.com/office/drawing/2010/main" xmlns="">
+              <a14:hiddenFill xmlns:a14="http://schemas.microsoft.com/office/drawing/2010/main">
                 <a:solidFill>
                   <a:srgbClr val="FFFFFF"/>
                 </a:solidFill>
               </a14:hiddenFill>
             </a:ext>
             <a:ext uri="{91240B29-F687-4f45-9708-019B960494DF}">
-              <a14:hiddenLine xmlns:a14="http://schemas.microsoft.com/office/drawing/2010/main" xmlns="" w="9525">
+              <a14:hiddenLine xmlns:a14="http://schemas.microsoft.com/office/drawing/2010/main" w="9525">
                 <a:solidFill>
                   <a:srgbClr val="000000"/>
                 </a:solidFill>
@@ -4864,7 +4585,7 @@
               </a14:hiddenLine>
             </a:ext>
             <a:ext uri="{FAA26D3D-D897-4be2-8F04-BA451C77F1D7}">
-              <ma14:placeholderFlag xmlns:ma14="http://schemas.microsoft.com/office/mac/drawingml/2011/main" xmlns="" val="1"/>
+              <ma14:placeholderFlag xmlns:ma14="http://schemas.microsoft.com/office/mac/drawingml/2011/main" val="1"/>
             </a:ext>
           </a:extLst>
         </p:spPr>
@@ -5093,43 +4814,36 @@
           <a:p>
             <a:r>
               <a:rPr lang="en-ZA" kern="0" dirty="0" smtClean="0"/>
-              <a:t>Input sound frequency: 3.15 kHz</a:t>
+              <a:t>Most precise steering at 3.15 kHz</a:t>
             </a:r>
           </a:p>
           <a:p>
             <a:r>
               <a:rPr lang="en-ZA" kern="0" dirty="0" smtClean="0"/>
-              <a:t>Effects of amplification of one band are seen across the frequency                                                                  spectrum</a:t>
+              <a:t>Spatial aliasing </a:t>
             </a:r>
           </a:p>
           <a:p>
             <a:pPr lvl="1"/>
+            <a:endParaRPr lang="en-ZA" kern="0" dirty="0" smtClean="0"/>
+          </a:p>
+          <a:p>
+            <a:pPr lvl="1"/>
+            <a:endParaRPr lang="en-ZA" kern="0" dirty="0" smtClean="0"/>
+          </a:p>
+          <a:p>
+            <a:pPr lvl="1"/>
             <a:r>
               <a:rPr lang="en-ZA" kern="0" dirty="0" smtClean="0"/>
-              <a:t>Filter order</a:t>
-            </a:r>
-          </a:p>
-          <a:p>
-            <a:r>
-              <a:rPr lang="en-ZA" kern="0" dirty="0" smtClean="0"/>
-              <a:t>Error caused by                                                    interaction of                                                                 stop-bands</a:t>
-            </a:r>
-          </a:p>
-          <a:p>
-            <a:pPr marL="190500" indent="0">
-              <a:buNone/>
-            </a:pPr>
-            <a:endParaRPr lang="en-ZA" kern="0" dirty="0" smtClean="0"/>
-          </a:p>
-          <a:p>
-            <a:endParaRPr lang="en-ZA" kern="0" dirty="0" smtClean="0"/>
+              <a:t>= wavelength of maximum frequency</a:t>
+            </a:r>
           </a:p>
         </p:txBody>
       </p:sp>
     </p:spTree>
     <p:extLst>
       <p:ext uri="{BB962C8B-B14F-4D97-AF65-F5344CB8AC3E}">
-        <p14:creationId xmlns:p14="http://schemas.microsoft.com/office/powerpoint/2010/main" val="16925167"/>
+        <p14:creationId xmlns:p14="http://schemas.microsoft.com/office/powerpoint/2010/main" val="2517507658"/>
       </p:ext>
     </p:extLst>
   </p:cSld>
@@ -5139,14 +4853,14 @@
   <p:timing>
     <p:tnLst>
       <p:par>
-        <p:cTn id="1" dur="indefinite" restart="never" nodeType="tmRoot"/>
+        <p:cTn xmlns:p14="http://schemas.microsoft.com/office/powerpoint/2010/main" id="1" dur="indefinite" restart="never" nodeType="tmRoot"/>
       </p:par>
     </p:tnLst>
   </p:timing>
 </p:sld>
 </file>
 
-<file path=ppt/slides/slide13.xml><?xml version="1.0" encoding="utf-8"?>
+<file path=ppt/slides/slide12.xml><?xml version="1.0" encoding="utf-8"?>
 <p:sld xmlns:a="http://schemas.openxmlformats.org/drawingml/2006/main" xmlns:r="http://schemas.openxmlformats.org/officeDocument/2006/relationships" xmlns:p="http://schemas.openxmlformats.org/presentationml/2006/main">
   <p:cSld>
     <p:spTree>
@@ -5210,8 +4924,8 @@
         </p:blipFill>
         <p:spPr>
           <a:xfrm>
-            <a:off x="6668630" y="1891384"/>
-            <a:ext cx="3237370" cy="3083942"/>
+            <a:off x="3600792" y="2780928"/>
+            <a:ext cx="5801826" cy="3426113"/>
           </a:xfrm>
         </p:spPr>
       </p:pic>
@@ -5232,117 +4946,15 @@
           <a:p>
             <a:fld id="{960946CE-1557-8048-9DCC-53092B682325}" type="slidenum">
               <a:rPr lang="en-US" smtClean="0"/>
-              <a:t>13</a:t>
+              <a:t>12</a:t>
             </a:fld>
             <a:endParaRPr lang="en-US" dirty="0"/>
-          </a:p>
-        </p:txBody>
-      </p:sp>
-      <p:pic>
-        <p:nvPicPr>
-          <p:cNvPr id="6" name="Picture 5"/>
-          <p:cNvPicPr>
-            <a:picLocks noChangeAspect="1"/>
-          </p:cNvPicPr>
-          <p:nvPr/>
-        </p:nvPicPr>
-        <p:blipFill>
-          <a:blip r:embed="rId3">
-            <a:extLst>
-              <a:ext uri="{28A0092B-C50C-407E-A947-70E740481C1C}">
-                <a14:useLocalDpi xmlns:a14="http://schemas.microsoft.com/office/drawing/2010/main" val="0"/>
-              </a:ext>
-            </a:extLst>
-          </a:blip>
-          <a:stretch>
-            <a:fillRect/>
-          </a:stretch>
-        </p:blipFill>
-        <p:spPr>
-          <a:xfrm>
-            <a:off x="3607795" y="1861603"/>
-            <a:ext cx="3224808" cy="3083942"/>
-          </a:xfrm>
-          <a:prstGeom prst="rect">
-            <a:avLst/>
-          </a:prstGeom>
-        </p:spPr>
-      </p:pic>
-      <p:sp>
-        <p:nvSpPr>
-          <p:cNvPr id="9" name="TextBox 8"/>
-          <p:cNvSpPr txBox="1"/>
-          <p:nvPr/>
-        </p:nvSpPr>
-        <p:spPr>
-          <a:xfrm>
-            <a:off x="7977336" y="4931163"/>
-            <a:ext cx="2376264" cy="584775"/>
-          </a:xfrm>
-          <a:prstGeom prst="rect">
-            <a:avLst/>
-          </a:prstGeom>
-          <a:noFill/>
-        </p:spPr>
-        <p:txBody>
-          <a:bodyPr wrap="square" rtlCol="0">
-            <a:spAutoFit/>
-          </a:bodyPr>
-          <a:lstStyle/>
-          <a:p>
-            <a:r>
-              <a:rPr lang="en-ZA" sz="3200" dirty="0" smtClean="0">
-                <a:latin typeface="Times New Roman" panose="02020603050405020304" pitchFamily="18" charset="0"/>
-                <a:cs typeface="Times New Roman" panose="02020603050405020304" pitchFamily="18" charset="0"/>
-              </a:rPr>
-              <a:t>90°</a:t>
-            </a:r>
-            <a:endParaRPr lang="en-ZA" sz="3200" dirty="0">
-              <a:latin typeface="Times New Roman" panose="02020603050405020304" pitchFamily="18" charset="0"/>
-              <a:cs typeface="Times New Roman" panose="02020603050405020304" pitchFamily="18" charset="0"/>
-            </a:endParaRPr>
           </a:p>
         </p:txBody>
       </p:sp>
       <p:sp>
         <p:nvSpPr>
-          <p:cNvPr id="10" name="TextBox 9"/>
-          <p:cNvSpPr txBox="1"/>
-          <p:nvPr/>
-        </p:nvSpPr>
-        <p:spPr>
-          <a:xfrm>
-            <a:off x="4804905" y="4885983"/>
-            <a:ext cx="2376264" cy="584775"/>
-          </a:xfrm>
-          <a:prstGeom prst="rect">
-            <a:avLst/>
-          </a:prstGeom>
-          <a:noFill/>
-        </p:spPr>
-        <p:txBody>
-          <a:bodyPr wrap="square" rtlCol="0">
-            <a:spAutoFit/>
-          </a:bodyPr>
-          <a:lstStyle/>
-          <a:p>
-            <a:r>
-              <a:rPr lang="en-ZA" sz="3200" dirty="0" smtClean="0">
-                <a:latin typeface="Times New Roman" panose="02020603050405020304" pitchFamily="18" charset="0"/>
-                <a:cs typeface="Times New Roman" panose="02020603050405020304" pitchFamily="18" charset="0"/>
-              </a:rPr>
-              <a:t>60°</a:t>
-            </a:r>
-            <a:endParaRPr lang="en-ZA" sz="3200" dirty="0">
-              <a:latin typeface="Times New Roman" panose="02020603050405020304" pitchFamily="18" charset="0"/>
-              <a:cs typeface="Times New Roman" panose="02020603050405020304" pitchFamily="18" charset="0"/>
-            </a:endParaRPr>
-          </a:p>
-        </p:txBody>
-      </p:sp>
-      <p:sp>
-        <p:nvSpPr>
-          <p:cNvPr id="12" name="Content Placeholder 2"/>
+          <p:cNvPr id="6" name="Content Placeholder 2"/>
           <p:cNvSpPr txBox="1">
             <a:spLocks/>
           </p:cNvSpPr>
@@ -5350,8 +4962,8 @@
         </p:nvSpPr>
         <p:spPr bwMode="auto">
           <a:xfrm>
-            <a:off x="210721" y="1971841"/>
-            <a:ext cx="4146584" cy="4248472"/>
+            <a:off x="210721" y="1755805"/>
+            <a:ext cx="8846735" cy="1025123"/>
           </a:xfrm>
           <a:prstGeom prst="rect">
             <a:avLst/>
@@ -5362,14 +4974,14 @@
           </a:ln>
           <a:extLst>
             <a:ext uri="{909E8E84-426E-40dd-AFC4-6F175D3DCCD1}">
-              <a14:hiddenFill xmlns:a14="http://schemas.microsoft.com/office/drawing/2010/main" xmlns="">
+              <a14:hiddenFill xmlns:a14="http://schemas.microsoft.com/office/drawing/2010/main">
                 <a:solidFill>
                   <a:srgbClr val="FFFFFF"/>
                 </a:solidFill>
               </a14:hiddenFill>
             </a:ext>
             <a:ext uri="{91240B29-F687-4f45-9708-019B960494DF}">
-              <a14:hiddenLine xmlns:a14="http://schemas.microsoft.com/office/drawing/2010/main" xmlns="" w="9525">
+              <a14:hiddenLine xmlns:a14="http://schemas.microsoft.com/office/drawing/2010/main" w="9525">
                 <a:solidFill>
                   <a:srgbClr val="000000"/>
                 </a:solidFill>
@@ -5379,7 +4991,7 @@
               </a14:hiddenLine>
             </a:ext>
             <a:ext uri="{FAA26D3D-D897-4be2-8F04-BA451C77F1D7}">
-              <ma14:placeholderFlag xmlns:ma14="http://schemas.microsoft.com/office/mac/drawingml/2011/main" xmlns="" val="1"/>
+              <ma14:placeholderFlag xmlns:ma14="http://schemas.microsoft.com/office/mac/drawingml/2011/main" val="1"/>
             </a:ext>
           </a:extLst>
         </p:spPr>
@@ -5608,6 +5220,521 @@
           <a:p>
             <a:r>
               <a:rPr lang="en-ZA" kern="0" dirty="0" smtClean="0"/>
+              <a:t>Input sound frequency: 3.15 kHz</a:t>
+            </a:r>
+          </a:p>
+          <a:p>
+            <a:r>
+              <a:rPr lang="en-ZA" kern="0" dirty="0" smtClean="0"/>
+              <a:t>Effects of amplification of one band are seen across the frequency                                                                  spectrum</a:t>
+            </a:r>
+          </a:p>
+          <a:p>
+            <a:pPr lvl="1"/>
+            <a:r>
+              <a:rPr lang="en-ZA" kern="0" dirty="0" smtClean="0"/>
+              <a:t>Filter order</a:t>
+            </a:r>
+          </a:p>
+          <a:p>
+            <a:r>
+              <a:rPr lang="en-ZA" kern="0" dirty="0" smtClean="0"/>
+              <a:t>Error caused by                                                    interaction of                                                                 stop-bands</a:t>
+            </a:r>
+          </a:p>
+          <a:p>
+            <a:pPr marL="190500" indent="0">
+              <a:buNone/>
+            </a:pPr>
+            <a:endParaRPr lang="en-ZA" kern="0" dirty="0" smtClean="0"/>
+          </a:p>
+          <a:p>
+            <a:endParaRPr lang="en-ZA" kern="0" dirty="0" smtClean="0"/>
+          </a:p>
+        </p:txBody>
+      </p:sp>
+    </p:spTree>
+    <p:extLst>
+      <p:ext uri="{BB962C8B-B14F-4D97-AF65-F5344CB8AC3E}">
+        <p14:creationId xmlns:p14="http://schemas.microsoft.com/office/powerpoint/2010/main" val="16925167"/>
+      </p:ext>
+    </p:extLst>
+  </p:cSld>
+  <p:clrMapOvr>
+    <a:masterClrMapping/>
+  </p:clrMapOvr>
+  <p:timing>
+    <p:tnLst>
+      <p:par>
+        <p:cTn xmlns:p14="http://schemas.microsoft.com/office/powerpoint/2010/main" id="1" dur="indefinite" restart="never" nodeType="tmRoot"/>
+      </p:par>
+    </p:tnLst>
+  </p:timing>
+</p:sld>
+</file>
+
+<file path=ppt/slides/slide13.xml><?xml version="1.0" encoding="utf-8"?>
+<p:sld xmlns:a="http://schemas.openxmlformats.org/drawingml/2006/main" xmlns:r="http://schemas.openxmlformats.org/officeDocument/2006/relationships" xmlns:p="http://schemas.openxmlformats.org/presentationml/2006/main">
+  <p:cSld>
+    <p:spTree>
+      <p:nvGrpSpPr>
+        <p:cNvPr id="1" name=""/>
+        <p:cNvGrpSpPr/>
+        <p:nvPr/>
+      </p:nvGrpSpPr>
+      <p:grpSpPr>
+        <a:xfrm>
+          <a:off x="0" y="0"/>
+          <a:ext cx="0" cy="0"/>
+          <a:chOff x="0" y="0"/>
+          <a:chExt cx="0" cy="0"/>
+        </a:xfrm>
+      </p:grpSpPr>
+      <p:sp>
+        <p:nvSpPr>
+          <p:cNvPr id="2" name="Title 1"/>
+          <p:cNvSpPr>
+            <a:spLocks noGrp="1"/>
+          </p:cNvSpPr>
+          <p:nvPr>
+            <p:ph type="title"/>
+          </p:nvPr>
+        </p:nvSpPr>
+        <p:spPr/>
+        <p:txBody>
+          <a:bodyPr/>
+          <a:lstStyle/>
+          <a:p>
+            <a:r>
+              <a:rPr lang="en-ZA" dirty="0" smtClean="0"/>
+              <a:t>Results: Hardware</a:t>
+            </a:r>
+            <a:endParaRPr lang="en-ZA" dirty="0"/>
+          </a:p>
+        </p:txBody>
+      </p:sp>
+      <p:pic>
+        <p:nvPicPr>
+          <p:cNvPr id="5" name="Content Placeholder 4"/>
+          <p:cNvPicPr>
+            <a:picLocks noGrp="1" noChangeAspect="1"/>
+          </p:cNvPicPr>
+          <p:nvPr>
+            <p:ph idx="1"/>
+          </p:nvPr>
+        </p:nvPicPr>
+        <p:blipFill>
+          <a:blip r:embed="rId2">
+            <a:extLst>
+              <a:ext uri="{28A0092B-C50C-407E-A947-70E740481C1C}">
+                <a14:useLocalDpi xmlns:a14="http://schemas.microsoft.com/office/drawing/2010/main" val="0"/>
+              </a:ext>
+            </a:extLst>
+          </a:blip>
+          <a:stretch>
+            <a:fillRect/>
+          </a:stretch>
+        </p:blipFill>
+        <p:spPr>
+          <a:xfrm>
+            <a:off x="6668630" y="1891384"/>
+            <a:ext cx="3237370" cy="3083942"/>
+          </a:xfrm>
+        </p:spPr>
+      </p:pic>
+      <p:sp>
+        <p:nvSpPr>
+          <p:cNvPr id="4" name="Slide Number Placeholder 3"/>
+          <p:cNvSpPr>
+            <a:spLocks noGrp="1"/>
+          </p:cNvSpPr>
+          <p:nvPr>
+            <p:ph type="sldNum" sz="quarter" idx="10"/>
+          </p:nvPr>
+        </p:nvSpPr>
+        <p:spPr/>
+        <p:txBody>
+          <a:bodyPr/>
+          <a:lstStyle/>
+          <a:p>
+            <a:fld id="{960946CE-1557-8048-9DCC-53092B682325}" type="slidenum">
+              <a:rPr lang="en-US" smtClean="0"/>
+              <a:t>13</a:t>
+            </a:fld>
+            <a:endParaRPr lang="en-US" dirty="0"/>
+          </a:p>
+        </p:txBody>
+      </p:sp>
+      <p:pic>
+        <p:nvPicPr>
+          <p:cNvPr id="6" name="Picture 5"/>
+          <p:cNvPicPr>
+            <a:picLocks noChangeAspect="1"/>
+          </p:cNvPicPr>
+          <p:nvPr/>
+        </p:nvPicPr>
+        <p:blipFill>
+          <a:blip r:embed="rId3">
+            <a:extLst>
+              <a:ext uri="{28A0092B-C50C-407E-A947-70E740481C1C}">
+                <a14:useLocalDpi xmlns:a14="http://schemas.microsoft.com/office/drawing/2010/main" val="0"/>
+              </a:ext>
+            </a:extLst>
+          </a:blip>
+          <a:stretch>
+            <a:fillRect/>
+          </a:stretch>
+        </p:blipFill>
+        <p:spPr>
+          <a:xfrm>
+            <a:off x="3607795" y="1861603"/>
+            <a:ext cx="3224808" cy="3083942"/>
+          </a:xfrm>
+          <a:prstGeom prst="rect">
+            <a:avLst/>
+          </a:prstGeom>
+        </p:spPr>
+      </p:pic>
+      <p:sp>
+        <p:nvSpPr>
+          <p:cNvPr id="9" name="TextBox 8"/>
+          <p:cNvSpPr txBox="1"/>
+          <p:nvPr/>
+        </p:nvSpPr>
+        <p:spPr>
+          <a:xfrm>
+            <a:off x="7977336" y="4931163"/>
+            <a:ext cx="2376264" cy="584775"/>
+          </a:xfrm>
+          <a:prstGeom prst="rect">
+            <a:avLst/>
+          </a:prstGeom>
+          <a:noFill/>
+        </p:spPr>
+        <p:txBody>
+          <a:bodyPr wrap="square" rtlCol="0">
+            <a:spAutoFit/>
+          </a:bodyPr>
+          <a:lstStyle/>
+          <a:p>
+            <a:r>
+              <a:rPr lang="en-ZA" sz="3200" dirty="0" smtClean="0">
+                <a:latin typeface="Times New Roman" panose="02020603050405020304" pitchFamily="18" charset="0"/>
+                <a:cs typeface="Times New Roman" panose="02020603050405020304" pitchFamily="18" charset="0"/>
+              </a:rPr>
+              <a:t>90°</a:t>
+            </a:r>
+            <a:endParaRPr lang="en-ZA" sz="3200" dirty="0">
+              <a:latin typeface="Times New Roman" panose="02020603050405020304" pitchFamily="18" charset="0"/>
+              <a:cs typeface="Times New Roman" panose="02020603050405020304" pitchFamily="18" charset="0"/>
+            </a:endParaRPr>
+          </a:p>
+        </p:txBody>
+      </p:sp>
+      <p:sp>
+        <p:nvSpPr>
+          <p:cNvPr id="10" name="TextBox 9"/>
+          <p:cNvSpPr txBox="1"/>
+          <p:nvPr/>
+        </p:nvSpPr>
+        <p:spPr>
+          <a:xfrm>
+            <a:off x="4804905" y="4885983"/>
+            <a:ext cx="2376264" cy="584775"/>
+          </a:xfrm>
+          <a:prstGeom prst="rect">
+            <a:avLst/>
+          </a:prstGeom>
+          <a:noFill/>
+        </p:spPr>
+        <p:txBody>
+          <a:bodyPr wrap="square" rtlCol="0">
+            <a:spAutoFit/>
+          </a:bodyPr>
+          <a:lstStyle/>
+          <a:p>
+            <a:r>
+              <a:rPr lang="en-ZA" sz="3200" dirty="0" smtClean="0">
+                <a:latin typeface="Times New Roman" panose="02020603050405020304" pitchFamily="18" charset="0"/>
+                <a:cs typeface="Times New Roman" panose="02020603050405020304" pitchFamily="18" charset="0"/>
+              </a:rPr>
+              <a:t>60°</a:t>
+            </a:r>
+            <a:endParaRPr lang="en-ZA" sz="3200" dirty="0">
+              <a:latin typeface="Times New Roman" panose="02020603050405020304" pitchFamily="18" charset="0"/>
+              <a:cs typeface="Times New Roman" panose="02020603050405020304" pitchFamily="18" charset="0"/>
+            </a:endParaRPr>
+          </a:p>
+        </p:txBody>
+      </p:sp>
+      <p:sp>
+        <p:nvSpPr>
+          <p:cNvPr id="12" name="Content Placeholder 2"/>
+          <p:cNvSpPr txBox="1">
+            <a:spLocks/>
+          </p:cNvSpPr>
+          <p:nvPr/>
+        </p:nvSpPr>
+        <p:spPr bwMode="auto">
+          <a:xfrm>
+            <a:off x="210721" y="1971841"/>
+            <a:ext cx="4146584" cy="4248472"/>
+          </a:xfrm>
+          <a:prstGeom prst="rect">
+            <a:avLst/>
+          </a:prstGeom>
+          <a:noFill/>
+          <a:ln>
+            <a:noFill/>
+          </a:ln>
+          <a:extLst>
+            <a:ext uri="{909E8E84-426E-40dd-AFC4-6F175D3DCCD1}">
+              <a14:hiddenFill xmlns:a14="http://schemas.microsoft.com/office/drawing/2010/main">
+                <a:solidFill>
+                  <a:srgbClr val="FFFFFF"/>
+                </a:solidFill>
+              </a14:hiddenFill>
+            </a:ext>
+            <a:ext uri="{91240B29-F687-4f45-9708-019B960494DF}">
+              <a14:hiddenLine xmlns:a14="http://schemas.microsoft.com/office/drawing/2010/main" w="9525">
+                <a:solidFill>
+                  <a:srgbClr val="000000"/>
+                </a:solidFill>
+                <a:miter lim="800000"/>
+                <a:headEnd/>
+                <a:tailEnd/>
+              </a14:hiddenLine>
+            </a:ext>
+            <a:ext uri="{FAA26D3D-D897-4be2-8F04-BA451C77F1D7}">
+              <ma14:placeholderFlag xmlns:ma14="http://schemas.microsoft.com/office/mac/drawingml/2011/main" val="1"/>
+            </a:ext>
+          </a:extLst>
+        </p:spPr>
+        <p:txBody>
+          <a:bodyPr vert="horz" wrap="square" lIns="92075" tIns="46038" rIns="92075" bIns="46038" numCol="1" anchor="t" anchorCtr="0" compatLnSpc="1">
+            <a:prstTxWarp prst="textNoShape">
+              <a:avLst/>
+            </a:prstTxWarp>
+          </a:bodyPr>
+          <a:lstStyle>
+            <a:lvl1pPr marL="762000" indent="-571500" algn="l" defTabSz="762000" rtl="0" eaLnBrk="1" fontAlgn="base" hangingPunct="1">
+              <a:spcBef>
+                <a:spcPct val="70000"/>
+              </a:spcBef>
+              <a:spcAft>
+                <a:spcPct val="0"/>
+              </a:spcAft>
+              <a:buClr>
+                <a:srgbClr val="154E7E"/>
+              </a:buClr>
+              <a:buSzPct val="100000"/>
+              <a:buFont typeface="Wingdings" charset="0"/>
+              <a:buChar char="l"/>
+              <a:defRPr sz="2400" b="1">
+                <a:solidFill>
+                  <a:schemeClr val="tx1"/>
+                </a:solidFill>
+                <a:latin typeface="+mn-lt"/>
+                <a:ea typeface="MS PGothic" panose="020B0600070205080204" pitchFamily="34" charset="-128"/>
+                <a:cs typeface="MS PGothic" charset="0"/>
+              </a:defRPr>
+            </a:lvl1pPr>
+            <a:lvl2pPr marL="1524000" indent="-381000" algn="l" defTabSz="762000" rtl="0" eaLnBrk="1" fontAlgn="base" hangingPunct="1">
+              <a:lnSpc>
+                <a:spcPct val="90000"/>
+              </a:lnSpc>
+              <a:spcBef>
+                <a:spcPct val="30000"/>
+              </a:spcBef>
+              <a:spcAft>
+                <a:spcPct val="0"/>
+              </a:spcAft>
+              <a:buClr>
+                <a:srgbClr val="154E7E"/>
+              </a:buClr>
+              <a:buSzPct val="100000"/>
+              <a:buFont typeface="Wingdings" charset="0"/>
+              <a:buChar char="Ø"/>
+              <a:defRPr sz="2000" b="1">
+                <a:solidFill>
+                  <a:schemeClr val="tx1"/>
+                </a:solidFill>
+                <a:latin typeface="+mn-lt"/>
+                <a:ea typeface="MS PGothic" panose="020B0600070205080204" pitchFamily="34" charset="-128"/>
+                <a:cs typeface="MS PGothic" charset="0"/>
+              </a:defRPr>
+            </a:lvl2pPr>
+            <a:lvl3pPr marL="2190750" indent="-285750" algn="l" defTabSz="762000" rtl="0" eaLnBrk="1" fontAlgn="base" hangingPunct="1">
+              <a:lnSpc>
+                <a:spcPct val="90000"/>
+              </a:lnSpc>
+              <a:spcBef>
+                <a:spcPct val="30000"/>
+              </a:spcBef>
+              <a:spcAft>
+                <a:spcPct val="0"/>
+              </a:spcAft>
+              <a:buClr>
+                <a:srgbClr val="154E7E"/>
+              </a:buClr>
+              <a:buSzPct val="100000"/>
+              <a:buFont typeface="Wingdings" charset="0"/>
+              <a:buChar char="§"/>
+              <a:defRPr b="1">
+                <a:solidFill>
+                  <a:schemeClr val="tx1"/>
+                </a:solidFill>
+                <a:latin typeface="+mn-lt"/>
+                <a:ea typeface="MS PGothic" panose="020B0600070205080204" pitchFamily="34" charset="-128"/>
+                <a:cs typeface="MS PGothic" charset="0"/>
+              </a:defRPr>
+            </a:lvl3pPr>
+            <a:lvl4pPr marL="2647950" indent="-171450" algn="l" defTabSz="762000" rtl="0" eaLnBrk="1" fontAlgn="base" hangingPunct="1">
+              <a:lnSpc>
+                <a:spcPct val="90000"/>
+              </a:lnSpc>
+              <a:spcBef>
+                <a:spcPct val="30000"/>
+              </a:spcBef>
+              <a:spcAft>
+                <a:spcPct val="0"/>
+              </a:spcAft>
+              <a:buClr>
+                <a:srgbClr val="FAFD00"/>
+              </a:buClr>
+              <a:buSzPct val="100000"/>
+              <a:buFont typeface="Arial" charset="0"/>
+              <a:buChar char="•"/>
+              <a:defRPr sz="1400" b="1">
+                <a:solidFill>
+                  <a:schemeClr val="tx1"/>
+                </a:solidFill>
+                <a:latin typeface="+mn-lt"/>
+                <a:ea typeface="MS PGothic" panose="020B0600070205080204" pitchFamily="34" charset="-128"/>
+                <a:cs typeface="MS PGothic" charset="0"/>
+              </a:defRPr>
+            </a:lvl4pPr>
+            <a:lvl5pPr marL="3009900" indent="-171450" algn="l" defTabSz="762000" rtl="0" eaLnBrk="1" fontAlgn="base" hangingPunct="1">
+              <a:lnSpc>
+                <a:spcPct val="90000"/>
+              </a:lnSpc>
+              <a:spcBef>
+                <a:spcPct val="30000"/>
+              </a:spcBef>
+              <a:spcAft>
+                <a:spcPct val="0"/>
+              </a:spcAft>
+              <a:buClr>
+                <a:srgbClr val="FAFD00"/>
+              </a:buClr>
+              <a:buSzPct val="100000"/>
+              <a:buFont typeface="Arial" charset="0"/>
+              <a:buChar char="•"/>
+              <a:defRPr sz="1400" b="1">
+                <a:solidFill>
+                  <a:schemeClr val="tx1"/>
+                </a:solidFill>
+                <a:latin typeface="+mn-lt"/>
+                <a:ea typeface="MS PGothic" panose="020B0600070205080204" pitchFamily="34" charset="-128"/>
+                <a:cs typeface="MS PGothic" charset="0"/>
+              </a:defRPr>
+            </a:lvl5pPr>
+            <a:lvl6pPr marL="3467100" indent="-171450" algn="l" defTabSz="762000" rtl="0" eaLnBrk="1" fontAlgn="base" hangingPunct="1">
+              <a:lnSpc>
+                <a:spcPct val="90000"/>
+              </a:lnSpc>
+              <a:spcBef>
+                <a:spcPct val="30000"/>
+              </a:spcBef>
+              <a:spcAft>
+                <a:spcPct val="0"/>
+              </a:spcAft>
+              <a:buClr>
+                <a:srgbClr val="FAFD00"/>
+              </a:buClr>
+              <a:buSzPct val="100000"/>
+              <a:buFont typeface="Arial" charset="0"/>
+              <a:buChar char="•"/>
+              <a:defRPr sz="1400" b="1">
+                <a:solidFill>
+                  <a:schemeClr val="tx1"/>
+                </a:solidFill>
+                <a:latin typeface="+mn-lt"/>
+              </a:defRPr>
+            </a:lvl6pPr>
+            <a:lvl7pPr marL="3924300" indent="-171450" algn="l" defTabSz="762000" rtl="0" eaLnBrk="1" fontAlgn="base" hangingPunct="1">
+              <a:lnSpc>
+                <a:spcPct val="90000"/>
+              </a:lnSpc>
+              <a:spcBef>
+                <a:spcPct val="30000"/>
+              </a:spcBef>
+              <a:spcAft>
+                <a:spcPct val="0"/>
+              </a:spcAft>
+              <a:buClr>
+                <a:srgbClr val="FAFD00"/>
+              </a:buClr>
+              <a:buSzPct val="100000"/>
+              <a:buFont typeface="Arial" charset="0"/>
+              <a:buChar char="•"/>
+              <a:defRPr sz="1400" b="1">
+                <a:solidFill>
+                  <a:schemeClr val="tx1"/>
+                </a:solidFill>
+                <a:latin typeface="+mn-lt"/>
+              </a:defRPr>
+            </a:lvl7pPr>
+            <a:lvl8pPr marL="4381500" indent="-171450" algn="l" defTabSz="762000" rtl="0" eaLnBrk="1" fontAlgn="base" hangingPunct="1">
+              <a:lnSpc>
+                <a:spcPct val="90000"/>
+              </a:lnSpc>
+              <a:spcBef>
+                <a:spcPct val="30000"/>
+              </a:spcBef>
+              <a:spcAft>
+                <a:spcPct val="0"/>
+              </a:spcAft>
+              <a:buClr>
+                <a:srgbClr val="FAFD00"/>
+              </a:buClr>
+              <a:buSzPct val="100000"/>
+              <a:buFont typeface="Arial" charset="0"/>
+              <a:buChar char="•"/>
+              <a:defRPr sz="1400" b="1">
+                <a:solidFill>
+                  <a:schemeClr val="tx1"/>
+                </a:solidFill>
+                <a:latin typeface="+mn-lt"/>
+              </a:defRPr>
+            </a:lvl8pPr>
+            <a:lvl9pPr marL="4838700" indent="-171450" algn="l" defTabSz="762000" rtl="0" eaLnBrk="1" fontAlgn="base" hangingPunct="1">
+              <a:lnSpc>
+                <a:spcPct val="90000"/>
+              </a:lnSpc>
+              <a:spcBef>
+                <a:spcPct val="30000"/>
+              </a:spcBef>
+              <a:spcAft>
+                <a:spcPct val="0"/>
+              </a:spcAft>
+              <a:buClr>
+                <a:srgbClr val="FAFD00"/>
+              </a:buClr>
+              <a:buSzPct val="100000"/>
+              <a:buFont typeface="Arial" charset="0"/>
+              <a:buChar char="•"/>
+              <a:defRPr sz="1400" b="1">
+                <a:solidFill>
+                  <a:schemeClr val="tx1"/>
+                </a:solidFill>
+                <a:latin typeface="+mn-lt"/>
+              </a:defRPr>
+            </a:lvl9pPr>
+          </a:lstStyle>
+          <a:p>
+            <a:r>
+              <a:rPr lang="en-ZA" kern="0" dirty="0" smtClean="0"/>
               <a:t>Most accurate at 90°</a:t>
             </a:r>
             <a:endParaRPr lang="en-ZA" kern="0" dirty="0"/>
@@ -5653,7 +5780,7 @@
   <p:timing>
     <p:tnLst>
       <p:par>
-        <p:cTn id="1" dur="indefinite" restart="never" nodeType="tmRoot"/>
+        <p:cTn xmlns:p14="http://schemas.microsoft.com/office/powerpoint/2010/main" id="1" dur="indefinite" restart="never" nodeType="tmRoot"/>
       </p:par>
     </p:tnLst>
   </p:timing>
@@ -5694,7 +5821,7 @@
           <a:p>
             <a:r>
               <a:rPr lang="en-ZA" dirty="0" smtClean="0"/>
-              <a:t>Error</a:t>
+              <a:t>System Error Analysis</a:t>
             </a:r>
             <a:endParaRPr lang="en-ZA" dirty="0"/>
           </a:p>
@@ -5710,14 +5837,14 @@
             <p:ph idx="1"/>
             <p:extLst>
               <p:ext uri="{D42A27DB-BD31-4B8C-83A1-F6EECF244321}">
-                <p14:modId xmlns:p14="http://schemas.microsoft.com/office/powerpoint/2010/main" val="909663035"/>
+                <p14:modId xmlns:p14="http://schemas.microsoft.com/office/powerpoint/2010/main" val="310380979"/>
               </p:ext>
             </p:extLst>
           </p:nvPr>
         </p:nvGraphicFramePr>
         <p:xfrm>
-          <a:off x="2385107" y="1613235"/>
-          <a:ext cx="5664235" cy="2123440"/>
+          <a:off x="1712448" y="1684967"/>
+          <a:ext cx="6768943" cy="1920240"/>
         </p:xfrm>
         <a:graphic>
           <a:graphicData uri="http://schemas.openxmlformats.org/drawingml/2006/table">
@@ -5726,29 +5853,72 @@
                 <a:tableStyleId>{5C22544A-7EE6-4342-B048-85BDC9FD1C3A}</a:tableStyleId>
               </a:tblPr>
               <a:tblGrid>
-                <a:gridCol w="2396112">
+                <a:gridCol w="2054210"/>
+                <a:gridCol w="1917260">
                   <a:extLst>
                     <a:ext uri="{9D8B030D-6E8A-4147-A177-3AD203B41FA5}">
-                      <a16:colId xmlns:a16="http://schemas.microsoft.com/office/drawing/2014/main" val="1220490089"/>
+                      <a16:colId xmlns="" xmlns:a16="http://schemas.microsoft.com/office/drawing/2014/main" val="1220490089"/>
                     </a:ext>
                   </a:extLst>
                 </a:gridCol>
-                <a:gridCol w="1774124">
+                <a:gridCol w="1506419">
                   <a:extLst>
                     <a:ext uri="{9D8B030D-6E8A-4147-A177-3AD203B41FA5}">
-                      <a16:colId xmlns:a16="http://schemas.microsoft.com/office/drawing/2014/main" val="67218977"/>
+                      <a16:colId xmlns="" xmlns:a16="http://schemas.microsoft.com/office/drawing/2014/main" val="67218977"/>
                     </a:ext>
                   </a:extLst>
                 </a:gridCol>
-                <a:gridCol w="1493999">
+                <a:gridCol w="1291054">
                   <a:extLst>
                     <a:ext uri="{9D8B030D-6E8A-4147-A177-3AD203B41FA5}">
-                      <a16:colId xmlns:a16="http://schemas.microsoft.com/office/drawing/2014/main" val="3056518911"/>
+                      <a16:colId xmlns="" xmlns:a16="http://schemas.microsoft.com/office/drawing/2014/main" val="3056518911"/>
                     </a:ext>
                   </a:extLst>
                 </a:gridCol>
               </a:tblGrid>
-              <a:tr h="370840">
+              <a:tr h="514284">
+                <a:tc rowSpan="5">
+                  <a:txBody>
+                    <a:bodyPr/>
+                    <a:lstStyle/>
+                    <a:p>
+                      <a:pPr algn="ctr"/>
+                      <a:r>
+                        <a:rPr lang="en-ZA" sz="1600" dirty="0" smtClean="0"/>
+                        <a:t>Compensatory Amplification</a:t>
+                      </a:r>
+                      <a:endParaRPr lang="en-ZA" sz="1600" dirty="0"/>
+                    </a:p>
+                  </a:txBody>
+                  <a:tcPr>
+                    <a:lnL w="12700" cmpd="sng">
+                      <a:noFill/>
+                    </a:lnL>
+                    <a:lnR w="28575" cap="flat" cmpd="sng" algn="ctr">
+                      <a:solidFill>
+                        <a:srgbClr val="FFFFFF"/>
+                      </a:solidFill>
+                      <a:prstDash val="solid"/>
+                      <a:round/>
+                      <a:headEnd type="none" w="med" len="med"/>
+                      <a:tailEnd type="none" w="med" len="med"/>
+                    </a:lnR>
+                    <a:lnT w="12700" cmpd="sng">
+                      <a:noFill/>
+                    </a:lnT>
+                    <a:lnB w="38100" cmpd="sng">
+                      <a:noFill/>
+                    </a:lnB>
+                    <a:lnTlToBr w="12700" cmpd="sng">
+                      <a:noFill/>
+                      <a:prstDash val="solid"/>
+                    </a:lnTlToBr>
+                    <a:lnBlToTr w="12700" cmpd="sng">
+                      <a:noFill/>
+                      <a:prstDash val="solid"/>
+                    </a:lnBlToTr>
+                  </a:tcPr>
+                </a:tc>
                 <a:tc>
                   <a:txBody>
                     <a:bodyPr/>
@@ -5756,13 +5926,71 @@
                     <a:p>
                       <a:pPr algn="ctr"/>
                       <a:r>
-                        <a:rPr lang="en-ZA" dirty="0" smtClean="0"/>
+                        <a:rPr lang="en-ZA" sz="1600" dirty="0" smtClean="0"/>
                         <a:t>Applied Frequency</a:t>
                       </a:r>
                       <a:r>
-                        <a:rPr lang="en-ZA" baseline="0" dirty="0" smtClean="0"/>
+                        <a:rPr lang="en-ZA" sz="1600" baseline="0" dirty="0" smtClean="0"/>
                         <a:t> (kHz)</a:t>
                       </a:r>
+                      <a:endParaRPr lang="en-ZA" sz="1600" dirty="0"/>
+                    </a:p>
+                  </a:txBody>
+                  <a:tcPr>
+                    <a:lnL w="28575" cap="flat" cmpd="sng" algn="ctr">
+                      <a:solidFill>
+                        <a:srgbClr val="FFFFFF"/>
+                      </a:solidFill>
+                      <a:prstDash val="solid"/>
+                      <a:round/>
+                      <a:headEnd type="none" w="med" len="med"/>
+                      <a:tailEnd type="none" w="med" len="med"/>
+                    </a:lnL>
+                  </a:tcPr>
+                </a:tc>
+                <a:tc>
+                  <a:txBody>
+                    <a:bodyPr/>
+                    <a:lstStyle/>
+                    <a:p>
+                      <a:pPr algn="ctr"/>
+                      <a:r>
+                        <a:rPr lang="en-ZA" sz="1600" dirty="0" smtClean="0"/>
+                        <a:t>Frequency Band (kHz)</a:t>
+                      </a:r>
+                      <a:endParaRPr lang="en-ZA" sz="1600" dirty="0"/>
+                    </a:p>
+                  </a:txBody>
+                  <a:tcPr/>
+                </a:tc>
+                <a:tc>
+                  <a:txBody>
+                    <a:bodyPr/>
+                    <a:lstStyle/>
+                    <a:p>
+                      <a:pPr algn="ctr"/>
+                      <a:r>
+                        <a:rPr lang="en-ZA" sz="1600" dirty="0" smtClean="0"/>
+                        <a:t>Error (%)</a:t>
+                      </a:r>
+                      <a:endParaRPr lang="en-ZA" sz="1600" dirty="0"/>
+                    </a:p>
+                  </a:txBody>
+                  <a:tcPr/>
+                </a:tc>
+                <a:extLst>
+                  <a:ext uri="{0D108BD9-81ED-4DB2-BD59-A6C34878D82A}">
+                    <a16:rowId xmlns="" xmlns:a16="http://schemas.microsoft.com/office/drawing/2014/main" val="3871997748"/>
+                  </a:ext>
+                </a:extLst>
+              </a:tr>
+              <a:tr h="297958">
+                <a:tc vMerge="1">
+                  <a:txBody>
+                    <a:bodyPr/>
+                    <a:lstStyle/>
+                    <a:p>
+                      <a:pPr algn="ctr"/>
                       <a:endParaRPr lang="en-ZA" dirty="0"/>
                     </a:p>
                   </a:txBody>
@@ -5775,9 +6003,67 @@
                     <a:p>
                       <a:pPr algn="ctr"/>
                       <a:r>
-                        <a:rPr lang="en-ZA" dirty="0" smtClean="0"/>
-                        <a:t>Frequency Band (kHz)</a:t>
+                        <a:rPr lang="en-ZA" sz="1600" dirty="0" smtClean="0"/>
+                        <a:t>3.15</a:t>
                       </a:r>
+                      <a:endParaRPr lang="en-ZA" sz="1600" dirty="0"/>
+                    </a:p>
+                  </a:txBody>
+                  <a:tcPr>
+                    <a:lnL w="28575" cap="flat" cmpd="sng" algn="ctr">
+                      <a:solidFill>
+                        <a:srgbClr val="FFFFFF"/>
+                      </a:solidFill>
+                      <a:prstDash val="solid"/>
+                      <a:round/>
+                      <a:headEnd type="none" w="med" len="med"/>
+                      <a:tailEnd type="none" w="med" len="med"/>
+                    </a:lnL>
+                  </a:tcPr>
+                </a:tc>
+                <a:tc>
+                  <a:txBody>
+                    <a:bodyPr/>
+                    <a:lstStyle/>
+                    <a:p>
+                      <a:pPr algn="ctr"/>
+                      <a:r>
+                        <a:rPr lang="en-ZA" sz="1600" dirty="0" smtClean="0"/>
+                        <a:t>2.82-3.55</a:t>
+                      </a:r>
+                      <a:endParaRPr lang="en-ZA" sz="1600" dirty="0"/>
+                    </a:p>
+                  </a:txBody>
+                  <a:tcPr/>
+                </a:tc>
+                <a:tc>
+                  <a:txBody>
+                    <a:bodyPr/>
+                    <a:lstStyle/>
+                    <a:p>
+                      <a:pPr algn="ctr"/>
+                      <a:r>
+                        <a:rPr lang="en-ZA" sz="1600" dirty="0" smtClean="0"/>
+                        <a:t>0.81</a:t>
+                      </a:r>
+                      <a:endParaRPr lang="en-ZA" sz="1600" dirty="0"/>
+                    </a:p>
+                  </a:txBody>
+                  <a:tcPr/>
+                </a:tc>
+                <a:extLst>
+                  <a:ext uri="{0D108BD9-81ED-4DB2-BD59-A6C34878D82A}">
+                    <a16:rowId xmlns="" xmlns:a16="http://schemas.microsoft.com/office/drawing/2014/main" val="373921578"/>
+                  </a:ext>
+                </a:extLst>
+              </a:tr>
+              <a:tr h="297958">
+                <a:tc vMerge="1">
+                  <a:txBody>
+                    <a:bodyPr/>
+                    <a:lstStyle/>
+                    <a:p>
+                      <a:pPr algn="ctr"/>
                       <a:endParaRPr lang="en-ZA" dirty="0"/>
                     </a:p>
                   </a:txBody>
@@ -5790,87 +6076,23 @@
                     <a:p>
                       <a:pPr algn="ctr"/>
                       <a:r>
-                        <a:rPr lang="en-ZA" dirty="0" smtClean="0"/>
-                        <a:t>Error (%)</a:t>
+                        <a:rPr lang="en-ZA" sz="1600" dirty="0" smtClean="0"/>
+                        <a:t>6.30</a:t>
                       </a:r>
-                      <a:endParaRPr lang="en-ZA" dirty="0"/>
+                      <a:endParaRPr lang="en-ZA" sz="1600" dirty="0"/>
                     </a:p>
                   </a:txBody>
-                  <a:tcPr/>
-                </a:tc>
-                <a:extLst>
-                  <a:ext uri="{0D108BD9-81ED-4DB2-BD59-A6C34878D82A}">
-                    <a16:rowId xmlns:a16="http://schemas.microsoft.com/office/drawing/2014/main" val="3871997748"/>
-                  </a:ext>
-                </a:extLst>
-              </a:tr>
-              <a:tr h="370840">
-                <a:tc>
-                  <a:txBody>
-                    <a:bodyPr/>
-                    <a:lstStyle/>
-                    <a:p>
-                      <a:pPr algn="ctr"/>
-                      <a:r>
-                        <a:rPr lang="en-ZA" dirty="0" smtClean="0"/>
-                        <a:t>3.15</a:t>
-                      </a:r>
-                      <a:endParaRPr lang="en-ZA" dirty="0"/>
-                    </a:p>
-                  </a:txBody>
-                  <a:tcPr/>
-                </a:tc>
-                <a:tc>
-                  <a:txBody>
-                    <a:bodyPr/>
-                    <a:lstStyle/>
-                    <a:p>
-                      <a:pPr algn="ctr"/>
-                      <a:r>
-                        <a:rPr lang="en-ZA" dirty="0" smtClean="0"/>
-                        <a:t>2.82-3.55</a:t>
-                      </a:r>
-                      <a:endParaRPr lang="en-ZA" dirty="0"/>
-                    </a:p>
-                  </a:txBody>
-                  <a:tcPr/>
-                </a:tc>
-                <a:tc>
-                  <a:txBody>
-                    <a:bodyPr/>
-                    <a:lstStyle/>
-                    <a:p>
-                      <a:pPr algn="ctr"/>
-                      <a:r>
-                        <a:rPr lang="en-ZA" dirty="0" smtClean="0"/>
-                        <a:t>0.81</a:t>
-                      </a:r>
-                      <a:endParaRPr lang="en-ZA" dirty="0"/>
-                    </a:p>
-                  </a:txBody>
-                  <a:tcPr/>
-                </a:tc>
-                <a:extLst>
-                  <a:ext uri="{0D108BD9-81ED-4DB2-BD59-A6C34878D82A}">
-                    <a16:rowId xmlns:a16="http://schemas.microsoft.com/office/drawing/2014/main" val="373921578"/>
-                  </a:ext>
-                </a:extLst>
-              </a:tr>
-              <a:tr h="370840">
-                <a:tc>
-                  <a:txBody>
-                    <a:bodyPr/>
-                    <a:lstStyle/>
-                    <a:p>
-                      <a:pPr algn="ctr"/>
-                      <a:r>
-                        <a:rPr lang="en-ZA" dirty="0" smtClean="0"/>
-                        <a:t>6.30</a:t>
-                      </a:r>
-                      <a:endParaRPr lang="en-ZA" dirty="0"/>
-                    </a:p>
-                  </a:txBody>
-                  <a:tcPr/>
+                  <a:tcPr>
+                    <a:lnL w="28575" cap="flat" cmpd="sng" algn="ctr">
+                      <a:solidFill>
+                        <a:srgbClr val="FFFFFF"/>
+                      </a:solidFill>
+                      <a:prstDash val="solid"/>
+                      <a:round/>
+                      <a:headEnd type="none" w="med" len="med"/>
+                      <a:tailEnd type="none" w="med" len="med"/>
+                    </a:lnL>
+                  </a:tcPr>
                 </a:tc>
                 <a:tc>
                   <a:txBody>
@@ -5895,7 +6117,7 @@
                         <a:defRPr/>
                       </a:pPr>
                       <a:r>
-                        <a:rPr lang="en-ZA" dirty="0" smtClean="0"/>
+                        <a:rPr lang="en-ZA" sz="1600" dirty="0" smtClean="0"/>
                         <a:t>2.82-3.55</a:t>
                       </a:r>
                     </a:p>
@@ -5909,31 +6131,27 @@
                     <a:p>
                       <a:pPr algn="ctr"/>
                       <a:r>
-                        <a:rPr lang="en-ZA" dirty="0" smtClean="0"/>
+                        <a:rPr lang="en-ZA" sz="1600" dirty="0" smtClean="0"/>
                         <a:t>15.34</a:t>
                       </a:r>
-                      <a:endParaRPr lang="en-ZA" dirty="0"/>
+                      <a:endParaRPr lang="en-ZA" sz="1600" dirty="0"/>
                     </a:p>
                   </a:txBody>
                   <a:tcPr/>
                 </a:tc>
                 <a:extLst>
                   <a:ext uri="{0D108BD9-81ED-4DB2-BD59-A6C34878D82A}">
-                    <a16:rowId xmlns:a16="http://schemas.microsoft.com/office/drawing/2014/main" val="3868297120"/>
+                    <a16:rowId xmlns="" xmlns:a16="http://schemas.microsoft.com/office/drawing/2014/main" val="3868297120"/>
                   </a:ext>
                 </a:extLst>
               </a:tr>
-              <a:tr h="370840">
-                <a:tc>
+              <a:tr h="297958">
+                <a:tc vMerge="1">
                   <a:txBody>
                     <a:bodyPr/>
                     <a:lstStyle/>
                     <a:p>
                       <a:pPr algn="ctr"/>
-                      <a:r>
-                        <a:rPr lang="en-ZA" dirty="0" smtClean="0"/>
-                        <a:t>3.15</a:t>
-                      </a:r>
                       <a:endParaRPr lang="en-ZA" dirty="0"/>
                     </a:p>
                   </a:txBody>
@@ -5946,9 +6164,67 @@
                     <a:p>
                       <a:pPr algn="ctr"/>
                       <a:r>
-                        <a:rPr lang="en-ZA" dirty="0" smtClean="0"/>
+                        <a:rPr lang="en-ZA" sz="1600" dirty="0" smtClean="0"/>
+                        <a:t>3.15</a:t>
+                      </a:r>
+                      <a:endParaRPr lang="en-ZA" sz="1600" dirty="0"/>
+                    </a:p>
+                  </a:txBody>
+                  <a:tcPr>
+                    <a:lnL w="28575" cap="flat" cmpd="sng" algn="ctr">
+                      <a:solidFill>
+                        <a:srgbClr val="FFFFFF"/>
+                      </a:solidFill>
+                      <a:prstDash val="solid"/>
+                      <a:round/>
+                      <a:headEnd type="none" w="med" len="med"/>
+                      <a:tailEnd type="none" w="med" len="med"/>
+                    </a:lnL>
+                  </a:tcPr>
+                </a:tc>
+                <a:tc>
+                  <a:txBody>
+                    <a:bodyPr/>
+                    <a:lstStyle/>
+                    <a:p>
+                      <a:pPr algn="ctr"/>
+                      <a:r>
+                        <a:rPr lang="en-ZA" sz="1600" dirty="0" smtClean="0"/>
                         <a:t>5.62-7.08</a:t>
                       </a:r>
+                      <a:endParaRPr lang="en-ZA" sz="1600" dirty="0"/>
+                    </a:p>
+                  </a:txBody>
+                  <a:tcPr/>
+                </a:tc>
+                <a:tc>
+                  <a:txBody>
+                    <a:bodyPr/>
+                    <a:lstStyle/>
+                    <a:p>
+                      <a:pPr algn="ctr"/>
+                      <a:r>
+                        <a:rPr lang="en-ZA" sz="1600" dirty="0" smtClean="0"/>
+                        <a:t>19.56</a:t>
+                      </a:r>
+                      <a:endParaRPr lang="en-ZA" sz="1600" dirty="0"/>
+                    </a:p>
+                  </a:txBody>
+                  <a:tcPr/>
+                </a:tc>
+                <a:extLst>
+                  <a:ext uri="{0D108BD9-81ED-4DB2-BD59-A6C34878D82A}">
+                    <a16:rowId xmlns="" xmlns:a16="http://schemas.microsoft.com/office/drawing/2014/main" val="3602717608"/>
+                  </a:ext>
+                </a:extLst>
+              </a:tr>
+              <a:tr h="297958">
+                <a:tc vMerge="1">
+                  <a:txBody>
+                    <a:bodyPr/>
+                    <a:lstStyle/>
+                    <a:p>
+                      <a:pPr algn="ctr"/>
                       <a:endParaRPr lang="en-ZA" dirty="0"/>
                     </a:p>
                   </a:txBody>
@@ -5961,35 +6237,23 @@
                     <a:p>
                       <a:pPr algn="ctr"/>
                       <a:r>
-                        <a:rPr lang="en-ZA" dirty="0" smtClean="0"/>
-                        <a:t>19.56</a:t>
+                        <a:rPr lang="en-ZA" sz="1600" dirty="0" smtClean="0"/>
+                        <a:t>6.30</a:t>
                       </a:r>
-                      <a:endParaRPr lang="en-ZA" dirty="0"/>
+                      <a:endParaRPr lang="en-ZA" sz="1600" dirty="0"/>
                     </a:p>
                   </a:txBody>
-                  <a:tcPr/>
-                </a:tc>
-                <a:extLst>
-                  <a:ext uri="{0D108BD9-81ED-4DB2-BD59-A6C34878D82A}">
-                    <a16:rowId xmlns:a16="http://schemas.microsoft.com/office/drawing/2014/main" val="3602717608"/>
-                  </a:ext>
-                </a:extLst>
-              </a:tr>
-              <a:tr h="370840">
-                <a:tc>
-                  <a:txBody>
-                    <a:bodyPr/>
-                    <a:lstStyle/>
-                    <a:p>
-                      <a:pPr algn="ctr"/>
-                      <a:r>
-                        <a:rPr lang="en-ZA" dirty="0" smtClean="0"/>
-                        <a:t>6.30</a:t>
-                      </a:r>
-                      <a:endParaRPr lang="en-ZA" dirty="0"/>
-                    </a:p>
-                  </a:txBody>
-                  <a:tcPr/>
+                  <a:tcPr>
+                    <a:lnL w="28575" cap="flat" cmpd="sng" algn="ctr">
+                      <a:solidFill>
+                        <a:srgbClr val="FFFFFF"/>
+                      </a:solidFill>
+                      <a:prstDash val="solid"/>
+                      <a:round/>
+                      <a:headEnd type="none" w="med" len="med"/>
+                      <a:tailEnd type="none" w="med" len="med"/>
+                    </a:lnL>
+                  </a:tcPr>
                 </a:tc>
                 <a:tc>
                   <a:txBody>
@@ -6014,7 +6278,7 @@
                         <a:defRPr/>
                       </a:pPr>
                       <a:r>
-                        <a:rPr lang="en-ZA" dirty="0" smtClean="0"/>
+                        <a:rPr lang="en-ZA" sz="1600" dirty="0" smtClean="0"/>
                         <a:t>5.62-7.08</a:t>
                       </a:r>
                     </a:p>
@@ -6028,17 +6292,17 @@
                     <a:p>
                       <a:pPr algn="ctr"/>
                       <a:r>
-                        <a:rPr lang="en-ZA" dirty="0" smtClean="0"/>
+                        <a:rPr lang="en-ZA" sz="1600" dirty="0" smtClean="0"/>
                         <a:t>3.67</a:t>
                       </a:r>
-                      <a:endParaRPr lang="en-ZA" dirty="0"/>
+                      <a:endParaRPr lang="en-ZA" sz="1600" dirty="0"/>
                     </a:p>
                   </a:txBody>
                   <a:tcPr/>
                 </a:tc>
                 <a:extLst>
                   <a:ext uri="{0D108BD9-81ED-4DB2-BD59-A6C34878D82A}">
-                    <a16:rowId xmlns:a16="http://schemas.microsoft.com/office/drawing/2014/main" val="684964139"/>
+                    <a16:rowId xmlns="" xmlns:a16="http://schemas.microsoft.com/office/drawing/2014/main" val="684964139"/>
                   </a:ext>
                 </a:extLst>
               </a:tr>
@@ -6078,14 +6342,14 @@
           <p:nvPr>
             <p:extLst>
               <p:ext uri="{D42A27DB-BD31-4B8C-83A1-F6EECF244321}">
-                <p14:modId xmlns:p14="http://schemas.microsoft.com/office/powerpoint/2010/main" val="359993736"/>
+                <p14:modId xmlns:p14="http://schemas.microsoft.com/office/powerpoint/2010/main" val="396874633"/>
               </p:ext>
             </p:extLst>
           </p:nvPr>
         </p:nvGraphicFramePr>
         <p:xfrm>
-          <a:off x="2385108" y="3738737"/>
-          <a:ext cx="5664235" cy="2595880"/>
+          <a:off x="1712640" y="3573016"/>
+          <a:ext cx="6768752" cy="2626120"/>
         </p:xfrm>
         <a:graphic>
           <a:graphicData uri="http://schemas.openxmlformats.org/drawingml/2006/table">
@@ -6094,38 +6358,71 @@
                 <a:tableStyleId>{5C22544A-7EE6-4342-B048-85BDC9FD1C3A}</a:tableStyleId>
               </a:tblPr>
               <a:tblGrid>
-                <a:gridCol w="2592727">
+                <a:gridCol w="2054150"/>
+                <a:gridCol w="3423583">
                   <a:extLst>
                     <a:ext uri="{9D8B030D-6E8A-4147-A177-3AD203B41FA5}">
-                      <a16:colId xmlns:a16="http://schemas.microsoft.com/office/drawing/2014/main" val="3160404703"/>
+                      <a16:colId xmlns="" xmlns:a16="http://schemas.microsoft.com/office/drawing/2014/main" val="3160404703"/>
                     </a:ext>
                   </a:extLst>
                 </a:gridCol>
-                <a:gridCol w="3071508">
+                <a:gridCol w="1291019">
                   <a:extLst>
                     <a:ext uri="{9D8B030D-6E8A-4147-A177-3AD203B41FA5}">
-                      <a16:colId xmlns:a16="http://schemas.microsoft.com/office/drawing/2014/main" val="2004772524"/>
+                      <a16:colId xmlns="" xmlns:a16="http://schemas.microsoft.com/office/drawing/2014/main" val="2004772524"/>
                     </a:ext>
                   </a:extLst>
                 </a:gridCol>
               </a:tblGrid>
-              <a:tr h="370840">
-                <a:tc>
+              <a:tr h="560943">
+                <a:tc rowSpan="7">
                   <a:txBody>
                     <a:bodyPr/>
                     <a:lstStyle/>
                     <a:p>
                       <a:pPr algn="ctr"/>
                       <a:r>
-                        <a:rPr lang="en-ZA" dirty="0" smtClean="0"/>
-                        <a:t>Dial Angle (°)</a:t>
+                        <a:rPr lang="en-ZA" sz="1600" dirty="0" smtClean="0"/>
+                        <a:t>Directionality</a:t>
                       </a:r>
-                      <a:endParaRPr lang="en-ZA" dirty="0"/>
+                      <a:endParaRPr lang="en-ZA" sz="1600" dirty="0"/>
                     </a:p>
                   </a:txBody>
                   <a:tcPr>
+                    <a:lnL w="12700" cmpd="sng">
+                      <a:noFill/>
+                    </a:lnL>
+                    <a:lnR w="28575" cap="flat" cmpd="sng" algn="ctr">
+                      <a:solidFill>
+                        <a:srgbClr val="FFFFFF"/>
+                      </a:solidFill>
+                      <a:prstDash val="solid"/>
+                      <a:round/>
+                      <a:headEnd type="none" w="med" len="med"/>
+                      <a:tailEnd type="none" w="med" len="med"/>
+                    </a:lnR>
+                    <a:lnT w="28575" cap="flat" cmpd="sng" algn="ctr">
+                      <a:solidFill>
+                        <a:srgbClr val="FFFFFF"/>
+                      </a:solidFill>
+                      <a:prstDash val="solid"/>
+                      <a:round/>
+                      <a:headEnd type="none" w="med" len="med"/>
+                      <a:tailEnd type="none" w="med" len="med"/>
+                    </a:lnT>
+                    <a:lnB w="38100" cmpd="sng">
+                      <a:noFill/>
+                    </a:lnB>
+                    <a:lnTlToBr w="12700" cmpd="sng">
+                      <a:noFill/>
+                      <a:prstDash val="solid"/>
+                    </a:lnTlToBr>
+                    <a:lnBlToTr w="12700" cmpd="sng">
+                      <a:noFill/>
+                      <a:prstDash val="solid"/>
+                    </a:lnBlToTr>
                     <a:solidFill>
-                      <a:srgbClr val="42BBBE"/>
+                      <a:schemeClr val="accent1"/>
                     </a:solidFill>
                   </a:tcPr>
                 </a:tc>
@@ -6136,29 +6433,36 @@
                     <a:p>
                       <a:pPr algn="ctr"/>
                       <a:r>
-                        <a:rPr lang="en-ZA" dirty="0" smtClean="0"/>
-                        <a:t>Average</a:t>
+                        <a:rPr lang="en-ZA" sz="1600" dirty="0" smtClean="0"/>
+                        <a:t>Dial Angle (°)</a:t>
                       </a:r>
-                      <a:r>
-                        <a:rPr lang="en-ZA" baseline="0" dirty="0" smtClean="0"/>
-                        <a:t> Error (%)</a:t>
-                      </a:r>
-                      <a:endParaRPr lang="en-ZA" dirty="0"/>
+                      <a:endParaRPr lang="en-ZA" sz="1600" dirty="0"/>
                     </a:p>
                   </a:txBody>
                   <a:tcPr>
+                    <a:lnL w="28575" cap="flat" cmpd="sng" algn="ctr">
+                      <a:solidFill>
+                        <a:srgbClr val="FFFFFF"/>
+                      </a:solidFill>
+                      <a:prstDash val="solid"/>
+                      <a:round/>
+                      <a:headEnd type="none" w="med" len="med"/>
+                      <a:tailEnd type="none" w="med" len="med"/>
+                    </a:lnL>
+                    <a:lnT w="28575" cap="flat" cmpd="sng" algn="ctr">
+                      <a:solidFill>
+                        <a:srgbClr val="FFFFFF"/>
+                      </a:solidFill>
+                      <a:prstDash val="solid"/>
+                      <a:round/>
+                      <a:headEnd type="none" w="med" len="med"/>
+                      <a:tailEnd type="none" w="med" len="med"/>
+                    </a:lnT>
                     <a:solidFill>
-                      <a:srgbClr val="42BBBE"/>
+                      <a:srgbClr val="3399FF"/>
                     </a:solidFill>
                   </a:tcPr>
                 </a:tc>
-                <a:extLst>
-                  <a:ext uri="{0D108BD9-81ED-4DB2-BD59-A6C34878D82A}">
-                    <a16:rowId xmlns:a16="http://schemas.microsoft.com/office/drawing/2014/main" val="3857195092"/>
-                  </a:ext>
-                </a:extLst>
-              </a:tr>
-              <a:tr h="370840">
                 <a:tc>
                   <a:txBody>
                     <a:bodyPr/>
@@ -6166,9 +6470,44 @@
                     <a:p>
                       <a:pPr algn="ctr"/>
                       <a:r>
-                        <a:rPr lang="en-ZA" dirty="0" smtClean="0"/>
-                        <a:t>0</a:t>
+                        <a:rPr lang="en-ZA" sz="1600" dirty="0" smtClean="0"/>
+                        <a:t>Average</a:t>
                       </a:r>
+                      <a:r>
+                        <a:rPr lang="en-ZA" sz="1600" baseline="0" dirty="0" smtClean="0"/>
+                        <a:t> Error (%)</a:t>
+                      </a:r>
+                      <a:endParaRPr lang="en-ZA" sz="1600" dirty="0"/>
+                    </a:p>
+                  </a:txBody>
+                  <a:tcPr>
+                    <a:lnT w="28575" cap="flat" cmpd="sng" algn="ctr">
+                      <a:solidFill>
+                        <a:srgbClr val="FFFFFF"/>
+                      </a:solidFill>
+                      <a:prstDash val="solid"/>
+                      <a:round/>
+                      <a:headEnd type="none" w="med" len="med"/>
+                      <a:tailEnd type="none" w="med" len="med"/>
+                    </a:lnT>
+                    <a:solidFill>
+                      <a:srgbClr val="3399FF"/>
+                    </a:solidFill>
+                  </a:tcPr>
+                </a:tc>
+                <a:extLst>
+                  <a:ext uri="{0D108BD9-81ED-4DB2-BD59-A6C34878D82A}">
+                    <a16:rowId xmlns="" xmlns:a16="http://schemas.microsoft.com/office/drawing/2014/main" val="3857195092"/>
+                  </a:ext>
+                </a:extLst>
+              </a:tr>
+              <a:tr h="324756">
+                <a:tc vMerge="1">
+                  <a:txBody>
+                    <a:bodyPr/>
+                    <a:lstStyle/>
+                    <a:p>
+                      <a:pPr algn="ctr"/>
                       <a:endParaRPr lang="en-ZA" dirty="0"/>
                     </a:p>
                   </a:txBody>
@@ -6181,21 +6520,24 @@
                     <a:p>
                       <a:pPr algn="ctr"/>
                       <a:r>
-                        <a:rPr lang="en-ZA" dirty="0" smtClean="0"/>
-                        <a:t>46.6</a:t>
+                        <a:rPr lang="en-ZA" sz="1600" dirty="0" smtClean="0"/>
+                        <a:t>0</a:t>
                       </a:r>
-                      <a:endParaRPr lang="en-ZA" dirty="0"/>
+                      <a:endParaRPr lang="en-ZA" sz="1600" dirty="0"/>
                     </a:p>
                   </a:txBody>
-                  <a:tcPr/>
+                  <a:tcPr>
+                    <a:lnL w="28575" cap="flat" cmpd="sng" algn="ctr">
+                      <a:solidFill>
+                        <a:srgbClr val="FFFFFF"/>
+                      </a:solidFill>
+                      <a:prstDash val="solid"/>
+                      <a:round/>
+                      <a:headEnd type="none" w="med" len="med"/>
+                      <a:tailEnd type="none" w="med" len="med"/>
+                    </a:lnL>
+                  </a:tcPr>
                 </a:tc>
-                <a:extLst>
-                  <a:ext uri="{0D108BD9-81ED-4DB2-BD59-A6C34878D82A}">
-                    <a16:rowId xmlns:a16="http://schemas.microsoft.com/office/drawing/2014/main" val="1176978316"/>
-                  </a:ext>
-                </a:extLst>
-              </a:tr>
-              <a:tr h="370840">
                 <a:tc>
                   <a:txBody>
                     <a:bodyPr/>
@@ -6203,9 +6545,27 @@
                     <a:p>
                       <a:pPr algn="ctr"/>
                       <a:r>
-                        <a:rPr lang="en-ZA" dirty="0" smtClean="0"/>
-                        <a:t>60</a:t>
+                        <a:rPr lang="en-ZA" sz="1600" dirty="0" smtClean="0"/>
+                        <a:t>46.6</a:t>
                       </a:r>
+                      <a:endParaRPr lang="en-ZA" sz="1600" dirty="0"/>
+                    </a:p>
+                  </a:txBody>
+                  <a:tcPr/>
+                </a:tc>
+                <a:extLst>
+                  <a:ext uri="{0D108BD9-81ED-4DB2-BD59-A6C34878D82A}">
+                    <a16:rowId xmlns="" xmlns:a16="http://schemas.microsoft.com/office/drawing/2014/main" val="1176978316"/>
+                  </a:ext>
+                </a:extLst>
+              </a:tr>
+              <a:tr h="324756">
+                <a:tc vMerge="1">
+                  <a:txBody>
+                    <a:bodyPr/>
+                    <a:lstStyle/>
+                    <a:p>
+                      <a:pPr algn="ctr"/>
                       <a:endParaRPr lang="en-ZA" dirty="0"/>
                     </a:p>
                   </a:txBody>
@@ -6218,21 +6578,24 @@
                     <a:p>
                       <a:pPr algn="ctr"/>
                       <a:r>
-                        <a:rPr lang="en-ZA" dirty="0" smtClean="0"/>
-                        <a:t>30.7</a:t>
+                        <a:rPr lang="en-ZA" sz="1600" dirty="0" smtClean="0"/>
+                        <a:t>60</a:t>
                       </a:r>
-                      <a:endParaRPr lang="en-ZA" dirty="0"/>
+                      <a:endParaRPr lang="en-ZA" sz="1600" dirty="0"/>
                     </a:p>
                   </a:txBody>
-                  <a:tcPr/>
+                  <a:tcPr>
+                    <a:lnL w="28575" cap="flat" cmpd="sng" algn="ctr">
+                      <a:solidFill>
+                        <a:srgbClr val="FFFFFF"/>
+                      </a:solidFill>
+                      <a:prstDash val="solid"/>
+                      <a:round/>
+                      <a:headEnd type="none" w="med" len="med"/>
+                      <a:tailEnd type="none" w="med" len="med"/>
+                    </a:lnL>
+                  </a:tcPr>
                 </a:tc>
-                <a:extLst>
-                  <a:ext uri="{0D108BD9-81ED-4DB2-BD59-A6C34878D82A}">
-                    <a16:rowId xmlns:a16="http://schemas.microsoft.com/office/drawing/2014/main" val="1271360358"/>
-                  </a:ext>
-                </a:extLst>
-              </a:tr>
-              <a:tr h="370840">
                 <a:tc>
                   <a:txBody>
                     <a:bodyPr/>
@@ -6240,9 +6603,27 @@
                     <a:p>
                       <a:pPr algn="ctr"/>
                       <a:r>
-                        <a:rPr lang="en-ZA" dirty="0" smtClean="0"/>
-                        <a:t>90</a:t>
+                        <a:rPr lang="en-ZA" sz="1600" dirty="0" smtClean="0"/>
+                        <a:t>30.7</a:t>
                       </a:r>
+                      <a:endParaRPr lang="en-ZA" sz="1600" dirty="0"/>
+                    </a:p>
+                  </a:txBody>
+                  <a:tcPr/>
+                </a:tc>
+                <a:extLst>
+                  <a:ext uri="{0D108BD9-81ED-4DB2-BD59-A6C34878D82A}">
+                    <a16:rowId xmlns="" xmlns:a16="http://schemas.microsoft.com/office/drawing/2014/main" val="1271360358"/>
+                  </a:ext>
+                </a:extLst>
+              </a:tr>
+              <a:tr h="324756">
+                <a:tc vMerge="1">
+                  <a:txBody>
+                    <a:bodyPr/>
+                    <a:lstStyle/>
+                    <a:p>
+                      <a:pPr algn="ctr"/>
                       <a:endParaRPr lang="en-ZA" dirty="0"/>
                     </a:p>
                   </a:txBody>
@@ -6255,21 +6636,24 @@
                     <a:p>
                       <a:pPr algn="ctr"/>
                       <a:r>
-                        <a:rPr lang="en-ZA" dirty="0" smtClean="0"/>
-                        <a:t>12.7</a:t>
+                        <a:rPr lang="en-ZA" sz="1600" dirty="0" smtClean="0"/>
+                        <a:t>90</a:t>
                       </a:r>
-                      <a:endParaRPr lang="en-ZA" dirty="0"/>
+                      <a:endParaRPr lang="en-ZA" sz="1600" dirty="0"/>
                     </a:p>
                   </a:txBody>
-                  <a:tcPr/>
+                  <a:tcPr>
+                    <a:lnL w="28575" cap="flat" cmpd="sng" algn="ctr">
+                      <a:solidFill>
+                        <a:srgbClr val="FFFFFF"/>
+                      </a:solidFill>
+                      <a:prstDash val="solid"/>
+                      <a:round/>
+                      <a:headEnd type="none" w="med" len="med"/>
+                      <a:tailEnd type="none" w="med" len="med"/>
+                    </a:lnL>
+                  </a:tcPr>
                 </a:tc>
-                <a:extLst>
-                  <a:ext uri="{0D108BD9-81ED-4DB2-BD59-A6C34878D82A}">
-                    <a16:rowId xmlns:a16="http://schemas.microsoft.com/office/drawing/2014/main" val="2734475198"/>
-                  </a:ext>
-                </a:extLst>
-              </a:tr>
-              <a:tr h="370840">
                 <a:tc>
                   <a:txBody>
                     <a:bodyPr/>
@@ -6277,9 +6661,27 @@
                     <a:p>
                       <a:pPr algn="ctr"/>
                       <a:r>
-                        <a:rPr lang="en-ZA" dirty="0" smtClean="0"/>
-                        <a:t>120</a:t>
+                        <a:rPr lang="en-ZA" sz="1600" dirty="0" smtClean="0"/>
+                        <a:t>12.7</a:t>
                       </a:r>
+                      <a:endParaRPr lang="en-ZA" sz="1600" dirty="0"/>
+                    </a:p>
+                  </a:txBody>
+                  <a:tcPr/>
+                </a:tc>
+                <a:extLst>
+                  <a:ext uri="{0D108BD9-81ED-4DB2-BD59-A6C34878D82A}">
+                    <a16:rowId xmlns="" xmlns:a16="http://schemas.microsoft.com/office/drawing/2014/main" val="2734475198"/>
+                  </a:ext>
+                </a:extLst>
+              </a:tr>
+              <a:tr h="324756">
+                <a:tc vMerge="1">
+                  <a:txBody>
+                    <a:bodyPr/>
+                    <a:lstStyle/>
+                    <a:p>
+                      <a:pPr algn="ctr"/>
                       <a:endParaRPr lang="en-ZA" dirty="0"/>
                     </a:p>
                   </a:txBody>
@@ -6292,21 +6694,24 @@
                     <a:p>
                       <a:pPr algn="ctr"/>
                       <a:r>
-                        <a:rPr lang="en-ZA" dirty="0" smtClean="0"/>
-                        <a:t>22.7</a:t>
+                        <a:rPr lang="en-ZA" sz="1600" dirty="0" smtClean="0"/>
+                        <a:t>120</a:t>
                       </a:r>
-                      <a:endParaRPr lang="en-ZA" dirty="0"/>
+                      <a:endParaRPr lang="en-ZA" sz="1600" dirty="0"/>
                     </a:p>
                   </a:txBody>
-                  <a:tcPr/>
+                  <a:tcPr>
+                    <a:lnL w="28575" cap="flat" cmpd="sng" algn="ctr">
+                      <a:solidFill>
+                        <a:srgbClr val="FFFFFF"/>
+                      </a:solidFill>
+                      <a:prstDash val="solid"/>
+                      <a:round/>
+                      <a:headEnd type="none" w="med" len="med"/>
+                      <a:tailEnd type="none" w="med" len="med"/>
+                    </a:lnL>
+                  </a:tcPr>
                 </a:tc>
-                <a:extLst>
-                  <a:ext uri="{0D108BD9-81ED-4DB2-BD59-A6C34878D82A}">
-                    <a16:rowId xmlns:a16="http://schemas.microsoft.com/office/drawing/2014/main" val="1320419717"/>
-                  </a:ext>
-                </a:extLst>
-              </a:tr>
-              <a:tr h="370840">
                 <a:tc>
                   <a:txBody>
                     <a:bodyPr/>
@@ -6314,9 +6719,27 @@
                     <a:p>
                       <a:pPr algn="ctr"/>
                       <a:r>
-                        <a:rPr lang="en-ZA" dirty="0" smtClean="0"/>
-                        <a:t>180</a:t>
+                        <a:rPr lang="en-ZA" sz="1600" dirty="0" smtClean="0"/>
+                        <a:t>22.7</a:t>
                       </a:r>
+                      <a:endParaRPr lang="en-ZA" sz="1600" dirty="0"/>
+                    </a:p>
+                  </a:txBody>
+                  <a:tcPr/>
+                </a:tc>
+                <a:extLst>
+                  <a:ext uri="{0D108BD9-81ED-4DB2-BD59-A6C34878D82A}">
+                    <a16:rowId xmlns="" xmlns:a16="http://schemas.microsoft.com/office/drawing/2014/main" val="1320419717"/>
+                  </a:ext>
+                </a:extLst>
+              </a:tr>
+              <a:tr h="324756">
+                <a:tc vMerge="1">
+                  <a:txBody>
+                    <a:bodyPr/>
+                    <a:lstStyle/>
+                    <a:p>
+                      <a:pPr algn="ctr"/>
                       <a:endParaRPr lang="en-ZA" dirty="0"/>
                     </a:p>
                   </a:txBody>
@@ -6329,21 +6752,24 @@
                     <a:p>
                       <a:pPr algn="ctr"/>
                       <a:r>
-                        <a:rPr lang="en-ZA" dirty="0" smtClean="0"/>
-                        <a:t>51.7</a:t>
+                        <a:rPr lang="en-ZA" sz="1600" dirty="0" smtClean="0"/>
+                        <a:t>180</a:t>
                       </a:r>
-                      <a:endParaRPr lang="en-ZA" dirty="0"/>
+                      <a:endParaRPr lang="en-ZA" sz="1600" dirty="0"/>
                     </a:p>
                   </a:txBody>
-                  <a:tcPr/>
+                  <a:tcPr>
+                    <a:lnL w="28575" cap="flat" cmpd="sng" algn="ctr">
+                      <a:solidFill>
+                        <a:srgbClr val="FFFFFF"/>
+                      </a:solidFill>
+                      <a:prstDash val="solid"/>
+                      <a:round/>
+                      <a:headEnd type="none" w="med" len="med"/>
+                      <a:tailEnd type="none" w="med" len="med"/>
+                    </a:lnL>
+                  </a:tcPr>
                 </a:tc>
-                <a:extLst>
-                  <a:ext uri="{0D108BD9-81ED-4DB2-BD59-A6C34878D82A}">
-                    <a16:rowId xmlns:a16="http://schemas.microsoft.com/office/drawing/2014/main" val="2814437447"/>
-                  </a:ext>
-                </a:extLst>
-              </a:tr>
-              <a:tr h="370840">
                 <a:tc>
                   <a:txBody>
                     <a:bodyPr/>
@@ -6351,9 +6777,27 @@
                     <a:p>
                       <a:pPr algn="ctr"/>
                       <a:r>
-                        <a:rPr lang="en-ZA" dirty="0" smtClean="0"/>
-                        <a:t>Omni-directional</a:t>
+                        <a:rPr lang="en-ZA" sz="1600" dirty="0" smtClean="0"/>
+                        <a:t>51.7</a:t>
                       </a:r>
+                      <a:endParaRPr lang="en-ZA" sz="1600" dirty="0"/>
+                    </a:p>
+                  </a:txBody>
+                  <a:tcPr/>
+                </a:tc>
+                <a:extLst>
+                  <a:ext uri="{0D108BD9-81ED-4DB2-BD59-A6C34878D82A}">
+                    <a16:rowId xmlns="" xmlns:a16="http://schemas.microsoft.com/office/drawing/2014/main" val="2814437447"/>
+                  </a:ext>
+                </a:extLst>
+              </a:tr>
+              <a:tr h="370600">
+                <a:tc vMerge="1">
+                  <a:txBody>
+                    <a:bodyPr/>
+                    <a:lstStyle/>
+                    <a:p>
+                      <a:pPr algn="ctr"/>
                       <a:endParaRPr lang="en-ZA" dirty="0"/>
                     </a:p>
                   </a:txBody>
@@ -6366,58 +6810,24 @@
                     <a:p>
                       <a:pPr algn="ctr"/>
                       <a:r>
-                        <a:rPr lang="en-ZA" dirty="0" smtClean="0"/>
-                        <a:t>42.7</a:t>
+                        <a:rPr lang="en-ZA" sz="1600" dirty="0" smtClean="0"/>
+                        <a:t>Omni-directional</a:t>
                       </a:r>
-                      <a:endParaRPr lang="en-ZA" dirty="0"/>
+                      <a:endParaRPr lang="en-ZA" sz="1600" dirty="0"/>
                     </a:p>
                   </a:txBody>
-                  <a:tcPr/>
+                  <a:tcPr>
+                    <a:lnL w="28575" cap="flat" cmpd="sng" algn="ctr">
+                      <a:solidFill>
+                        <a:srgbClr val="FFFFFF"/>
+                      </a:solidFill>
+                      <a:prstDash val="solid"/>
+                      <a:round/>
+                      <a:headEnd type="none" w="med" len="med"/>
+                      <a:tailEnd type="none" w="med" len="med"/>
+                    </a:lnL>
+                  </a:tcPr>
                 </a:tc>
-                <a:extLst>
-                  <a:ext uri="{0D108BD9-81ED-4DB2-BD59-A6C34878D82A}">
-                    <a16:rowId xmlns:a16="http://schemas.microsoft.com/office/drawing/2014/main" val="3814854473"/>
-                  </a:ext>
-                </a:extLst>
-              </a:tr>
-            </a:tbl>
-          </a:graphicData>
-        </a:graphic>
-      </p:graphicFrame>
-      <p:graphicFrame>
-        <p:nvGraphicFramePr>
-          <p:cNvPr id="7" name="Table 6"/>
-          <p:cNvGraphicFramePr>
-            <a:graphicFrameLocks noGrp="1"/>
-          </p:cNvGraphicFramePr>
-          <p:nvPr>
-            <p:extLst>
-              <p:ext uri="{D42A27DB-BD31-4B8C-83A1-F6EECF244321}">
-                <p14:modId xmlns:p14="http://schemas.microsoft.com/office/powerpoint/2010/main" val="3524645174"/>
-              </p:ext>
-            </p:extLst>
-          </p:nvPr>
-        </p:nvGraphicFramePr>
-        <p:xfrm>
-          <a:off x="342900" y="1613235"/>
-          <a:ext cx="2042206" cy="4696085"/>
-        </p:xfrm>
-        <a:graphic>
-          <a:graphicData uri="http://schemas.openxmlformats.org/drawingml/2006/table">
-            <a:tbl>
-              <a:tblPr firstRow="1" bandRow="1">
-                <a:tableStyleId>{5C22544A-7EE6-4342-B048-85BDC9FD1C3A}</a:tableStyleId>
-              </a:tblPr>
-              <a:tblGrid>
-                <a:gridCol w="2042206">
-                  <a:extLst>
-                    <a:ext uri="{9D8B030D-6E8A-4147-A177-3AD203B41FA5}">
-                      <a16:colId xmlns:a16="http://schemas.microsoft.com/office/drawing/2014/main" val="2519371752"/>
-                    </a:ext>
-                  </a:extLst>
-                </a:gridCol>
-              </a:tblGrid>
-              <a:tr h="2095189">
                 <a:tc>
                   <a:txBody>
                     <a:bodyPr/>
@@ -6425,51 +6835,17 @@
                     <a:p>
                       <a:pPr algn="ctr"/>
                       <a:r>
-                        <a:rPr lang="en-ZA" dirty="0" smtClean="0"/>
-                        <a:t>Compensatory gain</a:t>
+                        <a:rPr lang="en-ZA" sz="1600" dirty="0" smtClean="0"/>
+                        <a:t>42.7</a:t>
                       </a:r>
-                      <a:endParaRPr lang="en-ZA" dirty="0"/>
+                      <a:endParaRPr lang="en-ZA" sz="1600" dirty="0"/>
                     </a:p>
                   </a:txBody>
                   <a:tcPr/>
                 </a:tc>
                 <a:extLst>
                   <a:ext uri="{0D108BD9-81ED-4DB2-BD59-A6C34878D82A}">
-                    <a16:rowId xmlns:a16="http://schemas.microsoft.com/office/drawing/2014/main" val="1666516480"/>
-                  </a:ext>
-                </a:extLst>
-              </a:tr>
-              <a:tr h="2600896">
-                <a:tc>
-                  <a:txBody>
-                    <a:bodyPr/>
-                    <a:lstStyle/>
-                    <a:p>
-                      <a:pPr algn="ctr"/>
-                      <a:r>
-                        <a:rPr lang="en-ZA" b="1" dirty="0" smtClean="0">
-                          <a:solidFill>
-                            <a:schemeClr val="bg1"/>
-                          </a:solidFill>
-                        </a:rPr>
-                        <a:t>Directionality</a:t>
-                      </a:r>
-                      <a:endParaRPr lang="en-ZA" b="1" dirty="0">
-                        <a:solidFill>
-                          <a:schemeClr val="bg1"/>
-                        </a:solidFill>
-                      </a:endParaRPr>
-                    </a:p>
-                  </a:txBody>
-                  <a:tcPr>
-                    <a:solidFill>
-                      <a:srgbClr val="42BBBE"/>
-                    </a:solidFill>
-                  </a:tcPr>
-                </a:tc>
-                <a:extLst>
-                  <a:ext uri="{0D108BD9-81ED-4DB2-BD59-A6C34878D82A}">
-                    <a16:rowId xmlns:a16="http://schemas.microsoft.com/office/drawing/2014/main" val="1255144714"/>
+                    <a16:rowId xmlns="" xmlns:a16="http://schemas.microsoft.com/office/drawing/2014/main" val="3814854473"/>
                   </a:ext>
                 </a:extLst>
               </a:tr>
@@ -6487,6 +6863,13 @@
   <p:clrMapOvr>
     <a:masterClrMapping/>
   </p:clrMapOvr>
+  <p:timing>
+    <p:tnLst>
+      <p:par>
+        <p:cTn xmlns:p14="http://schemas.microsoft.com/office/powerpoint/2010/main" id="1" dur="indefinite" restart="never" nodeType="tmRoot"/>
+      </p:par>
+    </p:tnLst>
+  </p:timing>
 </p:sld>
 </file>
 
@@ -6709,7 +7092,7 @@
   <p:timing>
     <p:tnLst>
       <p:par>
-        <p:cTn id="1" dur="indefinite" restart="never" nodeType="tmRoot"/>
+        <p:cTn xmlns:p14="http://schemas.microsoft.com/office/powerpoint/2010/main" id="1" dur="indefinite" restart="never" nodeType="tmRoot"/>
       </p:par>
     </p:tnLst>
   </p:timing>
@@ -6811,7 +7194,7 @@
   <p:timing>
     <p:tnLst>
       <p:par>
-        <p:cTn id="1" dur="indefinite" restart="never" nodeType="tmRoot"/>
+        <p:cTn xmlns:p14="http://schemas.microsoft.com/office/powerpoint/2010/main" id="1" dur="indefinite" restart="never" nodeType="tmRoot"/>
       </p:par>
     </p:tnLst>
   </p:timing>
@@ -6852,7 +7235,7 @@
           <a:p>
             <a:r>
               <a:rPr lang="en-US" dirty="0" smtClean="0"/>
-              <a:t>Overview</a:t>
+              <a:t>Outline</a:t>
             </a:r>
             <a:endParaRPr lang="en-US" dirty="0"/>
           </a:p>
@@ -6868,12 +7251,87 @@
             <p:ph idx="1"/>
           </p:nvPr>
         </p:nvSpPr>
-        <p:spPr/>
+        <p:spPr>
+          <a:xfrm>
+            <a:off x="342900" y="1993902"/>
+            <a:ext cx="9067800" cy="4727573"/>
+          </a:xfrm>
+        </p:spPr>
         <p:txBody>
           <a:bodyPr/>
           <a:lstStyle/>
           <a:p>
-            <a:endParaRPr lang="en-US"/>
+            <a:r>
+              <a:rPr lang="en-ZA" dirty="0"/>
+              <a:t>Objectives and </a:t>
+            </a:r>
+            <a:r>
+              <a:rPr lang="en-ZA" dirty="0" smtClean="0"/>
+              <a:t>Specifications</a:t>
+            </a:r>
+          </a:p>
+          <a:p>
+            <a:r>
+              <a:rPr lang="en-ZA" dirty="0" smtClean="0"/>
+              <a:t>System Block Diagram</a:t>
+            </a:r>
+          </a:p>
+          <a:p>
+            <a:r>
+              <a:rPr lang="en-ZA" dirty="0"/>
+              <a:t>Simulated vs Hardware Hearing </a:t>
+            </a:r>
+            <a:r>
+              <a:rPr lang="en-ZA" dirty="0" smtClean="0"/>
+              <a:t>Aid</a:t>
+            </a:r>
+          </a:p>
+          <a:p>
+            <a:r>
+              <a:rPr lang="en-ZA" dirty="0" smtClean="0"/>
+              <a:t>Hearing </a:t>
+            </a:r>
+            <a:r>
+              <a:rPr lang="en-ZA" dirty="0" smtClean="0"/>
+              <a:t>Aid </a:t>
+            </a:r>
+            <a:r>
+              <a:rPr lang="en-ZA" dirty="0"/>
+              <a:t>F</a:t>
+            </a:r>
+            <a:r>
+              <a:rPr lang="en-ZA" dirty="0" smtClean="0"/>
+              <a:t>unctionality</a:t>
+            </a:r>
+            <a:endParaRPr lang="en-ZA" dirty="0" smtClean="0"/>
+          </a:p>
+          <a:p>
+            <a:r>
+              <a:rPr lang="en-ZA" dirty="0" smtClean="0"/>
+              <a:t>Cost Breakdown</a:t>
+            </a:r>
+          </a:p>
+          <a:p>
+            <a:r>
+              <a:rPr lang="en-ZA" dirty="0" smtClean="0"/>
+              <a:t>Results</a:t>
+            </a:r>
+          </a:p>
+          <a:p>
+            <a:r>
+              <a:rPr lang="en-ZA" dirty="0" smtClean="0"/>
+              <a:t>Future Work and Conclusion</a:t>
+            </a:r>
+            <a:endParaRPr lang="en-ZA" dirty="0" smtClean="0"/>
+          </a:p>
+          <a:p>
+            <a:endParaRPr lang="en-ZA" dirty="0" smtClean="0"/>
+          </a:p>
+          <a:p>
+            <a:endParaRPr lang="en-ZA" dirty="0" smtClean="0"/>
+          </a:p>
+          <a:p>
+            <a:endParaRPr lang="en-US" dirty="0"/>
           </a:p>
         </p:txBody>
       </p:sp>
@@ -6913,7 +7371,7 @@
   <p:timing>
     <p:tnLst>
       <p:par>
-        <p:cTn id="1" dur="indefinite" restart="never" nodeType="tmRoot"/>
+        <p:cTn xmlns:p14="http://schemas.microsoft.com/office/powerpoint/2010/main" id="1" dur="indefinite" restart="never" nodeType="tmRoot"/>
       </p:par>
     </p:tnLst>
   </p:timing>
@@ -6981,87 +7439,83 @@
           <a:lstStyle/>
           <a:p>
             <a:r>
-              <a:rPr lang="en-ZA" b="0" dirty="0" smtClean="0"/>
+              <a:rPr lang="en-ZA" dirty="0" smtClean="0"/>
               <a:t>To develop a low cost </a:t>
             </a:r>
             <a:r>
-              <a:rPr lang="en-ZA" b="0" dirty="0"/>
+              <a:rPr lang="en-ZA" dirty="0"/>
               <a:t>hearing </a:t>
             </a:r>
             <a:r>
-              <a:rPr lang="en-ZA" b="0" dirty="0" smtClean="0"/>
+              <a:rPr lang="en-ZA" dirty="0" smtClean="0"/>
               <a:t>aid</a:t>
             </a:r>
           </a:p>
           <a:p>
             <a:r>
-              <a:rPr lang="en-ZA" b="0" dirty="0" smtClean="0"/>
+              <a:rPr lang="en-ZA" dirty="0" smtClean="0"/>
               <a:t>Functionality:</a:t>
             </a:r>
-            <a:endParaRPr lang="en-ZA" b="0" dirty="0"/>
+            <a:endParaRPr lang="en-ZA" dirty="0"/>
           </a:p>
           <a:p>
             <a:pPr lvl="1"/>
             <a:r>
-              <a:rPr lang="en-ZA" b="0" dirty="0" smtClean="0"/>
+              <a:rPr lang="en-ZA" dirty="0" smtClean="0"/>
               <a:t>Amplifying </a:t>
             </a:r>
             <a:r>
-              <a:rPr lang="en-ZA" b="0" dirty="0"/>
+              <a:rPr lang="en-ZA" dirty="0"/>
               <a:t>specific frequency bands according to a person’s </a:t>
             </a:r>
             <a:r>
-              <a:rPr lang="en-ZA" b="0" dirty="0" smtClean="0"/>
+              <a:rPr lang="en-ZA" dirty="0" smtClean="0"/>
               <a:t>audiogram</a:t>
             </a:r>
           </a:p>
           <a:p>
             <a:pPr lvl="1"/>
             <a:r>
-              <a:rPr lang="en-ZA" b="0" dirty="0" smtClean="0"/>
+              <a:rPr lang="en-ZA" dirty="0" smtClean="0"/>
               <a:t>User tuneable directionality</a:t>
             </a:r>
-            <a:endParaRPr lang="en-ZA" b="0" dirty="0"/>
-          </a:p>
-          <a:p>
-            <a:r>
-              <a:rPr lang="en-ZA" b="0" dirty="0" smtClean="0"/>
+            <a:endParaRPr lang="en-ZA" dirty="0"/>
+          </a:p>
+          <a:p>
+            <a:r>
+              <a:rPr lang="en-ZA" dirty="0" smtClean="0"/>
               <a:t>Done in the form of:</a:t>
             </a:r>
-            <a:endParaRPr lang="en-ZA" b="0" dirty="0"/>
+            <a:endParaRPr lang="en-ZA" dirty="0"/>
           </a:p>
           <a:p>
             <a:pPr lvl="1"/>
             <a:r>
-              <a:rPr lang="en-ZA" b="0" dirty="0"/>
+              <a:rPr lang="en-ZA" dirty="0"/>
               <a:t> </a:t>
             </a:r>
             <a:r>
-              <a:rPr lang="en-ZA" b="0" dirty="0" smtClean="0"/>
+              <a:rPr lang="en-ZA" dirty="0" smtClean="0"/>
               <a:t>Software simulation</a:t>
             </a:r>
-            <a:endParaRPr lang="en-ZA" b="0" dirty="0"/>
+            <a:endParaRPr lang="en-ZA" dirty="0"/>
           </a:p>
           <a:p>
             <a:pPr lvl="1"/>
             <a:r>
-              <a:rPr lang="en-ZA" b="0" dirty="0"/>
-              <a:t> </a:t>
-            </a:r>
-            <a:r>
-              <a:rPr lang="en-ZA" b="0" dirty="0"/>
-              <a:t>H</a:t>
-            </a:r>
-            <a:r>
-              <a:rPr lang="en-ZA" b="0" dirty="0" smtClean="0"/>
+              <a:rPr lang="en-ZA" dirty="0"/>
+              <a:t> H</a:t>
+            </a:r>
+            <a:r>
+              <a:rPr lang="en-ZA" dirty="0" smtClean="0"/>
               <a:t>ardware </a:t>
             </a:r>
             <a:r>
-              <a:rPr lang="en-ZA" b="0" dirty="0"/>
+              <a:rPr lang="en-ZA" dirty="0"/>
               <a:t>proof of </a:t>
             </a:r>
             <a:r>
-              <a:rPr lang="en-ZA" b="0" dirty="0" smtClean="0"/>
+              <a:rPr lang="en-ZA" dirty="0" smtClean="0"/>
               <a:t>concept</a:t>
             </a:r>
             <a:endParaRPr lang="en-ZA" dirty="0"/>
@@ -7104,7 +7558,7 @@
   <p:timing>
     <p:tnLst>
       <p:par>
-        <p:cTn id="1" dur="indefinite" restart="never" nodeType="tmRoot"/>
+        <p:cTn xmlns:p14="http://schemas.microsoft.com/office/powerpoint/2010/main" id="1" dur="indefinite" restart="never" nodeType="tmRoot"/>
       </p:par>
     </p:tnLst>
   </p:timing>
@@ -7217,7 +7671,7 @@
   <p:timing>
     <p:tnLst>
       <p:par>
-        <p:cTn id="1" dur="indefinite" restart="never" nodeType="tmRoot"/>
+        <p:cTn xmlns:p14="http://schemas.microsoft.com/office/powerpoint/2010/main" id="1" dur="indefinite" restart="never" nodeType="tmRoot"/>
       </p:par>
     </p:tnLst>
   </p:timing>
@@ -7293,21 +7747,21 @@
                 <a:gridCol w="2880319">
                   <a:extLst>
                     <a:ext uri="{9D8B030D-6E8A-4147-A177-3AD203B41FA5}">
-                      <a16:colId xmlns:a16="http://schemas.microsoft.com/office/drawing/2014/main" val="1205949033"/>
+                      <a16:colId xmlns="" xmlns:a16="http://schemas.microsoft.com/office/drawing/2014/main" val="1205949033"/>
                     </a:ext>
                   </a:extLst>
                 </a:gridCol>
                 <a:gridCol w="2448272">
                   <a:extLst>
                     <a:ext uri="{9D8B030D-6E8A-4147-A177-3AD203B41FA5}">
-                      <a16:colId xmlns:a16="http://schemas.microsoft.com/office/drawing/2014/main" val="3234676645"/>
+                      <a16:colId xmlns="" xmlns:a16="http://schemas.microsoft.com/office/drawing/2014/main" val="3234676645"/>
                     </a:ext>
                   </a:extLst>
                 </a:gridCol>
                 <a:gridCol w="3168351">
                   <a:extLst>
                     <a:ext uri="{9D8B030D-6E8A-4147-A177-3AD203B41FA5}">
-                      <a16:colId xmlns:a16="http://schemas.microsoft.com/office/drawing/2014/main" val="497167739"/>
+                      <a16:colId xmlns="" xmlns:a16="http://schemas.microsoft.com/office/drawing/2014/main" val="497167739"/>
                     </a:ext>
                   </a:extLst>
                 </a:gridCol>
@@ -7360,7 +7814,7 @@
                 </a:tc>
                 <a:extLst>
                   <a:ext uri="{0D108BD9-81ED-4DB2-BD59-A6C34878D82A}">
-                    <a16:rowId xmlns:a16="http://schemas.microsoft.com/office/drawing/2014/main" val="3709011960"/>
+                    <a16:rowId xmlns="" xmlns:a16="http://schemas.microsoft.com/office/drawing/2014/main" val="3709011960"/>
                   </a:ext>
                 </a:extLst>
               </a:tr>
@@ -7416,7 +7870,7 @@
                 </a:tc>
                 <a:extLst>
                   <a:ext uri="{0D108BD9-81ED-4DB2-BD59-A6C34878D82A}">
-                    <a16:rowId xmlns:a16="http://schemas.microsoft.com/office/drawing/2014/main" val="4214479577"/>
+                    <a16:rowId xmlns="" xmlns:a16="http://schemas.microsoft.com/office/drawing/2014/main" val="4214479577"/>
                   </a:ext>
                 </a:extLst>
               </a:tr>
@@ -7508,7 +7962,7 @@
                 </a:tc>
                 <a:extLst>
                   <a:ext uri="{0D108BD9-81ED-4DB2-BD59-A6C34878D82A}">
-                    <a16:rowId xmlns:a16="http://schemas.microsoft.com/office/drawing/2014/main" val="3266579009"/>
+                    <a16:rowId xmlns="" xmlns:a16="http://schemas.microsoft.com/office/drawing/2014/main" val="3266579009"/>
                   </a:ext>
                 </a:extLst>
               </a:tr>
@@ -7560,7 +8014,7 @@
                 </a:tc>
                 <a:extLst>
                   <a:ext uri="{0D108BD9-81ED-4DB2-BD59-A6C34878D82A}">
-                    <a16:rowId xmlns:a16="http://schemas.microsoft.com/office/drawing/2014/main" val="282706019"/>
+                    <a16:rowId xmlns="" xmlns:a16="http://schemas.microsoft.com/office/drawing/2014/main" val="282706019"/>
                   </a:ext>
                 </a:extLst>
               </a:tr>
@@ -7612,7 +8066,7 @@
                 </a:tc>
                 <a:extLst>
                   <a:ext uri="{0D108BD9-81ED-4DB2-BD59-A6C34878D82A}">
-                    <a16:rowId xmlns:a16="http://schemas.microsoft.com/office/drawing/2014/main" val="10004"/>
+                    <a16:rowId xmlns="" xmlns:a16="http://schemas.microsoft.com/office/drawing/2014/main" val="10004"/>
                   </a:ext>
                 </a:extLst>
               </a:tr>
@@ -7668,7 +8122,7 @@
                 </a:tc>
                 <a:extLst>
                   <a:ext uri="{0D108BD9-81ED-4DB2-BD59-A6C34878D82A}">
-                    <a16:rowId xmlns:a16="http://schemas.microsoft.com/office/drawing/2014/main" val="1081411160"/>
+                    <a16:rowId xmlns="" xmlns:a16="http://schemas.microsoft.com/office/drawing/2014/main" val="1081411160"/>
                   </a:ext>
                 </a:extLst>
               </a:tr>
@@ -7735,7 +8189,7 @@
                 </a:tc>
                 <a:extLst>
                   <a:ext uri="{0D108BD9-81ED-4DB2-BD59-A6C34878D82A}">
-                    <a16:rowId xmlns:a16="http://schemas.microsoft.com/office/drawing/2014/main" val="2210005012"/>
+                    <a16:rowId xmlns="" xmlns:a16="http://schemas.microsoft.com/office/drawing/2014/main" val="2210005012"/>
                   </a:ext>
                 </a:extLst>
               </a:tr>
@@ -7855,7 +8309,7 @@
                 </a:tc>
                 <a:extLst>
                   <a:ext uri="{0D108BD9-81ED-4DB2-BD59-A6C34878D82A}">
-                    <a16:rowId xmlns:a16="http://schemas.microsoft.com/office/drawing/2014/main" val="1840919378"/>
+                    <a16:rowId xmlns="" xmlns:a16="http://schemas.microsoft.com/office/drawing/2014/main" val="1840919378"/>
                   </a:ext>
                 </a:extLst>
               </a:tr>
@@ -7911,7 +8365,7 @@
                 </a:tc>
                 <a:extLst>
                   <a:ext uri="{0D108BD9-81ED-4DB2-BD59-A6C34878D82A}">
-                    <a16:rowId xmlns:a16="http://schemas.microsoft.com/office/drawing/2014/main" val="1275340913"/>
+                    <a16:rowId xmlns="" xmlns:a16="http://schemas.microsoft.com/office/drawing/2014/main" val="1275340913"/>
                   </a:ext>
                 </a:extLst>
               </a:tr>
@@ -7955,7 +8409,7 @@
   <p:timing>
     <p:tnLst>
       <p:par>
-        <p:cTn id="1" dur="indefinite" restart="never" nodeType="tmRoot"/>
+        <p:cTn xmlns:p14="http://schemas.microsoft.com/office/powerpoint/2010/main" id="1" dur="indefinite" restart="never" nodeType="tmRoot"/>
       </p:par>
     </p:tnLst>
   </p:timing>
@@ -8004,56 +8458,6 @@
       </p:sp>
       <p:sp>
         <p:nvSpPr>
-          <p:cNvPr id="3" name="Content Placeholder 2"/>
-          <p:cNvSpPr>
-            <a:spLocks noGrp="1"/>
-          </p:cNvSpPr>
-          <p:nvPr>
-            <p:ph idx="1"/>
-          </p:nvPr>
-        </p:nvSpPr>
-        <p:spPr>
-          <a:xfrm>
-            <a:off x="776536" y="2209800"/>
-            <a:ext cx="8136904" cy="3352800"/>
-          </a:xfrm>
-        </p:spPr>
-        <p:txBody>
-          <a:bodyPr/>
-          <a:lstStyle/>
-          <a:p>
-            <a:r>
-              <a:rPr lang="en-ZA" dirty="0" smtClean="0"/>
-              <a:t>Dependent on audiogram</a:t>
-            </a:r>
-          </a:p>
-          <a:p>
-            <a:r>
-              <a:rPr lang="en-ZA" dirty="0" smtClean="0"/>
-              <a:t>Audiogram matching</a:t>
-            </a:r>
-          </a:p>
-          <a:p>
-            <a:pPr lvl="1"/>
-            <a:r>
-              <a:rPr lang="en-ZA" dirty="0" smtClean="0"/>
-              <a:t>Audiogram interpolation</a:t>
-            </a:r>
-          </a:p>
-          <a:p>
-            <a:pPr lvl="1"/>
-            <a:r>
-              <a:rPr lang="en-ZA" dirty="0" smtClean="0"/>
-              <a:t>Separate frequency band amplification</a:t>
-            </a:r>
-          </a:p>
-          <a:p>
-            <a:endParaRPr lang="en-ZA" dirty="0"/>
-          </a:p>
-        </p:txBody>
-      </p:sp>
-      <p:sp>
-        <p:nvSpPr>
           <p:cNvPr id="4" name="Slide Number Placeholder 3"/>
           <p:cNvSpPr>
             <a:spLocks noGrp="1"/>
@@ -8075,6 +8479,105 @@
           </a:p>
         </p:txBody>
       </p:sp>
+      <p:sp>
+        <p:nvSpPr>
+          <p:cNvPr id="6" name="Content Placeholder 5"/>
+          <p:cNvSpPr>
+            <a:spLocks noGrp="1"/>
+          </p:cNvSpPr>
+          <p:nvPr>
+            <p:ph idx="1"/>
+          </p:nvPr>
+        </p:nvSpPr>
+        <p:spPr>
+          <a:xfrm>
+            <a:off x="342900" y="1683274"/>
+            <a:ext cx="9362628" cy="3811488"/>
+          </a:xfrm>
+        </p:spPr>
+        <p:txBody>
+          <a:bodyPr/>
+          <a:lstStyle/>
+          <a:p>
+            <a:r>
+              <a:rPr lang="en-US" dirty="0" smtClean="0"/>
+              <a:t>Audiogram matching: requires amplification of individual frequency bands</a:t>
+            </a:r>
+          </a:p>
+        </p:txBody>
+      </p:sp>
+      <p:sp>
+        <p:nvSpPr>
+          <p:cNvPr id="9" name="Rectangle 8"/>
+          <p:cNvSpPr/>
+          <p:nvPr/>
+        </p:nvSpPr>
+        <p:spPr bwMode="auto">
+          <a:xfrm>
+            <a:off x="377536" y="5746527"/>
+            <a:ext cx="9327992" cy="609823"/>
+          </a:xfrm>
+          <a:prstGeom prst="rect">
+            <a:avLst/>
+          </a:prstGeom>
+          <a:solidFill>
+            <a:schemeClr val="bg1"/>
+          </a:solidFill>
+          <a:ln>
+            <a:solidFill>
+              <a:schemeClr val="bg1"/>
+            </a:solidFill>
+          </a:ln>
+          <a:effectLst/>
+          <a:extLst/>
+        </p:spPr>
+        <p:txBody>
+          <a:bodyPr/>
+          <a:lstStyle/>
+          <a:p>
+            <a:endParaRPr lang="en-US">
+              <a:ln>
+                <a:solidFill>
+                  <a:schemeClr val="bg1"/>
+                </a:solidFill>
+              </a:ln>
+              <a:solidFill>
+                <a:schemeClr val="bg1"/>
+              </a:solidFill>
+            </a:endParaRPr>
+          </a:p>
+        </p:txBody>
+      </p:sp>
+      <p:pic>
+        <p:nvPicPr>
+          <p:cNvPr id="7" name="Picture 6" descr="filterBank.png"/>
+          <p:cNvPicPr>
+            <a:picLocks noChangeAspect="1"/>
+          </p:cNvPicPr>
+          <p:nvPr/>
+        </p:nvPicPr>
+        <p:blipFill>
+          <a:blip r:embed="rId3">
+            <a:extLst>
+              <a:ext uri="{28A0092B-C50C-407E-A947-70E740481C1C}">
+                <a14:useLocalDpi xmlns:a14="http://schemas.microsoft.com/office/drawing/2010/main" val="0"/>
+              </a:ext>
+            </a:extLst>
+          </a:blip>
+          <a:stretch>
+            <a:fillRect/>
+          </a:stretch>
+        </p:blipFill>
+        <p:spPr>
+          <a:xfrm>
+            <a:off x="1478614" y="2541061"/>
+            <a:ext cx="6948772" cy="4316939"/>
+          </a:xfrm>
+          <a:prstGeom prst="rect">
+            <a:avLst/>
+          </a:prstGeom>
+        </p:spPr>
+      </p:pic>
     </p:spTree>
     <p:extLst>
       <p:ext uri="{BB962C8B-B14F-4D97-AF65-F5344CB8AC3E}">
@@ -8088,7 +8591,7 @@
   <p:timing>
     <p:tnLst>
       <p:par>
-        <p:cTn id="1" dur="indefinite" restart="never" nodeType="tmRoot"/>
+        <p:cTn xmlns:p14="http://schemas.microsoft.com/office/powerpoint/2010/main" id="1" dur="indefinite" restart="never" nodeType="tmRoot"/>
       </p:par>
     </p:tnLst>
   </p:timing>
@@ -8237,7 +8740,7 @@
   <p:timing>
     <p:tnLst>
       <p:par>
-        <p:cTn id="1" dur="indefinite" restart="never" nodeType="tmRoot"/>
+        <p:cTn xmlns:p14="http://schemas.microsoft.com/office/powerpoint/2010/main" id="1" dur="indefinite" restart="never" nodeType="tmRoot"/>
       </p:par>
     </p:tnLst>
   </p:timing>
@@ -8313,14 +8816,14 @@
                 <a:gridCol w="4108973">
                   <a:extLst>
                     <a:ext uri="{9D8B030D-6E8A-4147-A177-3AD203B41FA5}">
-                      <a16:colId xmlns:a16="http://schemas.microsoft.com/office/drawing/2014/main" val="641060483"/>
+                      <a16:colId xmlns="" xmlns:a16="http://schemas.microsoft.com/office/drawing/2014/main" val="641060483"/>
                     </a:ext>
                   </a:extLst>
                 </a:gridCol>
                 <a:gridCol w="1758427">
                   <a:extLst>
                     <a:ext uri="{9D8B030D-6E8A-4147-A177-3AD203B41FA5}">
-                      <a16:colId xmlns:a16="http://schemas.microsoft.com/office/drawing/2014/main" val="1147500092"/>
+                      <a16:colId xmlns="" xmlns:a16="http://schemas.microsoft.com/office/drawing/2014/main" val="1147500092"/>
                     </a:ext>
                   </a:extLst>
                 </a:gridCol>
@@ -8356,7 +8859,7 @@
                 </a:tc>
                 <a:extLst>
                   <a:ext uri="{0D108BD9-81ED-4DB2-BD59-A6C34878D82A}">
-                    <a16:rowId xmlns:a16="http://schemas.microsoft.com/office/drawing/2014/main" val="1100728770"/>
+                    <a16:rowId xmlns="" xmlns:a16="http://schemas.microsoft.com/office/drawing/2014/main" val="1100728770"/>
                   </a:ext>
                 </a:extLst>
               </a:tr>
@@ -8391,7 +8894,7 @@
                 </a:tc>
                 <a:extLst>
                   <a:ext uri="{0D108BD9-81ED-4DB2-BD59-A6C34878D82A}">
-                    <a16:rowId xmlns:a16="http://schemas.microsoft.com/office/drawing/2014/main" val="1538700946"/>
+                    <a16:rowId xmlns="" xmlns:a16="http://schemas.microsoft.com/office/drawing/2014/main" val="1538700946"/>
                   </a:ext>
                 </a:extLst>
               </a:tr>
@@ -8426,7 +8929,7 @@
                 </a:tc>
                 <a:extLst>
                   <a:ext uri="{0D108BD9-81ED-4DB2-BD59-A6C34878D82A}">
-                    <a16:rowId xmlns:a16="http://schemas.microsoft.com/office/drawing/2014/main" val="3854310482"/>
+                    <a16:rowId xmlns="" xmlns:a16="http://schemas.microsoft.com/office/drawing/2014/main" val="3854310482"/>
                   </a:ext>
                 </a:extLst>
               </a:tr>
@@ -8461,7 +8964,7 @@
                 </a:tc>
                 <a:extLst>
                   <a:ext uri="{0D108BD9-81ED-4DB2-BD59-A6C34878D82A}">
-                    <a16:rowId xmlns:a16="http://schemas.microsoft.com/office/drawing/2014/main" val="4094742816"/>
+                    <a16:rowId xmlns="" xmlns:a16="http://schemas.microsoft.com/office/drawing/2014/main" val="4094742816"/>
                   </a:ext>
                 </a:extLst>
               </a:tr>
@@ -8496,7 +8999,7 @@
                 </a:tc>
                 <a:extLst>
                   <a:ext uri="{0D108BD9-81ED-4DB2-BD59-A6C34878D82A}">
-                    <a16:rowId xmlns:a16="http://schemas.microsoft.com/office/drawing/2014/main" val="3540657552"/>
+                    <a16:rowId xmlns="" xmlns:a16="http://schemas.microsoft.com/office/drawing/2014/main" val="3540657552"/>
                   </a:ext>
                 </a:extLst>
               </a:tr>
@@ -8531,7 +9034,7 @@
                 </a:tc>
                 <a:extLst>
                   <a:ext uri="{0D108BD9-81ED-4DB2-BD59-A6C34878D82A}">
-                    <a16:rowId xmlns:a16="http://schemas.microsoft.com/office/drawing/2014/main" val="2626417538"/>
+                    <a16:rowId xmlns="" xmlns:a16="http://schemas.microsoft.com/office/drawing/2014/main" val="2626417538"/>
                   </a:ext>
                 </a:extLst>
               </a:tr>
@@ -8566,7 +9069,7 @@
                 </a:tc>
                 <a:extLst>
                   <a:ext uri="{0D108BD9-81ED-4DB2-BD59-A6C34878D82A}">
-                    <a16:rowId xmlns:a16="http://schemas.microsoft.com/office/drawing/2014/main" val="1235677700"/>
+                    <a16:rowId xmlns="" xmlns:a16="http://schemas.microsoft.com/office/drawing/2014/main" val="1235677700"/>
                   </a:ext>
                 </a:extLst>
               </a:tr>
@@ -8601,7 +9104,7 @@
                 </a:tc>
                 <a:extLst>
                   <a:ext uri="{0D108BD9-81ED-4DB2-BD59-A6C34878D82A}">
-                    <a16:rowId xmlns:a16="http://schemas.microsoft.com/office/drawing/2014/main" val="2755522816"/>
+                    <a16:rowId xmlns="" xmlns:a16="http://schemas.microsoft.com/office/drawing/2014/main" val="2755522816"/>
                   </a:ext>
                 </a:extLst>
               </a:tr>
@@ -8636,7 +9139,7 @@
                 </a:tc>
                 <a:extLst>
                   <a:ext uri="{0D108BD9-81ED-4DB2-BD59-A6C34878D82A}">
-                    <a16:rowId xmlns:a16="http://schemas.microsoft.com/office/drawing/2014/main" val="754826805"/>
+                    <a16:rowId xmlns="" xmlns:a16="http://schemas.microsoft.com/office/drawing/2014/main" val="754826805"/>
                   </a:ext>
                 </a:extLst>
               </a:tr>
@@ -8671,7 +9174,7 @@
                 </a:tc>
                 <a:extLst>
                   <a:ext uri="{0D108BD9-81ED-4DB2-BD59-A6C34878D82A}">
-                    <a16:rowId xmlns:a16="http://schemas.microsoft.com/office/drawing/2014/main" val="2456114939"/>
+                    <a16:rowId xmlns="" xmlns:a16="http://schemas.microsoft.com/office/drawing/2014/main" val="2456114939"/>
                   </a:ext>
                 </a:extLst>
               </a:tr>
@@ -8706,7 +9209,7 @@
                 </a:tc>
                 <a:extLst>
                   <a:ext uri="{0D108BD9-81ED-4DB2-BD59-A6C34878D82A}">
-                    <a16:rowId xmlns:a16="http://schemas.microsoft.com/office/drawing/2014/main" val="2549029190"/>
+                    <a16:rowId xmlns="" xmlns:a16="http://schemas.microsoft.com/office/drawing/2014/main" val="2549029190"/>
                   </a:ext>
                 </a:extLst>
               </a:tr>
@@ -8741,7 +9244,7 @@
                 </a:tc>
                 <a:extLst>
                   <a:ext uri="{0D108BD9-81ED-4DB2-BD59-A6C34878D82A}">
-                    <a16:rowId xmlns:a16="http://schemas.microsoft.com/office/drawing/2014/main" val="56862053"/>
+                    <a16:rowId xmlns="" xmlns:a16="http://schemas.microsoft.com/office/drawing/2014/main" val="56862053"/>
                   </a:ext>
                 </a:extLst>
               </a:tr>
@@ -8785,7 +9288,7 @@
   <p:timing>
     <p:tnLst>
       <p:par>
-        <p:cTn id="1" dur="indefinite" restart="never" nodeType="tmRoot"/>
+        <p:cTn xmlns:p14="http://schemas.microsoft.com/office/powerpoint/2010/main" id="1" dur="indefinite" restart="never" nodeType="tmRoot"/>
       </p:par>
     </p:tnLst>
   </p:timing>
@@ -9005,7 +9508,7 @@
           <a:ln/>
           <a:extLst>
             <a:ext uri="{91240B29-F687-4f45-9708-019B960494DF}">
-              <a14:hiddenLine xmlns:a14="http://schemas.microsoft.com/office/drawing/2010/main" xmlns="" w="9525" cap="flat" cmpd="sng" algn="ctr">
+              <a14:hiddenLine xmlns:a14="http://schemas.microsoft.com/office/drawing/2010/main" w="9525" cap="flat" cmpd="sng" algn="ctr">
                 <a:solidFill>
                   <a:schemeClr val="tx1"/>
                 </a:solidFill>
@@ -9016,7 +9519,7 @@
               </a14:hiddenLine>
             </a:ext>
             <a:ext uri="{AF507438-7753-43e0-B8FC-AC1667EBCBE1}">
-              <a14:hiddenEffects xmlns:a14="http://schemas.microsoft.com/office/drawing/2010/main" xmlns="">
+              <a14:hiddenEffects xmlns:a14="http://schemas.microsoft.com/office/drawing/2010/main">
                 <a:effectLst>
                   <a:outerShdw dist="35921" dir="2700000" algn="ctr" rotWithShape="0">
                     <a:schemeClr val="bg2"/>
@@ -9054,7 +9557,7 @@
   <p:timing>
     <p:tnLst>
       <p:par>
-        <p:cTn id="1" dur="indefinite" restart="never" nodeType="tmRoot"/>
+        <p:cTn xmlns:p14="http://schemas.microsoft.com/office/powerpoint/2010/main" id="1" dur="indefinite" restart="never" nodeType="tmRoot"/>
       </p:par>
     </p:tnLst>
   </p:timing>
@@ -9305,7 +9808,7 @@
         <a:effectLst/>
         <a:extLst>
           <a:ext uri="{91240B29-F687-4f45-9708-019B960494DF}">
-            <a14:hiddenLine xmlns:a14="http://schemas.microsoft.com/office/drawing/2010/main" xmlns="" w="9525" cap="flat" cmpd="sng" algn="ctr">
+            <a14:hiddenLine xmlns:a14="http://schemas.microsoft.com/office/drawing/2010/main" w="9525" cap="flat" cmpd="sng" algn="ctr">
               <a:solidFill>
                 <a:schemeClr val="tx1"/>
               </a:solidFill>
@@ -9316,7 +9819,7 @@
             </a14:hiddenLine>
           </a:ext>
           <a:ext uri="{AF507438-7753-43e0-B8FC-AC1667EBCBE1}">
-            <a14:hiddenEffects xmlns:a14="http://schemas.microsoft.com/office/drawing/2010/main" xmlns="">
+            <a14:hiddenEffects xmlns:a14="http://schemas.microsoft.com/office/drawing/2010/main">
               <a:effectLst>
                 <a:outerShdw dist="35921" dir="2700000" algn="ctr" rotWithShape="0">
                   <a:schemeClr val="bg2"/>
@@ -9383,7 +9886,7 @@
         <a:effectLst/>
         <a:extLst>
           <a:ext uri="{91240B29-F687-4f45-9708-019B960494DF}">
-            <a14:hiddenLine xmlns:a14="http://schemas.microsoft.com/office/drawing/2010/main" xmlns="" w="9525" cap="flat" cmpd="sng" algn="ctr">
+            <a14:hiddenLine xmlns:a14="http://schemas.microsoft.com/office/drawing/2010/main" w="9525" cap="flat" cmpd="sng" algn="ctr">
               <a:solidFill>
                 <a:schemeClr val="tx1"/>
               </a:solidFill>
@@ -9394,7 +9897,7 @@
             </a14:hiddenLine>
           </a:ext>
           <a:ext uri="{AF507438-7753-43e0-B8FC-AC1667EBCBE1}">
-            <a14:hiddenEffects xmlns:a14="http://schemas.microsoft.com/office/drawing/2010/main" xmlns="">
+            <a14:hiddenEffects xmlns:a14="http://schemas.microsoft.com/office/drawing/2010/main">
               <a:effectLst>
                 <a:outerShdw dist="35921" dir="2700000" algn="ctr" rotWithShape="0">
                   <a:schemeClr val="bg2"/>

</xml_diff>

<commit_message>
More words for slides
</commit_message>
<xml_diff>
--- a/Presentation/Lab Project Presentation.pptx
+++ b/Presentation/Lab Project Presentation.pptx
@@ -7595,14 +7595,9 @@
           <a:p>
             <a:r>
               <a:rPr lang="en-ZA" dirty="0" smtClean="0"/>
-              <a:t>Cost Breakdown</a:t>
-            </a:r>
-          </a:p>
-          <a:p>
-            <a:r>
-              <a:rPr lang="en-ZA" dirty="0" smtClean="0"/>
               <a:t>Results</a:t>
             </a:r>
+            <a:endParaRPr lang="en-ZA" dirty="0" smtClean="0"/>
           </a:p>
           <a:p>
             <a:r>
@@ -9040,6 +9035,42 @@
               <a:t>Adapted from [1]</a:t>
             </a:r>
             <a:endParaRPr lang="en-US" b="1" dirty="0"/>
+          </a:p>
+        </p:txBody>
+      </p:sp>
+      <p:sp>
+        <p:nvSpPr>
+          <p:cNvPr id="3" name="TextBox 2"/>
+          <p:cNvSpPr txBox="1"/>
+          <p:nvPr/>
+        </p:nvSpPr>
+        <p:spPr>
+          <a:xfrm>
+            <a:off x="256977" y="3491011"/>
+            <a:ext cx="937692" cy="307777"/>
+          </a:xfrm>
+          <a:prstGeom prst="rect">
+            <a:avLst/>
+          </a:prstGeom>
+          <a:noFill/>
+        </p:spPr>
+        <p:txBody>
+          <a:bodyPr wrap="square" rtlCol="0">
+            <a:spAutoFit/>
+          </a:bodyPr>
+          <a:lstStyle/>
+          <a:p>
+            <a:r>
+              <a:rPr lang="en-US" sz="1400" b="1" dirty="0" smtClean="0">
+                <a:latin typeface="Times New Roman"/>
+                <a:cs typeface="Times New Roman"/>
+              </a:rPr>
+              <a:t>Source</a:t>
+            </a:r>
+            <a:endParaRPr lang="en-US" sz="1400" b="1" dirty="0">
+              <a:latin typeface="Times New Roman"/>
+              <a:cs typeface="Times New Roman"/>
+            </a:endParaRPr>
           </a:p>
         </p:txBody>
       </p:sp>

</xml_diff>

<commit_message>
Fixing introduction slide for our presenter
</commit_message>
<xml_diff>
--- a/Presentation/Lab Project Presentation.pptx
+++ b/Presentation/Lab Project Presentation.pptx
@@ -247,7 +247,7 @@
           <a:p>
             <a:fld id="{3FA6FDA4-907F-C840-8573-33F4849B33D4}" type="datetimeFigureOut">
               <a:rPr lang="en-US" smtClean="0"/>
-              <a:t>9/12/2018</a:t>
+              <a:t>9/17/2019</a:t>
             </a:fld>
             <a:endParaRPr lang="en-US"/>
           </a:p>
@@ -413,7 +413,7 @@
           <a:p>
             <a:fld id="{290492DD-1613-8B48-9182-1ECEE9190ABB}" type="datetimeFigureOut">
               <a:rPr lang="en-US" smtClean="0"/>
-              <a:t>9/12/2018</a:t>
+              <a:t>9/17/2019</a:t>
             </a:fld>
             <a:endParaRPr lang="en-US"/>
           </a:p>
@@ -2940,7 +2940,7 @@
           </a:ln>
           <a:extLst>
             <a:ext uri="{909E8E84-426E-40dd-AFC4-6F175D3DCCD1}">
-              <a14:hiddenFill xmlns="" xmlns:a14="http://schemas.microsoft.com/office/drawing/2010/main">
+              <a14:hiddenFill xmlns:a14="http://schemas.microsoft.com/office/drawing/2010/main" xmlns="">
                 <a:noFill/>
               </a14:hiddenFill>
             </a:ext>
@@ -2978,14 +2978,14 @@
           </a:ln>
           <a:extLst>
             <a:ext uri="{909E8E84-426E-40dd-AFC4-6F175D3DCCD1}">
-              <a14:hiddenFill xmlns="" xmlns:a14="http://schemas.microsoft.com/office/drawing/2010/main">
+              <a14:hiddenFill xmlns:a14="http://schemas.microsoft.com/office/drawing/2010/main" xmlns="">
                 <a:solidFill>
                   <a:srgbClr val="FFFFFF"/>
                 </a:solidFill>
               </a14:hiddenFill>
             </a:ext>
             <a:ext uri="{91240B29-F687-4f45-9708-019B960494DF}">
-              <a14:hiddenLine xmlns="" xmlns:a14="http://schemas.microsoft.com/office/drawing/2010/main" w="9525">
+              <a14:hiddenLine xmlns:a14="http://schemas.microsoft.com/office/drawing/2010/main" xmlns="" w="9525">
                 <a:solidFill>
                   <a:srgbClr val="000000"/>
                 </a:solidFill>
@@ -2995,7 +2995,7 @@
               </a14:hiddenLine>
             </a:ext>
             <a:ext uri="{FAA26D3D-D897-4be2-8F04-BA451C77F1D7}">
-              <ma14:placeholderFlag xmlns="" xmlns:ma14="http://schemas.microsoft.com/office/mac/drawingml/2011/main" val="1"/>
+              <ma14:placeholderFlag xmlns:ma14="http://schemas.microsoft.com/office/mac/drawingml/2011/main" xmlns="" val="1"/>
             </a:ext>
           </a:extLst>
         </p:spPr>
@@ -3043,7 +3043,7 @@
           </a:ln>
           <a:extLst>
             <a:ext uri="{909E8E84-426E-40dd-AFC4-6F175D3DCCD1}">
-              <a14:hiddenFill xmlns="" xmlns:a14="http://schemas.microsoft.com/office/drawing/2010/main">
+              <a14:hiddenFill xmlns:a14="http://schemas.microsoft.com/office/drawing/2010/main" xmlns="">
                 <a:noFill/>
               </a14:hiddenFill>
             </a:ext>
@@ -3079,14 +3079,14 @@
           </a:ln>
           <a:extLst>
             <a:ext uri="{909E8E84-426E-40dd-AFC4-6F175D3DCCD1}">
-              <a14:hiddenFill xmlns="" xmlns:a14="http://schemas.microsoft.com/office/drawing/2010/main">
+              <a14:hiddenFill xmlns:a14="http://schemas.microsoft.com/office/drawing/2010/main" xmlns="">
                 <a:solidFill>
                   <a:srgbClr val="FFFFFF"/>
                 </a:solidFill>
               </a14:hiddenFill>
             </a:ext>
             <a:ext uri="{91240B29-F687-4f45-9708-019B960494DF}">
-              <a14:hiddenLine xmlns="" xmlns:a14="http://schemas.microsoft.com/office/drawing/2010/main" w="9525">
+              <a14:hiddenLine xmlns:a14="http://schemas.microsoft.com/office/drawing/2010/main" xmlns="" w="9525">
                 <a:solidFill>
                   <a:srgbClr val="000000"/>
                 </a:solidFill>
@@ -3243,14 +3243,14 @@
           </a:ln>
           <a:extLst>
             <a:ext uri="{909E8E84-426E-40dd-AFC4-6F175D3DCCD1}">
-              <a14:hiddenFill xmlns="" xmlns:a14="http://schemas.microsoft.com/office/drawing/2010/main">
+              <a14:hiddenFill xmlns:a14="http://schemas.microsoft.com/office/drawing/2010/main" xmlns="">
                 <a:solidFill>
                   <a:srgbClr val="FFFFFF"/>
                 </a:solidFill>
               </a14:hiddenFill>
             </a:ext>
             <a:ext uri="{91240B29-F687-4f45-9708-019B960494DF}">
-              <a14:hiddenLine xmlns="" xmlns:a14="http://schemas.microsoft.com/office/drawing/2010/main" w="9525">
+              <a14:hiddenLine xmlns:a14="http://schemas.microsoft.com/office/drawing/2010/main" xmlns="" w="9525">
                 <a:solidFill>
                   <a:srgbClr val="000000"/>
                 </a:solidFill>
@@ -3260,7 +3260,7 @@
               </a14:hiddenLine>
             </a:ext>
             <a:ext uri="{FAA26D3D-D897-4be2-8F04-BA451C77F1D7}">
-              <ma14:placeholderFlag xmlns="" xmlns:ma14="http://schemas.microsoft.com/office/mac/drawingml/2011/main" val="1"/>
+              <ma14:placeholderFlag xmlns:ma14="http://schemas.microsoft.com/office/mac/drawingml/2011/main" xmlns="" val="1"/>
             </a:ext>
           </a:extLst>
         </p:spPr>
@@ -3865,8 +3865,8 @@
         </p:nvSpPr>
         <p:spPr>
           <a:xfrm>
-            <a:off x="206215" y="1738458"/>
-            <a:ext cx="9493569" cy="1700466"/>
+            <a:off x="206215" y="2015457"/>
+            <a:ext cx="9493569" cy="1146468"/>
           </a:xfrm>
         </p:spPr>
         <p:txBody>
@@ -3880,7 +3880,7 @@
                 <a:ea typeface="MS PGothic" charset="0"/>
                 <a:cs typeface="Times New Roman" charset="0"/>
               </a:rPr>
-              <a:t>AN INVESTIGATIONAL STUDY INTO THE DESIGN OF A LOW COST, ADAPTIVE HEARING AID</a:t>
+              <a:t>Toward the Design of a Low Cost, Adaptive Hearing Aid</a:t>
             </a:r>
             <a:endParaRPr lang="en-US" dirty="0">
               <a:latin typeface="Arial" charset="0"/>
@@ -3900,8 +3900,8 @@
         </p:nvSpPr>
         <p:spPr bwMode="auto">
           <a:xfrm>
-            <a:off x="570706" y="4675532"/>
-            <a:ext cx="8764588" cy="1122363"/>
+            <a:off x="568893" y="4293096"/>
+            <a:ext cx="8764588" cy="1893468"/>
           </a:xfrm>
           <a:prstGeom prst="rect">
             <a:avLst/>
@@ -3912,14 +3912,14 @@
           </a:ln>
           <a:extLst>
             <a:ext uri="{909E8E84-426E-40dd-AFC4-6F175D3DCCD1}">
-              <a14:hiddenFill xmlns="" xmlns:a14="http://schemas.microsoft.com/office/drawing/2010/main">
+              <a14:hiddenFill xmlns:a14="http://schemas.microsoft.com/office/drawing/2010/main" xmlns="">
                 <a:solidFill>
                   <a:srgbClr val="FFFFFF"/>
                 </a:solidFill>
               </a14:hiddenFill>
             </a:ext>
             <a:ext uri="{91240B29-F687-4f45-9708-019B960494DF}">
-              <a14:hiddenLine xmlns="" xmlns:a14="http://schemas.microsoft.com/office/drawing/2010/main" w="9525">
+              <a14:hiddenLine xmlns:a14="http://schemas.microsoft.com/office/drawing/2010/main" xmlns="" w="9525">
                 <a:solidFill>
                   <a:srgbClr val="000000"/>
                 </a:solidFill>
@@ -3945,12 +3945,12 @@
               </a:spcAft>
             </a:pPr>
             <a:r>
-              <a:rPr lang="en-US" b="1" dirty="0">
+              <a:rPr lang="en-US" b="1" dirty="0" smtClean="0">
                 <a:solidFill>
                   <a:schemeClr val="tx1"/>
                 </a:solidFill>
               </a:rPr>
-              <a:t>Presented by:</a:t>
+              <a:t>Investigators:</a:t>
             </a:r>
           </a:p>
           <a:p>
@@ -3963,26 +3963,17 @@
               </a:spcAft>
             </a:pPr>
             <a:r>
-              <a:rPr lang="en-US" b="1" dirty="0">
-                <a:solidFill>
-                  <a:schemeClr val="tx1"/>
-                </a:solidFill>
-              </a:rPr>
+              <a:rPr lang="en-US" b="1" dirty="0" smtClean="0"/>
               <a:t>Kayla-Jade </a:t>
             </a:r>
             <a:r>
-              <a:rPr lang="en-US" b="1" dirty="0" smtClean="0">
-                <a:solidFill>
-                  <a:schemeClr val="tx1"/>
-                </a:solidFill>
-              </a:rPr>
-              <a:t>Butkow (714227) </a:t>
-            </a:r>
-            <a:endParaRPr lang="en-US" b="1" dirty="0">
-              <a:solidFill>
-                <a:schemeClr val="tx1"/>
-              </a:solidFill>
-            </a:endParaRPr>
+              <a:rPr lang="en-US" b="1" dirty="0" err="1" smtClean="0"/>
+              <a:t>Butkow</a:t>
+            </a:r>
+            <a:r>
+              <a:rPr lang="en-US" b="1" dirty="0" smtClean="0"/>
+              <a:t> and Kelvin da Silva</a:t>
+            </a:r>
           </a:p>
           <a:p>
             <a:pPr algn="ctr" defTabSz="762000">
@@ -3993,13 +3984,36 @@
                 <a:spcPct val="50000"/>
               </a:spcAft>
             </a:pPr>
+            <a:endParaRPr lang="en-US" b="1" dirty="0" smtClean="0">
+              <a:solidFill>
+                <a:schemeClr val="tx1"/>
+              </a:solidFill>
+            </a:endParaRPr>
+          </a:p>
+          <a:p>
+            <a:pPr algn="ctr" defTabSz="762000">
+              <a:lnSpc>
+                <a:spcPct val="90000"/>
+              </a:lnSpc>
+              <a:spcAft>
+                <a:spcPct val="50000"/>
+              </a:spcAft>
+            </a:pPr>
+            <a:r>
+              <a:rPr lang="en-US" b="1" dirty="0" smtClean="0">
+                <a:solidFill>
+                  <a:schemeClr val="tx1"/>
+                </a:solidFill>
+              </a:rPr>
+              <a:t>Presented </a:t>
+            </a:r>
             <a:r>
               <a:rPr lang="en-US" b="1" dirty="0">
                 <a:solidFill>
                   <a:schemeClr val="tx1"/>
                 </a:solidFill>
               </a:rPr>
-              <a:t>Kelvin da </a:t>
+              <a:t>by</a:t>
             </a:r>
             <a:r>
               <a:rPr lang="en-US" b="1" dirty="0" smtClean="0">
@@ -4007,7 +4021,25 @@
                   <a:schemeClr val="tx1"/>
                 </a:solidFill>
               </a:rPr>
-              <a:t>Silva (835842)</a:t>
+              <a:t>:</a:t>
+            </a:r>
+          </a:p>
+          <a:p>
+            <a:pPr algn="ctr" defTabSz="762000">
+              <a:lnSpc>
+                <a:spcPct val="90000"/>
+              </a:lnSpc>
+              <a:spcAft>
+                <a:spcPct val="50000"/>
+              </a:spcAft>
+            </a:pPr>
+            <a:r>
+              <a:rPr lang="en-US" b="1" dirty="0" smtClean="0">
+                <a:solidFill>
+                  <a:schemeClr val="tx1"/>
+                </a:solidFill>
+              </a:rPr>
+              <a:t> </a:t>
             </a:r>
             <a:endParaRPr lang="en-US" b="1" dirty="0">
               <a:solidFill>
@@ -4320,7 +4352,7 @@
                   </a14:hiddenLine>
                 </a:ext>
                 <a:ext uri="{FAA26D3D-D897-4be2-8F04-BA451C77F1D7}">
-                  <ma14:placeholderFlag xmlns="" xmlns:ma14="http://schemas.microsoft.com/office/mac/drawingml/2011/main" val="1"/>
+                  <ma14:placeholderFlag xmlns:ma14="http://schemas.microsoft.com/office/mac/drawingml/2011/main" xmlns="" val="1"/>
                 </a:ext>
               </a:extLst>
             </p:spPr>
@@ -4808,7 +4840,6 @@
               <a:rPr lang="en-ZA" dirty="0"/>
               <a:t>Results: Amplification</a:t>
             </a:r>
-            <a:endParaRPr lang="en-ZA" dirty="0"/>
           </a:p>
         </p:txBody>
       </p:sp>
@@ -4886,14 +4917,14 @@
           </a:ln>
           <a:extLst>
             <a:ext uri="{909E8E84-426E-40dd-AFC4-6F175D3DCCD1}">
-              <a14:hiddenFill xmlns="" xmlns:a14="http://schemas.microsoft.com/office/drawing/2010/main">
+              <a14:hiddenFill xmlns:a14="http://schemas.microsoft.com/office/drawing/2010/main" xmlns="">
                 <a:solidFill>
                   <a:srgbClr val="FFFFFF"/>
                 </a:solidFill>
               </a14:hiddenFill>
             </a:ext>
             <a:ext uri="{91240B29-F687-4f45-9708-019B960494DF}">
-              <a14:hiddenLine xmlns="" xmlns:a14="http://schemas.microsoft.com/office/drawing/2010/main" w="9525">
+              <a14:hiddenLine xmlns:a14="http://schemas.microsoft.com/office/drawing/2010/main" xmlns="" w="9525">
                 <a:solidFill>
                   <a:srgbClr val="000000"/>
                 </a:solidFill>
@@ -4903,7 +4934,7 @@
               </a14:hiddenLine>
             </a:ext>
             <a:ext uri="{FAA26D3D-D897-4be2-8F04-BA451C77F1D7}">
-              <ma14:placeholderFlag xmlns="" xmlns:ma14="http://schemas.microsoft.com/office/mac/drawingml/2011/main" val="1"/>
+              <ma14:placeholderFlag xmlns:ma14="http://schemas.microsoft.com/office/mac/drawingml/2011/main" xmlns="" val="1"/>
             </a:ext>
           </a:extLst>
         </p:spPr>
@@ -5132,8 +5163,13 @@
           <a:p>
             <a:r>
               <a:rPr lang="en-ZA" kern="0" dirty="0" smtClean="0"/>
-              <a:t>Total cost: R1462.61</a:t>
-            </a:r>
+              <a:t>Total cost: </a:t>
+            </a:r>
+            <a:r>
+              <a:rPr lang="en-ZA" kern="0" dirty="0" smtClean="0"/>
+              <a:t>$100</a:t>
+            </a:r>
+            <a:endParaRPr lang="en-ZA" kern="0" dirty="0" smtClean="0"/>
           </a:p>
           <a:p>
             <a:r>
@@ -5396,14 +5432,14 @@
           </a:ln>
           <a:extLst>
             <a:ext uri="{909E8E84-426E-40dd-AFC4-6F175D3DCCD1}">
-              <a14:hiddenFill xmlns="" xmlns:a14="http://schemas.microsoft.com/office/drawing/2010/main">
+              <a14:hiddenFill xmlns:a14="http://schemas.microsoft.com/office/drawing/2010/main" xmlns="">
                 <a:solidFill>
                   <a:srgbClr val="FFFFFF"/>
                 </a:solidFill>
               </a14:hiddenFill>
             </a:ext>
             <a:ext uri="{91240B29-F687-4f45-9708-019B960494DF}">
-              <a14:hiddenLine xmlns="" xmlns:a14="http://schemas.microsoft.com/office/drawing/2010/main" w="9525">
+              <a14:hiddenLine xmlns:a14="http://schemas.microsoft.com/office/drawing/2010/main" xmlns="" w="9525">
                 <a:solidFill>
                   <a:srgbClr val="000000"/>
                 </a:solidFill>
@@ -5413,7 +5449,7 @@
               </a14:hiddenLine>
             </a:ext>
             <a:ext uri="{FAA26D3D-D897-4be2-8F04-BA451C77F1D7}">
-              <ma14:placeholderFlag xmlns="" xmlns:ma14="http://schemas.microsoft.com/office/mac/drawingml/2011/main" val="1"/>
+              <ma14:placeholderFlag xmlns:ma14="http://schemas.microsoft.com/office/mac/drawingml/2011/main" xmlns="" val="1"/>
             </a:ext>
           </a:extLst>
         </p:spPr>
@@ -9264,7 +9300,7 @@
           <a:ln/>
           <a:extLst>
             <a:ext uri="{91240B29-F687-4f45-9708-019B960494DF}">
-              <a14:hiddenLine xmlns="" xmlns:a14="http://schemas.microsoft.com/office/drawing/2010/main" w="9525" cap="flat" cmpd="sng" algn="ctr">
+              <a14:hiddenLine xmlns:a14="http://schemas.microsoft.com/office/drawing/2010/main" xmlns="" w="9525" cap="flat" cmpd="sng" algn="ctr">
                 <a:solidFill>
                   <a:schemeClr val="tx1"/>
                 </a:solidFill>
@@ -9275,7 +9311,7 @@
               </a14:hiddenLine>
             </a:ext>
             <a:ext uri="{AF507438-7753-43e0-B8FC-AC1667EBCBE1}">
-              <a14:hiddenEffects xmlns="" xmlns:a14="http://schemas.microsoft.com/office/drawing/2010/main">
+              <a14:hiddenEffects xmlns:a14="http://schemas.microsoft.com/office/drawing/2010/main" xmlns="">
                 <a:effectLst>
                   <a:outerShdw dist="35921" dir="2700000" algn="ctr" rotWithShape="0">
                     <a:schemeClr val="bg2"/>
@@ -9358,11 +9394,7 @@
             </a:r>
             <a:r>
               <a:rPr lang="en-ZA" dirty="0" smtClean="0"/>
-              <a:t>Results: </a:t>
-            </a:r>
-            <a:r>
-              <a:rPr lang="en-ZA" dirty="0" smtClean="0"/>
-              <a:t>Amplification</a:t>
+              <a:t>Results: Amplification</a:t>
             </a:r>
             <a:endParaRPr lang="en-ZA" dirty="0"/>
           </a:p>
@@ -9442,14 +9474,14 @@
           </a:ln>
           <a:extLst>
             <a:ext uri="{909E8E84-426E-40dd-AFC4-6F175D3DCCD1}">
-              <a14:hiddenFill xmlns="" xmlns:a14="http://schemas.microsoft.com/office/drawing/2010/main">
+              <a14:hiddenFill xmlns:a14="http://schemas.microsoft.com/office/drawing/2010/main" xmlns="">
                 <a:solidFill>
                   <a:srgbClr val="FFFFFF"/>
                 </a:solidFill>
               </a14:hiddenFill>
             </a:ext>
             <a:ext uri="{91240B29-F687-4f45-9708-019B960494DF}">
-              <a14:hiddenLine xmlns="" xmlns:a14="http://schemas.microsoft.com/office/drawing/2010/main" w="9525">
+              <a14:hiddenLine xmlns:a14="http://schemas.microsoft.com/office/drawing/2010/main" xmlns="" w="9525">
                 <a:solidFill>
                   <a:srgbClr val="000000"/>
                 </a:solidFill>
@@ -9459,7 +9491,7 @@
               </a14:hiddenLine>
             </a:ext>
             <a:ext uri="{FAA26D3D-D897-4be2-8F04-BA451C77F1D7}">
-              <ma14:placeholderFlag xmlns="" xmlns:ma14="http://schemas.microsoft.com/office/mac/drawingml/2011/main" val="1"/>
+              <ma14:placeholderFlag xmlns:ma14="http://schemas.microsoft.com/office/mac/drawingml/2011/main" xmlns="" val="1"/>
             </a:ext>
           </a:extLst>
         </p:spPr>
@@ -9974,7 +10006,7 @@
         <a:effectLst/>
         <a:extLst>
           <a:ext uri="{91240B29-F687-4f45-9708-019B960494DF}">
-            <a14:hiddenLine xmlns="" xmlns:a14="http://schemas.microsoft.com/office/drawing/2010/main" w="9525" cap="flat" cmpd="sng" algn="ctr">
+            <a14:hiddenLine xmlns:a14="http://schemas.microsoft.com/office/drawing/2010/main" xmlns="" w="9525" cap="flat" cmpd="sng" algn="ctr">
               <a:solidFill>
                 <a:schemeClr val="tx1"/>
               </a:solidFill>
@@ -9985,7 +10017,7 @@
             </a14:hiddenLine>
           </a:ext>
           <a:ext uri="{AF507438-7753-43e0-B8FC-AC1667EBCBE1}">
-            <a14:hiddenEffects xmlns="" xmlns:a14="http://schemas.microsoft.com/office/drawing/2010/main">
+            <a14:hiddenEffects xmlns:a14="http://schemas.microsoft.com/office/drawing/2010/main" xmlns="">
               <a:effectLst>
                 <a:outerShdw dist="35921" dir="2700000" algn="ctr" rotWithShape="0">
                   <a:schemeClr val="bg2"/>
@@ -10052,7 +10084,7 @@
         <a:effectLst/>
         <a:extLst>
           <a:ext uri="{91240B29-F687-4f45-9708-019B960494DF}">
-            <a14:hiddenLine xmlns="" xmlns:a14="http://schemas.microsoft.com/office/drawing/2010/main" w="9525" cap="flat" cmpd="sng" algn="ctr">
+            <a14:hiddenLine xmlns:a14="http://schemas.microsoft.com/office/drawing/2010/main" xmlns="" w="9525" cap="flat" cmpd="sng" algn="ctr">
               <a:solidFill>
                 <a:schemeClr val="tx1"/>
               </a:solidFill>
@@ -10063,7 +10095,7 @@
             </a14:hiddenLine>
           </a:ext>
           <a:ext uri="{AF507438-7753-43e0-B8FC-AC1667EBCBE1}">
-            <a14:hiddenEffects xmlns="" xmlns:a14="http://schemas.microsoft.com/office/drawing/2010/main">
+            <a14:hiddenEffects xmlns:a14="http://schemas.microsoft.com/office/drawing/2010/main" xmlns="">
               <a:effectLst>
                 <a:outerShdw dist="35921" dir="2700000" algn="ctr" rotWithShape="0">
                   <a:schemeClr val="bg2"/>

</xml_diff>

<commit_message>
Fixed costs in the presentation
</commit_message>
<xml_diff>
--- a/Presentation/Lab Project Presentation.pptx
+++ b/Presentation/Lab Project Presentation.pptx
@@ -2940,7 +2940,7 @@
           </a:ln>
           <a:extLst>
             <a:ext uri="{909E8E84-426E-40dd-AFC4-6F175D3DCCD1}">
-              <a14:hiddenFill xmlns:a14="http://schemas.microsoft.com/office/drawing/2010/main" xmlns="">
+              <a14:hiddenFill xmlns="" xmlns:a14="http://schemas.microsoft.com/office/drawing/2010/main">
                 <a:noFill/>
               </a14:hiddenFill>
             </a:ext>
@@ -2978,14 +2978,14 @@
           </a:ln>
           <a:extLst>
             <a:ext uri="{909E8E84-426E-40dd-AFC4-6F175D3DCCD1}">
-              <a14:hiddenFill xmlns:a14="http://schemas.microsoft.com/office/drawing/2010/main" xmlns="">
+              <a14:hiddenFill xmlns="" xmlns:a14="http://schemas.microsoft.com/office/drawing/2010/main">
                 <a:solidFill>
                   <a:srgbClr val="FFFFFF"/>
                 </a:solidFill>
               </a14:hiddenFill>
             </a:ext>
             <a:ext uri="{91240B29-F687-4f45-9708-019B960494DF}">
-              <a14:hiddenLine xmlns:a14="http://schemas.microsoft.com/office/drawing/2010/main" xmlns="" w="9525">
+              <a14:hiddenLine xmlns="" xmlns:a14="http://schemas.microsoft.com/office/drawing/2010/main" w="9525">
                 <a:solidFill>
                   <a:srgbClr val="000000"/>
                 </a:solidFill>
@@ -2995,7 +2995,7 @@
               </a14:hiddenLine>
             </a:ext>
             <a:ext uri="{FAA26D3D-D897-4be2-8F04-BA451C77F1D7}">
-              <ma14:placeholderFlag xmlns:ma14="http://schemas.microsoft.com/office/mac/drawingml/2011/main" xmlns="" val="1"/>
+              <ma14:placeholderFlag xmlns="" xmlns:ma14="http://schemas.microsoft.com/office/mac/drawingml/2011/main" val="1"/>
             </a:ext>
           </a:extLst>
         </p:spPr>
@@ -3043,7 +3043,7 @@
           </a:ln>
           <a:extLst>
             <a:ext uri="{909E8E84-426E-40dd-AFC4-6F175D3DCCD1}">
-              <a14:hiddenFill xmlns:a14="http://schemas.microsoft.com/office/drawing/2010/main" xmlns="">
+              <a14:hiddenFill xmlns="" xmlns:a14="http://schemas.microsoft.com/office/drawing/2010/main">
                 <a:noFill/>
               </a14:hiddenFill>
             </a:ext>
@@ -3079,14 +3079,14 @@
           </a:ln>
           <a:extLst>
             <a:ext uri="{909E8E84-426E-40dd-AFC4-6F175D3DCCD1}">
-              <a14:hiddenFill xmlns:a14="http://schemas.microsoft.com/office/drawing/2010/main" xmlns="">
+              <a14:hiddenFill xmlns="" xmlns:a14="http://schemas.microsoft.com/office/drawing/2010/main">
                 <a:solidFill>
                   <a:srgbClr val="FFFFFF"/>
                 </a:solidFill>
               </a14:hiddenFill>
             </a:ext>
             <a:ext uri="{91240B29-F687-4f45-9708-019B960494DF}">
-              <a14:hiddenLine xmlns:a14="http://schemas.microsoft.com/office/drawing/2010/main" xmlns="" w="9525">
+              <a14:hiddenLine xmlns="" xmlns:a14="http://schemas.microsoft.com/office/drawing/2010/main" w="9525">
                 <a:solidFill>
                   <a:srgbClr val="000000"/>
                 </a:solidFill>
@@ -3243,14 +3243,14 @@
           </a:ln>
           <a:extLst>
             <a:ext uri="{909E8E84-426E-40dd-AFC4-6F175D3DCCD1}">
-              <a14:hiddenFill xmlns:a14="http://schemas.microsoft.com/office/drawing/2010/main" xmlns="">
+              <a14:hiddenFill xmlns="" xmlns:a14="http://schemas.microsoft.com/office/drawing/2010/main">
                 <a:solidFill>
                   <a:srgbClr val="FFFFFF"/>
                 </a:solidFill>
               </a14:hiddenFill>
             </a:ext>
             <a:ext uri="{91240B29-F687-4f45-9708-019B960494DF}">
-              <a14:hiddenLine xmlns:a14="http://schemas.microsoft.com/office/drawing/2010/main" xmlns="" w="9525">
+              <a14:hiddenLine xmlns="" xmlns:a14="http://schemas.microsoft.com/office/drawing/2010/main" w="9525">
                 <a:solidFill>
                   <a:srgbClr val="000000"/>
                 </a:solidFill>
@@ -3260,7 +3260,7 @@
               </a14:hiddenLine>
             </a:ext>
             <a:ext uri="{FAA26D3D-D897-4be2-8F04-BA451C77F1D7}">
-              <ma14:placeholderFlag xmlns:ma14="http://schemas.microsoft.com/office/mac/drawingml/2011/main" xmlns="" val="1"/>
+              <ma14:placeholderFlag xmlns="" xmlns:ma14="http://schemas.microsoft.com/office/mac/drawingml/2011/main" val="1"/>
             </a:ext>
           </a:extLst>
         </p:spPr>
@@ -3912,14 +3912,14 @@
           </a:ln>
           <a:extLst>
             <a:ext uri="{909E8E84-426E-40dd-AFC4-6F175D3DCCD1}">
-              <a14:hiddenFill xmlns:a14="http://schemas.microsoft.com/office/drawing/2010/main" xmlns="">
+              <a14:hiddenFill xmlns="" xmlns:a14="http://schemas.microsoft.com/office/drawing/2010/main">
                 <a:solidFill>
                   <a:srgbClr val="FFFFFF"/>
                 </a:solidFill>
               </a14:hiddenFill>
             </a:ext>
             <a:ext uri="{91240B29-F687-4f45-9708-019B960494DF}">
-              <a14:hiddenLine xmlns:a14="http://schemas.microsoft.com/office/drawing/2010/main" xmlns="" w="9525">
+              <a14:hiddenLine xmlns="" xmlns:a14="http://schemas.microsoft.com/office/drawing/2010/main" w="9525">
                 <a:solidFill>
                   <a:srgbClr val="000000"/>
                 </a:solidFill>
@@ -4352,7 +4352,7 @@
                   </a14:hiddenLine>
                 </a:ext>
                 <a:ext uri="{FAA26D3D-D897-4be2-8F04-BA451C77F1D7}">
-                  <ma14:placeholderFlag xmlns:ma14="http://schemas.microsoft.com/office/mac/drawingml/2011/main" xmlns="" val="1"/>
+                  <ma14:placeholderFlag xmlns="" xmlns:ma14="http://schemas.microsoft.com/office/mac/drawingml/2011/main" val="1"/>
                 </a:ext>
               </a:extLst>
             </p:spPr>
@@ -4917,14 +4917,14 @@
           </a:ln>
           <a:extLst>
             <a:ext uri="{909E8E84-426E-40dd-AFC4-6F175D3DCCD1}">
-              <a14:hiddenFill xmlns:a14="http://schemas.microsoft.com/office/drawing/2010/main" xmlns="">
+              <a14:hiddenFill xmlns="" xmlns:a14="http://schemas.microsoft.com/office/drawing/2010/main">
                 <a:solidFill>
                   <a:srgbClr val="FFFFFF"/>
                 </a:solidFill>
               </a14:hiddenFill>
             </a:ext>
             <a:ext uri="{91240B29-F687-4f45-9708-019B960494DF}">
-              <a14:hiddenLine xmlns:a14="http://schemas.microsoft.com/office/drawing/2010/main" xmlns="" w="9525">
+              <a14:hiddenLine xmlns="" xmlns:a14="http://schemas.microsoft.com/office/drawing/2010/main" w="9525">
                 <a:solidFill>
                   <a:srgbClr val="000000"/>
                 </a:solidFill>
@@ -4934,7 +4934,7 @@
               </a14:hiddenLine>
             </a:ext>
             <a:ext uri="{FAA26D3D-D897-4be2-8F04-BA451C77F1D7}">
-              <ma14:placeholderFlag xmlns:ma14="http://schemas.microsoft.com/office/mac/drawingml/2011/main" xmlns="" val="1"/>
+              <ma14:placeholderFlag xmlns="" xmlns:ma14="http://schemas.microsoft.com/office/mac/drawingml/2011/main" val="1"/>
             </a:ext>
           </a:extLst>
         </p:spPr>
@@ -5163,13 +5163,8 @@
           <a:p>
             <a:r>
               <a:rPr lang="en-ZA" kern="0" dirty="0" smtClean="0"/>
-              <a:t>Total cost: </a:t>
-            </a:r>
-            <a:r>
-              <a:rPr lang="en-ZA" kern="0" dirty="0" smtClean="0"/>
-              <a:t>$100</a:t>
-            </a:r>
-            <a:endParaRPr lang="en-ZA" kern="0" dirty="0" smtClean="0"/>
+              <a:t>Total cost: $100</a:t>
+            </a:r>
           </a:p>
           <a:p>
             <a:r>
@@ -5432,14 +5427,14 @@
           </a:ln>
           <a:extLst>
             <a:ext uri="{909E8E84-426E-40dd-AFC4-6F175D3DCCD1}">
-              <a14:hiddenFill xmlns:a14="http://schemas.microsoft.com/office/drawing/2010/main" xmlns="">
+              <a14:hiddenFill xmlns="" xmlns:a14="http://schemas.microsoft.com/office/drawing/2010/main">
                 <a:solidFill>
                   <a:srgbClr val="FFFFFF"/>
                 </a:solidFill>
               </a14:hiddenFill>
             </a:ext>
             <a:ext uri="{91240B29-F687-4f45-9708-019B960494DF}">
-              <a14:hiddenLine xmlns:a14="http://schemas.microsoft.com/office/drawing/2010/main" xmlns="" w="9525">
+              <a14:hiddenLine xmlns="" xmlns:a14="http://schemas.microsoft.com/office/drawing/2010/main" w="9525">
                 <a:solidFill>
                   <a:srgbClr val="000000"/>
                 </a:solidFill>
@@ -5449,7 +5444,7 @@
               </a14:hiddenLine>
             </a:ext>
             <a:ext uri="{FAA26D3D-D897-4be2-8F04-BA451C77F1D7}">
-              <ma14:placeholderFlag xmlns:ma14="http://schemas.microsoft.com/office/mac/drawingml/2011/main" xmlns="" val="1"/>
+              <ma14:placeholderFlag xmlns="" xmlns:ma14="http://schemas.microsoft.com/office/mac/drawingml/2011/main" val="1"/>
             </a:ext>
           </a:extLst>
         </p:spPr>
@@ -7086,8 +7081,13 @@
           <a:p>
             <a:r>
               <a:rPr lang="en-ZA" dirty="0" smtClean="0"/>
-              <a:t>Low cost – under R1500</a:t>
-            </a:r>
+              <a:t>Low cost – </a:t>
+            </a:r>
+            <a:r>
+              <a:rPr lang="en-ZA" dirty="0" smtClean="0"/>
+              <a:t>$100</a:t>
+            </a:r>
+            <a:endParaRPr lang="en-ZA" dirty="0" smtClean="0"/>
           </a:p>
           <a:p>
             <a:r>
@@ -9300,7 +9300,7 @@
           <a:ln/>
           <a:extLst>
             <a:ext uri="{91240B29-F687-4f45-9708-019B960494DF}">
-              <a14:hiddenLine xmlns:a14="http://schemas.microsoft.com/office/drawing/2010/main" xmlns="" w="9525" cap="flat" cmpd="sng" algn="ctr">
+              <a14:hiddenLine xmlns="" xmlns:a14="http://schemas.microsoft.com/office/drawing/2010/main" w="9525" cap="flat" cmpd="sng" algn="ctr">
                 <a:solidFill>
                   <a:schemeClr val="tx1"/>
                 </a:solidFill>
@@ -9311,7 +9311,7 @@
               </a14:hiddenLine>
             </a:ext>
             <a:ext uri="{AF507438-7753-43e0-B8FC-AC1667EBCBE1}">
-              <a14:hiddenEffects xmlns:a14="http://schemas.microsoft.com/office/drawing/2010/main" xmlns="">
+              <a14:hiddenEffects xmlns="" xmlns:a14="http://schemas.microsoft.com/office/drawing/2010/main">
                 <a:effectLst>
                   <a:outerShdw dist="35921" dir="2700000" algn="ctr" rotWithShape="0">
                     <a:schemeClr val="bg2"/>
@@ -9474,14 +9474,14 @@
           </a:ln>
           <a:extLst>
             <a:ext uri="{909E8E84-426E-40dd-AFC4-6F175D3DCCD1}">
-              <a14:hiddenFill xmlns:a14="http://schemas.microsoft.com/office/drawing/2010/main" xmlns="">
+              <a14:hiddenFill xmlns="" xmlns:a14="http://schemas.microsoft.com/office/drawing/2010/main">
                 <a:solidFill>
                   <a:srgbClr val="FFFFFF"/>
                 </a:solidFill>
               </a14:hiddenFill>
             </a:ext>
             <a:ext uri="{91240B29-F687-4f45-9708-019B960494DF}">
-              <a14:hiddenLine xmlns:a14="http://schemas.microsoft.com/office/drawing/2010/main" xmlns="" w="9525">
+              <a14:hiddenLine xmlns="" xmlns:a14="http://schemas.microsoft.com/office/drawing/2010/main" w="9525">
                 <a:solidFill>
                   <a:srgbClr val="000000"/>
                 </a:solidFill>
@@ -9491,7 +9491,7 @@
               </a14:hiddenLine>
             </a:ext>
             <a:ext uri="{FAA26D3D-D897-4be2-8F04-BA451C77F1D7}">
-              <ma14:placeholderFlag xmlns:ma14="http://schemas.microsoft.com/office/mac/drawingml/2011/main" xmlns="" val="1"/>
+              <ma14:placeholderFlag xmlns="" xmlns:ma14="http://schemas.microsoft.com/office/mac/drawingml/2011/main" val="1"/>
             </a:ext>
           </a:extLst>
         </p:spPr>
@@ -10006,7 +10006,7 @@
         <a:effectLst/>
         <a:extLst>
           <a:ext uri="{91240B29-F687-4f45-9708-019B960494DF}">
-            <a14:hiddenLine xmlns:a14="http://schemas.microsoft.com/office/drawing/2010/main" xmlns="" w="9525" cap="flat" cmpd="sng" algn="ctr">
+            <a14:hiddenLine xmlns="" xmlns:a14="http://schemas.microsoft.com/office/drawing/2010/main" w="9525" cap="flat" cmpd="sng" algn="ctr">
               <a:solidFill>
                 <a:schemeClr val="tx1"/>
               </a:solidFill>
@@ -10017,7 +10017,7 @@
             </a14:hiddenLine>
           </a:ext>
           <a:ext uri="{AF507438-7753-43e0-B8FC-AC1667EBCBE1}">
-            <a14:hiddenEffects xmlns:a14="http://schemas.microsoft.com/office/drawing/2010/main" xmlns="">
+            <a14:hiddenEffects xmlns="" xmlns:a14="http://schemas.microsoft.com/office/drawing/2010/main">
               <a:effectLst>
                 <a:outerShdw dist="35921" dir="2700000" algn="ctr" rotWithShape="0">
                   <a:schemeClr val="bg2"/>
@@ -10084,7 +10084,7 @@
         <a:effectLst/>
         <a:extLst>
           <a:ext uri="{91240B29-F687-4f45-9708-019B960494DF}">
-            <a14:hiddenLine xmlns:a14="http://schemas.microsoft.com/office/drawing/2010/main" xmlns="" w="9525" cap="flat" cmpd="sng" algn="ctr">
+            <a14:hiddenLine xmlns="" xmlns:a14="http://schemas.microsoft.com/office/drawing/2010/main" w="9525" cap="flat" cmpd="sng" algn="ctr">
               <a:solidFill>
                 <a:schemeClr val="tx1"/>
               </a:solidFill>
@@ -10095,7 +10095,7 @@
             </a14:hiddenLine>
           </a:ext>
           <a:ext uri="{AF507438-7753-43e0-B8FC-AC1667EBCBE1}">
-            <a14:hiddenEffects xmlns:a14="http://schemas.microsoft.com/office/drawing/2010/main" xmlns="">
+            <a14:hiddenEffects xmlns="" xmlns:a14="http://schemas.microsoft.com/office/drawing/2010/main">
               <a:effectLst>
                 <a:outerShdw dist="35921" dir="2700000" algn="ctr" rotWithShape="0">
                   <a:schemeClr val="bg2"/>

</xml_diff>

<commit_message>
Added novelty to presentation
</commit_message>
<xml_diff>
--- a/Presentation/Lab Project Presentation.pptx
+++ b/Presentation/Lab Project Presentation.pptx
@@ -248,7 +248,7 @@
           <a:p>
             <a:fld id="{3FA6FDA4-907F-C840-8573-33F4849B33D4}" type="datetimeFigureOut">
               <a:rPr lang="en-US" smtClean="0"/>
-              <a:t>9/17/19</a:t>
+              <a:t>9/17/2019</a:t>
             </a:fld>
             <a:endParaRPr lang="en-US"/>
           </a:p>
@@ -414,7 +414,7 @@
           <a:p>
             <a:fld id="{290492DD-1613-8B48-9182-1ECEE9190ABB}" type="datetimeFigureOut">
               <a:rPr lang="en-US" smtClean="0"/>
-              <a:t>9/17/19</a:t>
+              <a:t>9/17/2019</a:t>
             </a:fld>
             <a:endParaRPr lang="en-US"/>
           </a:p>
@@ -2940,7 +2940,7 @@
           </a:ln>
           <a:extLst>
             <a:ext uri="{909E8E84-426E-40dd-AFC4-6F175D3DCCD1}">
-              <a14:hiddenFill xmlns:a14="http://schemas.microsoft.com/office/drawing/2010/main" xmlns="">
+              <a14:hiddenFill xmlns="" xmlns:a14="http://schemas.microsoft.com/office/drawing/2010/main">
                 <a:noFill/>
               </a14:hiddenFill>
             </a:ext>
@@ -2978,14 +2978,14 @@
           </a:ln>
           <a:extLst>
             <a:ext uri="{909E8E84-426E-40dd-AFC4-6F175D3DCCD1}">
-              <a14:hiddenFill xmlns:a14="http://schemas.microsoft.com/office/drawing/2010/main" xmlns="">
+              <a14:hiddenFill xmlns="" xmlns:a14="http://schemas.microsoft.com/office/drawing/2010/main">
                 <a:solidFill>
                   <a:srgbClr val="FFFFFF"/>
                 </a:solidFill>
               </a14:hiddenFill>
             </a:ext>
             <a:ext uri="{91240B29-F687-4f45-9708-019B960494DF}">
-              <a14:hiddenLine xmlns:a14="http://schemas.microsoft.com/office/drawing/2010/main" xmlns="" w="9525">
+              <a14:hiddenLine xmlns="" xmlns:a14="http://schemas.microsoft.com/office/drawing/2010/main" w="9525">
                 <a:solidFill>
                   <a:srgbClr val="000000"/>
                 </a:solidFill>
@@ -2995,7 +2995,7 @@
               </a14:hiddenLine>
             </a:ext>
             <a:ext uri="{FAA26D3D-D897-4be2-8F04-BA451C77F1D7}">
-              <ma14:placeholderFlag xmlns:ma14="http://schemas.microsoft.com/office/mac/drawingml/2011/main" xmlns="" val="1"/>
+              <ma14:placeholderFlag xmlns="" xmlns:ma14="http://schemas.microsoft.com/office/mac/drawingml/2011/main" val="1"/>
             </a:ext>
           </a:extLst>
         </p:spPr>
@@ -3043,7 +3043,7 @@
           </a:ln>
           <a:extLst>
             <a:ext uri="{909E8E84-426E-40dd-AFC4-6F175D3DCCD1}">
-              <a14:hiddenFill xmlns:a14="http://schemas.microsoft.com/office/drawing/2010/main" xmlns="">
+              <a14:hiddenFill xmlns="" xmlns:a14="http://schemas.microsoft.com/office/drawing/2010/main">
                 <a:noFill/>
               </a14:hiddenFill>
             </a:ext>
@@ -3079,14 +3079,14 @@
           </a:ln>
           <a:extLst>
             <a:ext uri="{909E8E84-426E-40dd-AFC4-6F175D3DCCD1}">
-              <a14:hiddenFill xmlns:a14="http://schemas.microsoft.com/office/drawing/2010/main" xmlns="">
+              <a14:hiddenFill xmlns="" xmlns:a14="http://schemas.microsoft.com/office/drawing/2010/main">
                 <a:solidFill>
                   <a:srgbClr val="FFFFFF"/>
                 </a:solidFill>
               </a14:hiddenFill>
             </a:ext>
             <a:ext uri="{91240B29-F687-4f45-9708-019B960494DF}">
-              <a14:hiddenLine xmlns:a14="http://schemas.microsoft.com/office/drawing/2010/main" xmlns="" w="9525">
+              <a14:hiddenLine xmlns="" xmlns:a14="http://schemas.microsoft.com/office/drawing/2010/main" w="9525">
                 <a:solidFill>
                   <a:srgbClr val="000000"/>
                 </a:solidFill>
@@ -3243,14 +3243,14 @@
           </a:ln>
           <a:extLst>
             <a:ext uri="{909E8E84-426E-40dd-AFC4-6F175D3DCCD1}">
-              <a14:hiddenFill xmlns:a14="http://schemas.microsoft.com/office/drawing/2010/main" xmlns="">
+              <a14:hiddenFill xmlns="" xmlns:a14="http://schemas.microsoft.com/office/drawing/2010/main">
                 <a:solidFill>
                   <a:srgbClr val="FFFFFF"/>
                 </a:solidFill>
               </a14:hiddenFill>
             </a:ext>
             <a:ext uri="{91240B29-F687-4f45-9708-019B960494DF}">
-              <a14:hiddenLine xmlns:a14="http://schemas.microsoft.com/office/drawing/2010/main" xmlns="" w="9525">
+              <a14:hiddenLine xmlns="" xmlns:a14="http://schemas.microsoft.com/office/drawing/2010/main" w="9525">
                 <a:solidFill>
                   <a:srgbClr val="000000"/>
                 </a:solidFill>
@@ -3260,7 +3260,7 @@
               </a14:hiddenLine>
             </a:ext>
             <a:ext uri="{FAA26D3D-D897-4be2-8F04-BA451C77F1D7}">
-              <ma14:placeholderFlag xmlns:ma14="http://schemas.microsoft.com/office/mac/drawingml/2011/main" xmlns="" val="1"/>
+              <ma14:placeholderFlag xmlns="" xmlns:ma14="http://schemas.microsoft.com/office/mac/drawingml/2011/main" val="1"/>
             </a:ext>
           </a:extLst>
         </p:spPr>
@@ -3907,14 +3907,14 @@
           </a:ln>
           <a:extLst>
             <a:ext uri="{909E8E84-426E-40dd-AFC4-6F175D3DCCD1}">
-              <a14:hiddenFill xmlns:a14="http://schemas.microsoft.com/office/drawing/2010/main" xmlns="">
+              <a14:hiddenFill xmlns="" xmlns:a14="http://schemas.microsoft.com/office/drawing/2010/main">
                 <a:solidFill>
                   <a:srgbClr val="FFFFFF"/>
                 </a:solidFill>
               </a14:hiddenFill>
             </a:ext>
             <a:ext uri="{91240B29-F687-4f45-9708-019B960494DF}">
-              <a14:hiddenLine xmlns:a14="http://schemas.microsoft.com/office/drawing/2010/main" xmlns="" w="9525">
+              <a14:hiddenLine xmlns="" xmlns:a14="http://schemas.microsoft.com/office/drawing/2010/main" w="9525">
                 <a:solidFill>
                   <a:srgbClr val="000000"/>
                 </a:solidFill>
@@ -4175,14 +4175,14 @@
           </a:ln>
           <a:extLst>
             <a:ext uri="{909E8E84-426E-40dd-AFC4-6F175D3DCCD1}">
-              <a14:hiddenFill xmlns:a14="http://schemas.microsoft.com/office/drawing/2010/main" xmlns="">
+              <a14:hiddenFill xmlns="" xmlns:a14="http://schemas.microsoft.com/office/drawing/2010/main">
                 <a:solidFill>
                   <a:srgbClr val="FFFFFF"/>
                 </a:solidFill>
               </a14:hiddenFill>
             </a:ext>
             <a:ext uri="{91240B29-F687-4f45-9708-019B960494DF}">
-              <a14:hiddenLine xmlns:a14="http://schemas.microsoft.com/office/drawing/2010/main" xmlns="" w="9525">
+              <a14:hiddenLine xmlns="" xmlns:a14="http://schemas.microsoft.com/office/drawing/2010/main" w="9525">
                 <a:solidFill>
                   <a:srgbClr val="000000"/>
                 </a:solidFill>
@@ -4192,7 +4192,7 @@
               </a14:hiddenLine>
             </a:ext>
             <a:ext uri="{FAA26D3D-D897-4be2-8F04-BA451C77F1D7}">
-              <ma14:placeholderFlag xmlns:ma14="http://schemas.microsoft.com/office/mac/drawingml/2011/main" xmlns="" val="1"/>
+              <ma14:placeholderFlag xmlns="" xmlns:ma14="http://schemas.microsoft.com/office/mac/drawingml/2011/main" val="1"/>
             </a:ext>
           </a:extLst>
         </p:spPr>
@@ -4686,7 +4686,7 @@
                   </a14:hiddenLine>
                 </a:ext>
                 <a:ext uri="{FAA26D3D-D897-4be2-8F04-BA451C77F1D7}">
-                  <ma14:placeholderFlag xmlns:ma14="http://schemas.microsoft.com/office/mac/drawingml/2011/main" xmlns="" val="1"/>
+                  <ma14:placeholderFlag xmlns="" xmlns:ma14="http://schemas.microsoft.com/office/mac/drawingml/2011/main" val="1"/>
                 </a:ext>
               </a:extLst>
             </p:spPr>
@@ -5240,14 +5240,14 @@
           </a:ln>
           <a:extLst>
             <a:ext uri="{909E8E84-426E-40dd-AFC4-6F175D3DCCD1}">
-              <a14:hiddenFill xmlns:a14="http://schemas.microsoft.com/office/drawing/2010/main" xmlns="">
+              <a14:hiddenFill xmlns="" xmlns:a14="http://schemas.microsoft.com/office/drawing/2010/main">
                 <a:solidFill>
                   <a:srgbClr val="FFFFFF"/>
                 </a:solidFill>
               </a14:hiddenFill>
             </a:ext>
             <a:ext uri="{91240B29-F687-4f45-9708-019B960494DF}">
-              <a14:hiddenLine xmlns:a14="http://schemas.microsoft.com/office/drawing/2010/main" xmlns="" w="9525">
+              <a14:hiddenLine xmlns="" xmlns:a14="http://schemas.microsoft.com/office/drawing/2010/main" w="9525">
                 <a:solidFill>
                   <a:srgbClr val="000000"/>
                 </a:solidFill>
@@ -5257,7 +5257,7 @@
               </a14:hiddenLine>
             </a:ext>
             <a:ext uri="{FAA26D3D-D897-4be2-8F04-BA451C77F1D7}">
-              <ma14:placeholderFlag xmlns:ma14="http://schemas.microsoft.com/office/mac/drawingml/2011/main" xmlns="" val="1"/>
+              <ma14:placeholderFlag xmlns="" xmlns:ma14="http://schemas.microsoft.com/office/mac/drawingml/2011/main" val="1"/>
             </a:ext>
           </a:extLst>
         </p:spPr>
@@ -5726,14 +5726,14 @@
           </a:ln>
           <a:extLst>
             <a:ext uri="{909E8E84-426E-40dd-AFC4-6F175D3DCCD1}">
-              <a14:hiddenFill xmlns:a14="http://schemas.microsoft.com/office/drawing/2010/main" xmlns="">
+              <a14:hiddenFill xmlns="" xmlns:a14="http://schemas.microsoft.com/office/drawing/2010/main">
                 <a:solidFill>
                   <a:srgbClr val="FFFFFF"/>
                 </a:solidFill>
               </a14:hiddenFill>
             </a:ext>
             <a:ext uri="{91240B29-F687-4f45-9708-019B960494DF}">
-              <a14:hiddenLine xmlns:a14="http://schemas.microsoft.com/office/drawing/2010/main" xmlns="" w="9525">
+              <a14:hiddenLine xmlns="" xmlns:a14="http://schemas.microsoft.com/office/drawing/2010/main" w="9525">
                 <a:solidFill>
                   <a:srgbClr val="000000"/>
                 </a:solidFill>
@@ -5743,7 +5743,7 @@
               </a14:hiddenLine>
             </a:ext>
             <a:ext uri="{FAA26D3D-D897-4be2-8F04-BA451C77F1D7}">
-              <ma14:placeholderFlag xmlns:ma14="http://schemas.microsoft.com/office/mac/drawingml/2011/main" xmlns="" val="1"/>
+              <ma14:placeholderFlag xmlns="" xmlns:ma14="http://schemas.microsoft.com/office/mac/drawingml/2011/main" val="1"/>
             </a:ext>
           </a:extLst>
         </p:spPr>
@@ -7858,7 +7858,19 @@
             <a:pPr lvl="1"/>
             <a:r>
               <a:rPr lang="en-US" dirty="0"/>
-              <a:t>Amplifying sounds in particular directions – normally direction of highest SNR</a:t>
+              <a:t>Amplifying sounds in particular directions – </a:t>
+            </a:r>
+            <a:r>
+              <a:rPr lang="en-US" dirty="0" smtClean="0"/>
+              <a:t>currently</a:t>
+            </a:r>
+            <a:r>
+              <a:rPr lang="en-US" dirty="0" smtClean="0"/>
+              <a:t> </a:t>
+            </a:r>
+            <a:r>
+              <a:rPr lang="en-US" dirty="0"/>
+              <a:t>direction of highest SNR</a:t>
             </a:r>
           </a:p>
           <a:p>
@@ -8034,8 +8046,13 @@
             <a:pPr lvl="1"/>
             <a:r>
               <a:rPr lang="en-ZA" dirty="0"/>
-              <a:t>User tuneable directionality</a:t>
-            </a:r>
+              <a:t>User tuneable </a:t>
+            </a:r>
+            <a:r>
+              <a:rPr lang="en-ZA" dirty="0" smtClean="0"/>
+              <a:t>directionality (novelty)</a:t>
+            </a:r>
+            <a:endParaRPr lang="en-ZA" dirty="0"/>
           </a:p>
           <a:p>
             <a:r>
@@ -9464,7 +9481,7 @@
           <a:ln/>
           <a:extLst>
             <a:ext uri="{91240B29-F687-4f45-9708-019B960494DF}">
-              <a14:hiddenLine xmlns:a14="http://schemas.microsoft.com/office/drawing/2010/main" xmlns="" w="9525" cap="flat" cmpd="sng" algn="ctr">
+              <a14:hiddenLine xmlns="" xmlns:a14="http://schemas.microsoft.com/office/drawing/2010/main" w="9525" cap="flat" cmpd="sng" algn="ctr">
                 <a:solidFill>
                   <a:schemeClr val="tx1"/>
                 </a:solidFill>
@@ -9475,7 +9492,7 @@
               </a14:hiddenLine>
             </a:ext>
             <a:ext uri="{AF507438-7753-43e0-B8FC-AC1667EBCBE1}">
-              <a14:hiddenEffects xmlns:a14="http://schemas.microsoft.com/office/drawing/2010/main" xmlns="">
+              <a14:hiddenEffects xmlns="" xmlns:a14="http://schemas.microsoft.com/office/drawing/2010/main">
                 <a:effectLst>
                   <a:outerShdw dist="35921" dir="2700000" algn="ctr" rotWithShape="0">
                     <a:schemeClr val="bg2"/>
@@ -9757,7 +9774,7 @@
         <a:effectLst/>
         <a:extLst>
           <a:ext uri="{91240B29-F687-4f45-9708-019B960494DF}">
-            <a14:hiddenLine xmlns:a14="http://schemas.microsoft.com/office/drawing/2010/main" xmlns="" w="9525" cap="flat" cmpd="sng" algn="ctr">
+            <a14:hiddenLine xmlns="" xmlns:a14="http://schemas.microsoft.com/office/drawing/2010/main" w="9525" cap="flat" cmpd="sng" algn="ctr">
               <a:solidFill>
                 <a:schemeClr val="tx1"/>
               </a:solidFill>
@@ -9768,7 +9785,7 @@
             </a14:hiddenLine>
           </a:ext>
           <a:ext uri="{AF507438-7753-43e0-B8FC-AC1667EBCBE1}">
-            <a14:hiddenEffects xmlns:a14="http://schemas.microsoft.com/office/drawing/2010/main" xmlns="">
+            <a14:hiddenEffects xmlns="" xmlns:a14="http://schemas.microsoft.com/office/drawing/2010/main">
               <a:effectLst>
                 <a:outerShdw dist="35921" dir="2700000" algn="ctr" rotWithShape="0">
                   <a:schemeClr val="bg2"/>
@@ -9835,7 +9852,7 @@
         <a:effectLst/>
         <a:extLst>
           <a:ext uri="{91240B29-F687-4f45-9708-019B960494DF}">
-            <a14:hiddenLine xmlns:a14="http://schemas.microsoft.com/office/drawing/2010/main" xmlns="" w="9525" cap="flat" cmpd="sng" algn="ctr">
+            <a14:hiddenLine xmlns="" xmlns:a14="http://schemas.microsoft.com/office/drawing/2010/main" w="9525" cap="flat" cmpd="sng" algn="ctr">
               <a:solidFill>
                 <a:schemeClr val="tx1"/>
               </a:solidFill>
@@ -9846,7 +9863,7 @@
             </a14:hiddenLine>
           </a:ext>
           <a:ext uri="{AF507438-7753-43e0-B8FC-AC1667EBCBE1}">
-            <a14:hiddenEffects xmlns:a14="http://schemas.microsoft.com/office/drawing/2010/main" xmlns="">
+            <a14:hiddenEffects xmlns="" xmlns:a14="http://schemas.microsoft.com/office/drawing/2010/main">
               <a:effectLst>
                 <a:outerShdw dist="35921" dir="2700000" algn="ctr" rotWithShape="0">
                   <a:schemeClr val="bg2"/>

</xml_diff>